<commit_message>
- Updated slides - Moved basic website from class 1 to it's own folder in dockerfile section - created a basic docker compose file for reference of the process
</commit_message>
<xml_diff>
--- a/slides/02_intermediate_course_slides.pptx
+++ b/slides/02_intermediate_course_slides.pptx
@@ -34,6 +34,8 @@
     <p:sldId id="278" r:id="rId29"/>
     <p:sldId id="279" r:id="rId30"/>
     <p:sldId id="280" r:id="rId31"/>
+    <p:sldId id="281" r:id="rId32"/>
+    <p:sldId id="282" r:id="rId33"/>
   </p:sldIdLst>
   <p:sldSz cy="6858000" cx="12192000"/>
   <p:notesSz cx="7772400" cy="10058400"/>
@@ -495,7 +497,7 @@
   <p:cSld>
     <p:spTree>
       <p:nvGrpSpPr>
-        <p:cNvPr id="160" name="Shape 160"/>
+        <p:cNvPr id="161" name="Shape 161"/>
         <p:cNvGrpSpPr/>
         <p:nvPr/>
       </p:nvGrpSpPr>
@@ -509,7 +511,7 @@
       </p:grpSpPr>
       <p:sp>
         <p:nvSpPr>
-          <p:cNvPr id="161" name="Shape 161"/>
+          <p:cNvPr id="162" name="Shape 162"/>
           <p:cNvSpPr txBox="1"/>
           <p:nvPr>
             <p:ph idx="1" type="body"/>
@@ -549,7 +551,7 @@
       </p:sp>
       <p:sp>
         <p:nvSpPr>
-          <p:cNvPr id="162" name="Shape 162"/>
+          <p:cNvPr id="163" name="Shape 163"/>
           <p:cNvSpPr/>
           <p:nvPr>
             <p:ph idx="2" type="sldImg"/>
@@ -594,7 +596,7 @@
   <p:cSld>
     <p:spTree>
       <p:nvGrpSpPr>
-        <p:cNvPr id="166" name="Shape 166"/>
+        <p:cNvPr id="167" name="Shape 167"/>
         <p:cNvGrpSpPr/>
         <p:nvPr/>
       </p:nvGrpSpPr>
@@ -608,7 +610,7 @@
       </p:grpSpPr>
       <p:sp>
         <p:nvSpPr>
-          <p:cNvPr id="167" name="Shape 167"/>
+          <p:cNvPr id="168" name="Shape 168"/>
           <p:cNvSpPr txBox="1"/>
           <p:nvPr>
             <p:ph idx="1" type="body"/>
@@ -648,7 +650,7 @@
       </p:sp>
       <p:sp>
         <p:nvSpPr>
-          <p:cNvPr id="168" name="Shape 168"/>
+          <p:cNvPr id="169" name="Shape 169"/>
           <p:cNvSpPr/>
           <p:nvPr>
             <p:ph idx="2" type="sldImg"/>
@@ -693,7 +695,7 @@
   <p:cSld>
     <p:spTree>
       <p:nvGrpSpPr>
-        <p:cNvPr id="171" name="Shape 171"/>
+        <p:cNvPr id="172" name="Shape 172"/>
         <p:cNvGrpSpPr/>
         <p:nvPr/>
       </p:nvGrpSpPr>
@@ -707,7 +709,7 @@
       </p:grpSpPr>
       <p:sp>
         <p:nvSpPr>
-          <p:cNvPr id="172" name="Shape 172"/>
+          <p:cNvPr id="173" name="Shape 173"/>
           <p:cNvSpPr txBox="1"/>
           <p:nvPr>
             <p:ph idx="1" type="body"/>
@@ -747,7 +749,7 @@
       </p:sp>
       <p:sp>
         <p:nvSpPr>
-          <p:cNvPr id="173" name="Shape 173"/>
+          <p:cNvPr id="174" name="Shape 174"/>
           <p:cNvSpPr/>
           <p:nvPr>
             <p:ph idx="2" type="sldImg"/>
@@ -792,7 +794,7 @@
   <p:cSld>
     <p:spTree>
       <p:nvGrpSpPr>
-        <p:cNvPr id="177" name="Shape 177"/>
+        <p:cNvPr id="178" name="Shape 178"/>
         <p:cNvGrpSpPr/>
         <p:nvPr/>
       </p:nvGrpSpPr>
@@ -806,7 +808,7 @@
       </p:grpSpPr>
       <p:sp>
         <p:nvSpPr>
-          <p:cNvPr id="178" name="Shape 178"/>
+          <p:cNvPr id="179" name="Shape 179"/>
           <p:cNvSpPr txBox="1"/>
           <p:nvPr>
             <p:ph idx="1" type="body"/>
@@ -846,7 +848,7 @@
       </p:sp>
       <p:sp>
         <p:nvSpPr>
-          <p:cNvPr id="179" name="Shape 179"/>
+          <p:cNvPr id="180" name="Shape 180"/>
           <p:cNvSpPr/>
           <p:nvPr>
             <p:ph idx="2" type="sldImg"/>
@@ -891,7 +893,7 @@
   <p:cSld>
     <p:spTree>
       <p:nvGrpSpPr>
-        <p:cNvPr id="182" name="Shape 182"/>
+        <p:cNvPr id="183" name="Shape 183"/>
         <p:cNvGrpSpPr/>
         <p:nvPr/>
       </p:nvGrpSpPr>
@@ -905,7 +907,7 @@
       </p:grpSpPr>
       <p:sp>
         <p:nvSpPr>
-          <p:cNvPr id="183" name="Shape 183"/>
+          <p:cNvPr id="184" name="Shape 184"/>
           <p:cNvSpPr txBox="1"/>
           <p:nvPr>
             <p:ph idx="1" type="body"/>
@@ -945,7 +947,7 @@
       </p:sp>
       <p:sp>
         <p:nvSpPr>
-          <p:cNvPr id="184" name="Shape 184"/>
+          <p:cNvPr id="185" name="Shape 185"/>
           <p:cNvSpPr/>
           <p:nvPr>
             <p:ph idx="2" type="sldImg"/>
@@ -990,7 +992,7 @@
   <p:cSld>
     <p:spTree>
       <p:nvGrpSpPr>
-        <p:cNvPr id="187" name="Shape 187"/>
+        <p:cNvPr id="188" name="Shape 188"/>
         <p:cNvGrpSpPr/>
         <p:nvPr/>
       </p:nvGrpSpPr>
@@ -1004,7 +1006,7 @@
       </p:grpSpPr>
       <p:sp>
         <p:nvSpPr>
-          <p:cNvPr id="188" name="Shape 188"/>
+          <p:cNvPr id="189" name="Shape 189"/>
           <p:cNvSpPr txBox="1"/>
           <p:nvPr>
             <p:ph idx="1" type="body"/>
@@ -1044,7 +1046,7 @@
       </p:sp>
       <p:sp>
         <p:nvSpPr>
-          <p:cNvPr id="189" name="Shape 189"/>
+          <p:cNvPr id="190" name="Shape 190"/>
           <p:cNvSpPr/>
           <p:nvPr>
             <p:ph idx="2" type="sldImg"/>
@@ -1089,7 +1091,7 @@
   <p:cSld>
     <p:spTree>
       <p:nvGrpSpPr>
-        <p:cNvPr id="192" name="Shape 192"/>
+        <p:cNvPr id="193" name="Shape 193"/>
         <p:cNvGrpSpPr/>
         <p:nvPr/>
       </p:nvGrpSpPr>
@@ -1103,7 +1105,7 @@
       </p:grpSpPr>
       <p:sp>
         <p:nvSpPr>
-          <p:cNvPr id="193" name="Shape 193"/>
+          <p:cNvPr id="194" name="Shape 194"/>
           <p:cNvSpPr txBox="1"/>
           <p:nvPr>
             <p:ph idx="1" type="body"/>
@@ -1143,7 +1145,7 @@
       </p:sp>
       <p:sp>
         <p:nvSpPr>
-          <p:cNvPr id="194" name="Shape 194"/>
+          <p:cNvPr id="195" name="Shape 195"/>
           <p:cNvSpPr/>
           <p:nvPr>
             <p:ph idx="2" type="sldImg"/>
@@ -1188,7 +1190,7 @@
   <p:cSld>
     <p:spTree>
       <p:nvGrpSpPr>
-        <p:cNvPr id="197" name="Shape 197"/>
+        <p:cNvPr id="198" name="Shape 198"/>
         <p:cNvGrpSpPr/>
         <p:nvPr/>
       </p:nvGrpSpPr>
@@ -1202,7 +1204,7 @@
       </p:grpSpPr>
       <p:sp>
         <p:nvSpPr>
-          <p:cNvPr id="198" name="Shape 198"/>
+          <p:cNvPr id="199" name="Shape 199"/>
           <p:cNvSpPr txBox="1"/>
           <p:nvPr>
             <p:ph idx="1" type="body"/>
@@ -1242,7 +1244,7 @@
       </p:sp>
       <p:sp>
         <p:nvSpPr>
-          <p:cNvPr id="199" name="Shape 199"/>
+          <p:cNvPr id="200" name="Shape 200"/>
           <p:cNvSpPr/>
           <p:nvPr>
             <p:ph idx="2" type="sldImg"/>
@@ -1287,7 +1289,7 @@
   <p:cSld>
     <p:spTree>
       <p:nvGrpSpPr>
-        <p:cNvPr id="203" name="Shape 203"/>
+        <p:cNvPr id="204" name="Shape 204"/>
         <p:cNvGrpSpPr/>
         <p:nvPr/>
       </p:nvGrpSpPr>
@@ -1301,7 +1303,7 @@
       </p:grpSpPr>
       <p:sp>
         <p:nvSpPr>
-          <p:cNvPr id="204" name="Shape 204"/>
+          <p:cNvPr id="205" name="Shape 205"/>
           <p:cNvSpPr txBox="1"/>
           <p:nvPr>
             <p:ph idx="1" type="body"/>
@@ -1341,7 +1343,7 @@
       </p:sp>
       <p:sp>
         <p:nvSpPr>
-          <p:cNvPr id="205" name="Shape 205"/>
+          <p:cNvPr id="206" name="Shape 206"/>
           <p:cNvSpPr/>
           <p:nvPr>
             <p:ph idx="2" type="sldImg"/>
@@ -1386,7 +1388,7 @@
   <p:cSld>
     <p:spTree>
       <p:nvGrpSpPr>
-        <p:cNvPr id="208" name="Shape 208"/>
+        <p:cNvPr id="209" name="Shape 209"/>
         <p:cNvGrpSpPr/>
         <p:nvPr/>
       </p:nvGrpSpPr>
@@ -1400,7 +1402,7 @@
       </p:grpSpPr>
       <p:sp>
         <p:nvSpPr>
-          <p:cNvPr id="209" name="Shape 209"/>
+          <p:cNvPr id="210" name="Shape 210"/>
           <p:cNvSpPr txBox="1"/>
           <p:nvPr>
             <p:ph idx="1" type="body"/>
@@ -1440,7 +1442,7 @@
       </p:sp>
       <p:sp>
         <p:nvSpPr>
-          <p:cNvPr id="210" name="Shape 210"/>
+          <p:cNvPr id="211" name="Shape 211"/>
           <p:cNvSpPr/>
           <p:nvPr>
             <p:ph idx="2" type="sldImg"/>
@@ -1485,7 +1487,7 @@
   <p:cSld>
     <p:spTree>
       <p:nvGrpSpPr>
-        <p:cNvPr id="115" name="Shape 115"/>
+        <p:cNvPr id="116" name="Shape 116"/>
         <p:cNvGrpSpPr/>
         <p:nvPr/>
       </p:nvGrpSpPr>
@@ -1499,7 +1501,7 @@
       </p:grpSpPr>
       <p:sp>
         <p:nvSpPr>
-          <p:cNvPr id="116" name="Shape 116"/>
+          <p:cNvPr id="117" name="Shape 117"/>
           <p:cNvSpPr txBox="1"/>
           <p:nvPr>
             <p:ph idx="1" type="body"/>
@@ -1539,7 +1541,7 @@
       </p:sp>
       <p:sp>
         <p:nvSpPr>
-          <p:cNvPr id="117" name="Shape 117"/>
+          <p:cNvPr id="118" name="Shape 118"/>
           <p:cNvSpPr/>
           <p:nvPr>
             <p:ph idx="2" type="sldImg"/>
@@ -1584,7 +1586,7 @@
   <p:cSld>
     <p:spTree>
       <p:nvGrpSpPr>
-        <p:cNvPr id="213" name="Shape 213"/>
+        <p:cNvPr id="214" name="Shape 214"/>
         <p:cNvGrpSpPr/>
         <p:nvPr/>
       </p:nvGrpSpPr>
@@ -1598,7 +1600,7 @@
       </p:grpSpPr>
       <p:sp>
         <p:nvSpPr>
-          <p:cNvPr id="214" name="Shape 214"/>
+          <p:cNvPr id="215" name="Shape 215"/>
           <p:cNvSpPr txBox="1"/>
           <p:nvPr>
             <p:ph idx="1" type="body"/>
@@ -1638,7 +1640,7 @@
       </p:sp>
       <p:sp>
         <p:nvSpPr>
-          <p:cNvPr id="215" name="Shape 215"/>
+          <p:cNvPr id="216" name="Shape 216"/>
           <p:cNvSpPr/>
           <p:nvPr>
             <p:ph idx="2" type="sldImg"/>
@@ -1683,7 +1685,7 @@
   <p:cSld>
     <p:spTree>
       <p:nvGrpSpPr>
-        <p:cNvPr id="218" name="Shape 218"/>
+        <p:cNvPr id="219" name="Shape 219"/>
         <p:cNvGrpSpPr/>
         <p:nvPr/>
       </p:nvGrpSpPr>
@@ -1697,7 +1699,7 @@
       </p:grpSpPr>
       <p:sp>
         <p:nvSpPr>
-          <p:cNvPr id="219" name="Shape 219"/>
+          <p:cNvPr id="220" name="Shape 220"/>
           <p:cNvSpPr txBox="1"/>
           <p:nvPr>
             <p:ph idx="1" type="body"/>
@@ -1737,7 +1739,7 @@
       </p:sp>
       <p:sp>
         <p:nvSpPr>
-          <p:cNvPr id="220" name="Shape 220"/>
+          <p:cNvPr id="221" name="Shape 221"/>
           <p:cNvSpPr/>
           <p:nvPr>
             <p:ph idx="2" type="sldImg"/>
@@ -1782,7 +1784,7 @@
   <p:cSld>
     <p:spTree>
       <p:nvGrpSpPr>
-        <p:cNvPr id="223" name="Shape 223"/>
+        <p:cNvPr id="224" name="Shape 224"/>
         <p:cNvGrpSpPr/>
         <p:nvPr/>
       </p:nvGrpSpPr>
@@ -1796,7 +1798,7 @@
       </p:grpSpPr>
       <p:sp>
         <p:nvSpPr>
-          <p:cNvPr id="224" name="Shape 224"/>
+          <p:cNvPr id="225" name="Shape 225"/>
           <p:cNvSpPr txBox="1"/>
           <p:nvPr>
             <p:ph idx="1" type="body"/>
@@ -1836,7 +1838,7 @@
       </p:sp>
       <p:sp>
         <p:nvSpPr>
-          <p:cNvPr id="225" name="Shape 225"/>
+          <p:cNvPr id="226" name="Shape 226"/>
           <p:cNvSpPr/>
           <p:nvPr>
             <p:ph idx="2" type="sldImg"/>
@@ -1881,7 +1883,7 @@
   <p:cSld>
     <p:spTree>
       <p:nvGrpSpPr>
-        <p:cNvPr id="228" name="Shape 228"/>
+        <p:cNvPr id="229" name="Shape 229"/>
         <p:cNvGrpSpPr/>
         <p:nvPr/>
       </p:nvGrpSpPr>
@@ -1895,7 +1897,7 @@
       </p:grpSpPr>
       <p:sp>
         <p:nvSpPr>
-          <p:cNvPr id="229" name="Shape 229"/>
+          <p:cNvPr id="230" name="Shape 230"/>
           <p:cNvSpPr txBox="1"/>
           <p:nvPr>
             <p:ph idx="1" type="body"/>
@@ -1935,7 +1937,7 @@
       </p:sp>
       <p:sp>
         <p:nvSpPr>
-          <p:cNvPr id="230" name="Shape 230"/>
+          <p:cNvPr id="231" name="Shape 231"/>
           <p:cNvSpPr/>
           <p:nvPr>
             <p:ph idx="2" type="sldImg"/>
@@ -1980,7 +1982,7 @@
   <p:cSld>
     <p:spTree>
       <p:nvGrpSpPr>
-        <p:cNvPr id="233" name="Shape 233"/>
+        <p:cNvPr id="234" name="Shape 234"/>
         <p:cNvGrpSpPr/>
         <p:nvPr/>
       </p:nvGrpSpPr>
@@ -1994,7 +1996,205 @@
       </p:grpSpPr>
       <p:sp>
         <p:nvSpPr>
-          <p:cNvPr id="234" name="Shape 234"/>
+          <p:cNvPr id="235" name="Shape 235"/>
+          <p:cNvSpPr txBox="1"/>
+          <p:nvPr>
+            <p:ph idx="1" type="body"/>
+          </p:nvPr>
+        </p:nvSpPr>
+        <p:spPr>
+          <a:xfrm>
+            <a:off x="777225" y="4777725"/>
+            <a:ext cx="6217800" cy="4526400"/>
+          </a:xfrm>
+          <a:prstGeom prst="rect">
+            <a:avLst/>
+          </a:prstGeom>
+          <a:noFill/>
+          <a:ln>
+            <a:noFill/>
+          </a:ln>
+        </p:spPr>
+        <p:txBody>
+          <a:bodyPr anchorCtr="0" anchor="ctr" bIns="91425" lIns="91425" rIns="91425" tIns="91425">
+            <a:noAutofit/>
+          </a:bodyPr>
+          <a:lstStyle/>
+          <a:p>
+            <a:pPr lvl="0" rtl="0">
+              <a:spcBef>
+                <a:spcPts val="0"/>
+              </a:spcBef>
+              <a:buNone/>
+            </a:pPr>
+            <a:r>
+              <a:t/>
+            </a:r>
+            <a:endParaRPr/>
+          </a:p>
+        </p:txBody>
+      </p:sp>
+      <p:sp>
+        <p:nvSpPr>
+          <p:cNvPr id="236" name="Shape 236"/>
+          <p:cNvSpPr/>
+          <p:nvPr>
+            <p:ph idx="2" type="sldImg"/>
+          </p:nvPr>
+        </p:nvSpPr>
+        <p:spPr>
+          <a:xfrm>
+            <a:off x="1295650" y="754375"/>
+            <a:ext cx="5181900" cy="3771900"/>
+          </a:xfrm>
+          <a:custGeom>
+            <a:pathLst>
+              <a:path extrusionOk="0" h="120000" w="120000">
+                <a:moveTo>
+                  <a:pt x="0" y="0"/>
+                </a:moveTo>
+                <a:lnTo>
+                  <a:pt x="120000" y="0"/>
+                </a:lnTo>
+                <a:lnTo>
+                  <a:pt x="120000" y="120000"/>
+                </a:lnTo>
+                <a:lnTo>
+                  <a:pt x="0" y="120000"/>
+                </a:lnTo>
+                <a:close/>
+              </a:path>
+            </a:pathLst>
+          </a:custGeom>
+        </p:spPr>
+      </p:sp>
+    </p:spTree>
+  </p:cSld>
+  <p:clrMapOvr>
+    <a:masterClrMapping/>
+  </p:clrMapOvr>
+</p:notes>
+</file>
+
+<file path=ppt/notesSlides/notesSlide25.xml><?xml version="1.0" encoding="utf-8"?>
+<p:notes xmlns:a="http://schemas.openxmlformats.org/drawingml/2006/main" xmlns:r="http://schemas.openxmlformats.org/officeDocument/2006/relationships" xmlns:mc="http://schemas.openxmlformats.org/markup-compatibility/2006" xmlns:mv="urn:schemas-microsoft-com:mac:vml" xmlns:p="http://schemas.openxmlformats.org/presentationml/2006/main" xmlns:c="http://schemas.openxmlformats.org/drawingml/2006/chart" xmlns:dgm="http://schemas.openxmlformats.org/drawingml/2006/diagram" xmlns:o="urn:schemas-microsoft-com:office:office" xmlns:v="urn:schemas-microsoft-com:vml" xmlns:pvml="urn:schemas-microsoft-com:office:powerpoint" xmlns:com="http://schemas.openxmlformats.org/drawingml/2006/compatibility" xmlns:p14="http://schemas.microsoft.com/office/powerpoint/2010/main" showMasterPhAnim="0" showMasterSp="0">
+  <p:cSld>
+    <p:spTree>
+      <p:nvGrpSpPr>
+        <p:cNvPr id="239" name="Shape 239"/>
+        <p:cNvGrpSpPr/>
+        <p:nvPr/>
+      </p:nvGrpSpPr>
+      <p:grpSpPr>
+        <a:xfrm>
+          <a:off x="0" y="0"/>
+          <a:ext cx="0" cy="0"/>
+          <a:chOff x="0" y="0"/>
+          <a:chExt cx="0" cy="0"/>
+        </a:xfrm>
+      </p:grpSpPr>
+      <p:sp>
+        <p:nvSpPr>
+          <p:cNvPr id="240" name="Shape 240"/>
+          <p:cNvSpPr txBox="1"/>
+          <p:nvPr>
+            <p:ph idx="1" type="body"/>
+          </p:nvPr>
+        </p:nvSpPr>
+        <p:spPr>
+          <a:xfrm>
+            <a:off x="777225" y="4777725"/>
+            <a:ext cx="6217800" cy="4526400"/>
+          </a:xfrm>
+          <a:prstGeom prst="rect">
+            <a:avLst/>
+          </a:prstGeom>
+          <a:noFill/>
+          <a:ln>
+            <a:noFill/>
+          </a:ln>
+        </p:spPr>
+        <p:txBody>
+          <a:bodyPr anchorCtr="0" anchor="ctr" bIns="91425" lIns="91425" rIns="91425" tIns="91425">
+            <a:noAutofit/>
+          </a:bodyPr>
+          <a:lstStyle/>
+          <a:p>
+            <a:pPr lvl="0" rtl="0">
+              <a:spcBef>
+                <a:spcPts val="0"/>
+              </a:spcBef>
+              <a:buNone/>
+            </a:pPr>
+            <a:r>
+              <a:t/>
+            </a:r>
+            <a:endParaRPr/>
+          </a:p>
+        </p:txBody>
+      </p:sp>
+      <p:sp>
+        <p:nvSpPr>
+          <p:cNvPr id="241" name="Shape 241"/>
+          <p:cNvSpPr/>
+          <p:nvPr>
+            <p:ph idx="2" type="sldImg"/>
+          </p:nvPr>
+        </p:nvSpPr>
+        <p:spPr>
+          <a:xfrm>
+            <a:off x="1295650" y="754375"/>
+            <a:ext cx="5181900" cy="3771900"/>
+          </a:xfrm>
+          <a:custGeom>
+            <a:pathLst>
+              <a:path extrusionOk="0" h="120000" w="120000">
+                <a:moveTo>
+                  <a:pt x="0" y="0"/>
+                </a:moveTo>
+                <a:lnTo>
+                  <a:pt x="120000" y="0"/>
+                </a:lnTo>
+                <a:lnTo>
+                  <a:pt x="120000" y="120000"/>
+                </a:lnTo>
+                <a:lnTo>
+                  <a:pt x="0" y="120000"/>
+                </a:lnTo>
+                <a:close/>
+              </a:path>
+            </a:pathLst>
+          </a:custGeom>
+        </p:spPr>
+      </p:sp>
+    </p:spTree>
+  </p:cSld>
+  <p:clrMapOvr>
+    <a:masterClrMapping/>
+  </p:clrMapOvr>
+</p:notes>
+</file>
+
+<file path=ppt/notesSlides/notesSlide26.xml><?xml version="1.0" encoding="utf-8"?>
+<p:notes xmlns:a="http://schemas.openxmlformats.org/drawingml/2006/main" xmlns:r="http://schemas.openxmlformats.org/officeDocument/2006/relationships" xmlns:mc="http://schemas.openxmlformats.org/markup-compatibility/2006" xmlns:mv="urn:schemas-microsoft-com:mac:vml" xmlns:p="http://schemas.openxmlformats.org/presentationml/2006/main" xmlns:c="http://schemas.openxmlformats.org/drawingml/2006/chart" xmlns:dgm="http://schemas.openxmlformats.org/drawingml/2006/diagram" xmlns:o="urn:schemas-microsoft-com:office:office" xmlns:v="urn:schemas-microsoft-com:vml" xmlns:pvml="urn:schemas-microsoft-com:office:powerpoint" xmlns:com="http://schemas.openxmlformats.org/drawingml/2006/compatibility" xmlns:p14="http://schemas.microsoft.com/office/powerpoint/2010/main" showMasterPhAnim="0" showMasterSp="0">
+  <p:cSld>
+    <p:spTree>
+      <p:nvGrpSpPr>
+        <p:cNvPr id="244" name="Shape 244"/>
+        <p:cNvGrpSpPr/>
+        <p:nvPr/>
+      </p:nvGrpSpPr>
+      <p:grpSpPr>
+        <a:xfrm>
+          <a:off x="0" y="0"/>
+          <a:ext cx="0" cy="0"/>
+          <a:chOff x="0" y="0"/>
+          <a:chExt cx="0" cy="0"/>
+        </a:xfrm>
+      </p:grpSpPr>
+      <p:sp>
+        <p:nvSpPr>
+          <p:cNvPr id="245" name="Shape 245"/>
           <p:cNvSpPr txBox="1"/>
           <p:nvPr>
             <p:ph idx="1" type="body"/>
@@ -2034,7 +2234,7 @@
       </p:sp>
       <p:sp>
         <p:nvSpPr>
-          <p:cNvPr id="235" name="Shape 235"/>
+          <p:cNvPr id="246" name="Shape 246"/>
           <p:cNvSpPr/>
           <p:nvPr>
             <p:ph idx="2" type="sldImg"/>
@@ -2074,12 +2274,12 @@
 </p:notes>
 </file>
 
-<file path=ppt/notesSlides/notesSlide25.xml><?xml version="1.0" encoding="utf-8"?>
+<file path=ppt/notesSlides/notesSlide27.xml><?xml version="1.0" encoding="utf-8"?>
 <p:notes xmlns:a="http://schemas.openxmlformats.org/drawingml/2006/main" xmlns:r="http://schemas.openxmlformats.org/officeDocument/2006/relationships" xmlns:mc="http://schemas.openxmlformats.org/markup-compatibility/2006" xmlns:mv="urn:schemas-microsoft-com:mac:vml" xmlns:p="http://schemas.openxmlformats.org/presentationml/2006/main" xmlns:c="http://schemas.openxmlformats.org/drawingml/2006/chart" xmlns:dgm="http://schemas.openxmlformats.org/drawingml/2006/diagram" xmlns:o="urn:schemas-microsoft-com:office:office" xmlns:v="urn:schemas-microsoft-com:vml" xmlns:pvml="urn:schemas-microsoft-com:office:powerpoint" xmlns:com="http://schemas.openxmlformats.org/drawingml/2006/compatibility" xmlns:p14="http://schemas.microsoft.com/office/powerpoint/2010/main" showMasterPhAnim="0" showMasterSp="0">
   <p:cSld>
     <p:spTree>
       <p:nvGrpSpPr>
-        <p:cNvPr id="238" name="Shape 238"/>
+        <p:cNvPr id="249" name="Shape 249"/>
         <p:cNvGrpSpPr/>
         <p:nvPr/>
       </p:nvGrpSpPr>
@@ -2093,7 +2293,7 @@
       </p:grpSpPr>
       <p:sp>
         <p:nvSpPr>
-          <p:cNvPr id="239" name="Shape 239"/>
+          <p:cNvPr id="250" name="Shape 250"/>
           <p:cNvSpPr txBox="1"/>
           <p:nvPr>
             <p:ph idx="1" type="body"/>
@@ -2133,7 +2333,7 @@
       </p:sp>
       <p:sp>
         <p:nvSpPr>
-          <p:cNvPr id="240" name="Shape 240"/>
+          <p:cNvPr id="251" name="Shape 251"/>
           <p:cNvSpPr/>
           <p:nvPr>
             <p:ph idx="2" type="sldImg"/>
@@ -2178,7 +2378,7 @@
   <p:cSld>
     <p:spTree>
       <p:nvGrpSpPr>
-        <p:cNvPr id="120" name="Shape 120"/>
+        <p:cNvPr id="121" name="Shape 121"/>
         <p:cNvGrpSpPr/>
         <p:nvPr/>
       </p:nvGrpSpPr>
@@ -2192,7 +2392,7 @@
       </p:grpSpPr>
       <p:sp>
         <p:nvSpPr>
-          <p:cNvPr id="121" name="Shape 121"/>
+          <p:cNvPr id="122" name="Shape 122"/>
           <p:cNvSpPr txBox="1"/>
           <p:nvPr>
             <p:ph idx="1" type="body"/>
@@ -2232,7 +2432,7 @@
       </p:sp>
       <p:sp>
         <p:nvSpPr>
-          <p:cNvPr id="122" name="Shape 122"/>
+          <p:cNvPr id="123" name="Shape 123"/>
           <p:cNvSpPr/>
           <p:nvPr>
             <p:ph idx="2" type="sldImg"/>
@@ -2277,7 +2477,7 @@
   <p:cSld>
     <p:spTree>
       <p:nvGrpSpPr>
-        <p:cNvPr id="125" name="Shape 125"/>
+        <p:cNvPr id="126" name="Shape 126"/>
         <p:cNvGrpSpPr/>
         <p:nvPr/>
       </p:nvGrpSpPr>
@@ -2291,7 +2491,7 @@
       </p:grpSpPr>
       <p:sp>
         <p:nvSpPr>
-          <p:cNvPr id="126" name="Shape 126"/>
+          <p:cNvPr id="127" name="Shape 127"/>
           <p:cNvSpPr txBox="1"/>
           <p:nvPr>
             <p:ph idx="1" type="body"/>
@@ -2331,7 +2531,7 @@
       </p:sp>
       <p:sp>
         <p:nvSpPr>
-          <p:cNvPr id="127" name="Shape 127"/>
+          <p:cNvPr id="128" name="Shape 128"/>
           <p:cNvSpPr/>
           <p:nvPr>
             <p:ph idx="2" type="sldImg"/>
@@ -2376,7 +2576,7 @@
   <p:cSld>
     <p:spTree>
       <p:nvGrpSpPr>
-        <p:cNvPr id="131" name="Shape 131"/>
+        <p:cNvPr id="132" name="Shape 132"/>
         <p:cNvGrpSpPr/>
         <p:nvPr/>
       </p:nvGrpSpPr>
@@ -2390,7 +2590,7 @@
       </p:grpSpPr>
       <p:sp>
         <p:nvSpPr>
-          <p:cNvPr id="132" name="Shape 132"/>
+          <p:cNvPr id="133" name="Shape 133"/>
           <p:cNvSpPr txBox="1"/>
           <p:nvPr>
             <p:ph idx="1" type="body"/>
@@ -2430,7 +2630,7 @@
       </p:sp>
       <p:sp>
         <p:nvSpPr>
-          <p:cNvPr id="133" name="Shape 133"/>
+          <p:cNvPr id="134" name="Shape 134"/>
           <p:cNvSpPr/>
           <p:nvPr>
             <p:ph idx="2" type="sldImg"/>
@@ -2475,7 +2675,7 @@
   <p:cSld>
     <p:spTree>
       <p:nvGrpSpPr>
-        <p:cNvPr id="137" name="Shape 137"/>
+        <p:cNvPr id="138" name="Shape 138"/>
         <p:cNvGrpSpPr/>
         <p:nvPr/>
       </p:nvGrpSpPr>
@@ -2489,7 +2689,7 @@
       </p:grpSpPr>
       <p:sp>
         <p:nvSpPr>
-          <p:cNvPr id="138" name="Shape 138"/>
+          <p:cNvPr id="139" name="Shape 139"/>
           <p:cNvSpPr txBox="1"/>
           <p:nvPr>
             <p:ph idx="1" type="body"/>
@@ -2529,7 +2729,7 @@
       </p:sp>
       <p:sp>
         <p:nvSpPr>
-          <p:cNvPr id="139" name="Shape 139"/>
+          <p:cNvPr id="140" name="Shape 140"/>
           <p:cNvSpPr/>
           <p:nvPr>
             <p:ph idx="2" type="sldImg"/>
@@ -2574,7 +2774,7 @@
   <p:cSld>
     <p:spTree>
       <p:nvGrpSpPr>
-        <p:cNvPr id="142" name="Shape 142"/>
+        <p:cNvPr id="143" name="Shape 143"/>
         <p:cNvGrpSpPr/>
         <p:nvPr/>
       </p:nvGrpSpPr>
@@ -2588,7 +2788,7 @@
       </p:grpSpPr>
       <p:sp>
         <p:nvSpPr>
-          <p:cNvPr id="143" name="Shape 143"/>
+          <p:cNvPr id="144" name="Shape 144"/>
           <p:cNvSpPr txBox="1"/>
           <p:nvPr>
             <p:ph idx="1" type="body"/>
@@ -2640,7 +2840,7 @@
       </p:sp>
       <p:sp>
         <p:nvSpPr>
-          <p:cNvPr id="144" name="Shape 144"/>
+          <p:cNvPr id="145" name="Shape 145"/>
           <p:cNvSpPr/>
           <p:nvPr>
             <p:ph idx="2" type="sldImg"/>
@@ -2685,7 +2885,7 @@
   <p:cSld>
     <p:spTree>
       <p:nvGrpSpPr>
-        <p:cNvPr id="148" name="Shape 148"/>
+        <p:cNvPr id="149" name="Shape 149"/>
         <p:cNvGrpSpPr/>
         <p:nvPr/>
       </p:nvGrpSpPr>
@@ -2699,7 +2899,7 @@
       </p:grpSpPr>
       <p:sp>
         <p:nvSpPr>
-          <p:cNvPr id="149" name="Shape 149"/>
+          <p:cNvPr id="150" name="Shape 150"/>
           <p:cNvSpPr txBox="1"/>
           <p:nvPr>
             <p:ph idx="1" type="body"/>
@@ -2751,7 +2951,7 @@
       </p:sp>
       <p:sp>
         <p:nvSpPr>
-          <p:cNvPr id="150" name="Shape 150"/>
+          <p:cNvPr id="151" name="Shape 151"/>
           <p:cNvSpPr/>
           <p:nvPr>
             <p:ph idx="2" type="sldImg"/>
@@ -2796,7 +2996,7 @@
   <p:cSld>
     <p:spTree>
       <p:nvGrpSpPr>
-        <p:cNvPr id="154" name="Shape 154"/>
+        <p:cNvPr id="155" name="Shape 155"/>
         <p:cNvGrpSpPr/>
         <p:nvPr/>
       </p:nvGrpSpPr>
@@ -2810,7 +3010,7 @@
       </p:grpSpPr>
       <p:sp>
         <p:nvSpPr>
-          <p:cNvPr id="155" name="Shape 155"/>
+          <p:cNvPr id="156" name="Shape 156"/>
           <p:cNvSpPr txBox="1"/>
           <p:nvPr>
             <p:ph idx="1" type="body"/>
@@ -2850,7 +3050,7 @@
       </p:sp>
       <p:sp>
         <p:nvSpPr>
-          <p:cNvPr id="156" name="Shape 156"/>
+          <p:cNvPr id="157" name="Shape 157"/>
           <p:cNvSpPr/>
           <p:nvPr>
             <p:ph idx="2" type="sldImg"/>
@@ -11368,6 +11568,44 @@
           </a:ln>
         </p:spPr>
       </p:pic>
+      <p:sp>
+        <p:nvSpPr>
+          <p:cNvPr id="115" name="Shape 115"/>
+          <p:cNvSpPr txBox="1"/>
+          <p:nvPr/>
+        </p:nvSpPr>
+        <p:spPr>
+          <a:xfrm>
+            <a:off x="160225" y="6393325"/>
+            <a:ext cx="2739900" cy="348000"/>
+          </a:xfrm>
+          <a:prstGeom prst="rect">
+            <a:avLst/>
+          </a:prstGeom>
+          <a:noFill/>
+          <a:ln>
+            <a:noFill/>
+          </a:ln>
+        </p:spPr>
+        <p:txBody>
+          <a:bodyPr anchorCtr="0" anchor="t" bIns="91425" lIns="91425" rIns="91425" tIns="91425">
+            <a:noAutofit/>
+          </a:bodyPr>
+          <a:lstStyle/>
+          <a:p>
+            <a:pPr lvl="0">
+              <a:spcBef>
+                <a:spcPts val="0"/>
+              </a:spcBef>
+              <a:buNone/>
+            </a:pPr>
+            <a:r>
+              <a:rPr lang="en-US"/>
+              <a:t>2016-12-14, by Luís Nabais</a:t>
+            </a:r>
+          </a:p>
+        </p:txBody>
+      </p:sp>
     </p:spTree>
   </p:cSld>
   <p:clrMapOvr>
@@ -11393,7 +11631,7 @@
     </p:bg>
     <p:spTree>
       <p:nvGrpSpPr>
-        <p:cNvPr id="163" name="Shape 163"/>
+        <p:cNvPr id="164" name="Shape 164"/>
         <p:cNvGrpSpPr/>
         <p:nvPr/>
       </p:nvGrpSpPr>
@@ -11407,7 +11645,7 @@
       </p:grpSpPr>
       <p:sp>
         <p:nvSpPr>
-          <p:cNvPr id="164" name="Shape 164"/>
+          <p:cNvPr id="165" name="Shape 165"/>
           <p:cNvSpPr txBox="1"/>
           <p:nvPr/>
         </p:nvSpPr>
@@ -11500,7 +11738,7 @@
       </p:sp>
       <p:sp>
         <p:nvSpPr>
-          <p:cNvPr id="165" name="Shape 165"/>
+          <p:cNvPr id="166" name="Shape 166"/>
           <p:cNvSpPr/>
           <p:nvPr/>
         </p:nvSpPr>
@@ -12234,7 +12472,7 @@
     </p:bg>
     <p:spTree>
       <p:nvGrpSpPr>
-        <p:cNvPr id="169" name="Shape 169"/>
+        <p:cNvPr id="170" name="Shape 170"/>
         <p:cNvGrpSpPr/>
         <p:nvPr/>
       </p:nvGrpSpPr>
@@ -12248,7 +12486,7 @@
       </p:grpSpPr>
       <p:sp>
         <p:nvSpPr>
-          <p:cNvPr id="170" name="Shape 170"/>
+          <p:cNvPr id="171" name="Shape 171"/>
           <p:cNvSpPr txBox="1"/>
           <p:nvPr/>
         </p:nvSpPr>
@@ -12487,7 +12725,7 @@
                 <a:cs typeface="Verdana"/>
                 <a:sym typeface="Verdana"/>
               </a:rPr>
-              <a:t>All bridge connections are created on the host. Example:</a:t>
+              <a:t>All bridge connections are created on the host.</a:t>
             </a:r>
           </a:p>
           <a:p>
@@ -12495,160 +12733,6 @@
               <a:spcBef>
                 <a:spcPts val="0"/>
               </a:spcBef>
-              <a:buSzPct val="25000"/>
-              <a:buNone/>
-            </a:pPr>
-            <a:r>
-              <a:rPr lang="en-US" sz="1800">
-                <a:latin typeface="Verdana"/>
-                <a:ea typeface="Verdana"/>
-                <a:cs typeface="Verdana"/>
-                <a:sym typeface="Verdana"/>
-              </a:rPr>
-              <a:t># ip addr</a:t>
-            </a:r>
-          </a:p>
-          <a:p>
-            <a:pPr indent="-69850" lvl="0" marL="0" marR="0" rtl="0" algn="l">
-              <a:spcBef>
-                <a:spcPts val="0"/>
-              </a:spcBef>
-              <a:buClr>
-                <a:schemeClr val="dk1"/>
-              </a:buClr>
-              <a:buSzPct val="61111"/>
-              <a:buFont typeface="Arial"/>
-              <a:buNone/>
-            </a:pPr>
-            <a:r>
-              <a:rPr lang="en-US" sz="1800">
-                <a:latin typeface="Verdana"/>
-                <a:ea typeface="Verdana"/>
-                <a:cs typeface="Verdana"/>
-                <a:sym typeface="Verdana"/>
-              </a:rPr>
-              <a:t>docker0: &lt;BROADCAST,MULTICAST,UP,LOWER_UP&gt; mtu 1500 qdisc noqueue state UP </a:t>
-            </a:r>
-          </a:p>
-          <a:p>
-            <a:pPr indent="-69850" lvl="0" marL="0" marR="0" rtl="0" algn="l">
-              <a:spcBef>
-                <a:spcPts val="0"/>
-              </a:spcBef>
-              <a:buClr>
-                <a:schemeClr val="dk1"/>
-              </a:buClr>
-              <a:buSzPct val="61111"/>
-              <a:buFont typeface="Arial"/>
-              <a:buNone/>
-            </a:pPr>
-            <a:r>
-              <a:rPr lang="en-US" sz="1800">
-                <a:latin typeface="Verdana"/>
-                <a:ea typeface="Verdana"/>
-                <a:cs typeface="Verdana"/>
-                <a:sym typeface="Verdana"/>
-              </a:rPr>
-              <a:t> link/ether 02:42:ff:ef:a4:f0 brd ff:ff:ff:ff:ff:ff</a:t>
-            </a:r>
-          </a:p>
-          <a:p>
-            <a:pPr indent="-69850" lvl="0" marL="0" marR="0" rtl="0" algn="l">
-              <a:spcBef>
-                <a:spcPts val="0"/>
-              </a:spcBef>
-              <a:buClr>
-                <a:schemeClr val="dk1"/>
-              </a:buClr>
-              <a:buSzPct val="61111"/>
-              <a:buFont typeface="Arial"/>
-              <a:buNone/>
-            </a:pPr>
-            <a:r>
-              <a:rPr lang="en-US" sz="1800">
-                <a:latin typeface="Verdana"/>
-                <a:ea typeface="Verdana"/>
-                <a:cs typeface="Verdana"/>
-                <a:sym typeface="Verdana"/>
-              </a:rPr>
-              <a:t> inet 172.17.0.1/16 scope global docker0</a:t>
-            </a:r>
-          </a:p>
-          <a:p>
-            <a:pPr indent="-69850" lvl="0" marL="0" marR="0" rtl="0" algn="l">
-              <a:spcBef>
-                <a:spcPts val="0"/>
-              </a:spcBef>
-              <a:buClr>
-                <a:schemeClr val="dk1"/>
-              </a:buClr>
-              <a:buSzPct val="61111"/>
-              <a:buFont typeface="Arial"/>
-              <a:buNone/>
-            </a:pPr>
-            <a:r>
-              <a:rPr lang="en-US" sz="1800">
-                <a:latin typeface="Verdana"/>
-                <a:ea typeface="Verdana"/>
-                <a:cs typeface="Verdana"/>
-                <a:sym typeface="Verdana"/>
-              </a:rPr>
-              <a:t>    valid_lft forever preferred_lft forever</a:t>
-            </a:r>
-          </a:p>
-          <a:p>
-            <a:pPr indent="-69850" lvl="0" marL="0" marR="0" rtl="0" algn="l">
-              <a:spcBef>
-                <a:spcPts val="0"/>
-              </a:spcBef>
-              <a:buClr>
-                <a:schemeClr val="dk1"/>
-              </a:buClr>
-              <a:buSzPct val="61111"/>
-              <a:buFont typeface="Arial"/>
-              <a:buNone/>
-            </a:pPr>
-            <a:r>
-              <a:rPr lang="en-US" sz="1800">
-                <a:latin typeface="Verdana"/>
-                <a:ea typeface="Verdana"/>
-                <a:cs typeface="Verdana"/>
-                <a:sym typeface="Verdana"/>
-              </a:rPr>
-              <a:t> inet6 fe80::42:ffff:feef:a4f0/64 scope link </a:t>
-            </a:r>
-          </a:p>
-          <a:p>
-            <a:pPr indent="-69850" lvl="0" marL="0" marR="0" rtl="0" algn="l">
-              <a:spcBef>
-                <a:spcPts val="0"/>
-              </a:spcBef>
-              <a:buClr>
-                <a:schemeClr val="dk1"/>
-              </a:buClr>
-              <a:buSzPct val="61111"/>
-              <a:buFont typeface="Arial"/>
-              <a:buNone/>
-            </a:pPr>
-            <a:r>
-              <a:rPr lang="en-US" sz="1800">
-                <a:latin typeface="Verdana"/>
-                <a:ea typeface="Verdana"/>
-                <a:cs typeface="Verdana"/>
-                <a:sym typeface="Verdana"/>
-              </a:rPr>
-              <a:t>    valid_lft forever preferred_lft forever</a:t>
-            </a:r>
-          </a:p>
-          <a:p>
-            <a:pPr indent="-69850" lvl="0" marL="0" marR="0" rtl="0" algn="l">
-              <a:spcBef>
-                <a:spcPts val="0"/>
-              </a:spcBef>
-              <a:buClr>
-                <a:schemeClr val="dk1"/>
-              </a:buClr>
-              <a:buFont typeface="Arial"/>
               <a:buNone/>
             </a:pPr>
             <a:r>
@@ -12666,6 +12750,23 @@
               <a:spcBef>
                 <a:spcPts val="0"/>
               </a:spcBef>
+              <a:buNone/>
+            </a:pPr>
+            <a:r>
+              <a:t/>
+            </a:r>
+            <a:endParaRPr sz="1800">
+              <a:latin typeface="Verdana"/>
+              <a:ea typeface="Verdana"/>
+              <a:cs typeface="Verdana"/>
+              <a:sym typeface="Verdana"/>
+            </a:endParaRPr>
+          </a:p>
+          <a:p>
+            <a:pPr indent="0" lvl="0" marL="0" marR="0" rtl="0" algn="l">
+              <a:spcBef>
+                <a:spcPts val="0"/>
+              </a:spcBef>
               <a:buSzPct val="25000"/>
               <a:buNone/>
             </a:pPr>
@@ -12694,7 +12795,16 @@
                 <a:cs typeface="Verdana"/>
                 <a:sym typeface="Verdana"/>
               </a:rPr>
-              <a:t># docker network inspect bridge</a:t>
+              <a:t># docker network inspect </a:t>
+            </a:r>
+            <a:r>
+              <a:rPr i="1" lang="en-US" sz="1800">
+                <a:latin typeface="Verdana"/>
+                <a:ea typeface="Verdana"/>
+                <a:cs typeface="Verdana"/>
+                <a:sym typeface="Verdana"/>
+              </a:rPr>
+              <a:t>bridge</a:t>
             </a:r>
           </a:p>
         </p:txBody>
@@ -12724,7 +12834,7 @@
     </p:bg>
     <p:spTree>
       <p:nvGrpSpPr>
-        <p:cNvPr id="174" name="Shape 174"/>
+        <p:cNvPr id="175" name="Shape 175"/>
         <p:cNvGrpSpPr/>
         <p:nvPr/>
       </p:nvGrpSpPr>
@@ -12738,7 +12848,7 @@
       </p:grpSpPr>
       <p:sp>
         <p:nvSpPr>
-          <p:cNvPr id="175" name="Shape 175"/>
+          <p:cNvPr id="176" name="Shape 176"/>
           <p:cNvSpPr txBox="1"/>
           <p:nvPr/>
         </p:nvSpPr>
@@ -12810,6 +12920,121 @@
                 <a:cs typeface="Verdana"/>
                 <a:sym typeface="Verdana"/>
               </a:rPr>
+              <a:t>Network drivers</a:t>
+            </a:r>
+          </a:p>
+          <a:p>
+            <a:pPr indent="-69850" lvl="0" marL="0" marR="0" rtl="0" algn="l">
+              <a:spcBef>
+                <a:spcPts val="0"/>
+              </a:spcBef>
+              <a:buClr>
+                <a:schemeClr val="dk1"/>
+              </a:buClr>
+              <a:buSzPct val="61111"/>
+              <a:buFont typeface="Arial"/>
+              <a:buNone/>
+            </a:pPr>
+            <a:r>
+              <a:rPr lang="en-US" sz="1800">
+                <a:latin typeface="Verdana"/>
+                <a:ea typeface="Verdana"/>
+                <a:cs typeface="Verdana"/>
+                <a:sym typeface="Verdana"/>
+              </a:rPr>
+              <a:t>The </a:t>
+            </a:r>
+            <a:r>
+              <a:rPr i="1" lang="en-US" sz="1800">
+                <a:latin typeface="Verdana"/>
+                <a:ea typeface="Verdana"/>
+                <a:cs typeface="Verdana"/>
+                <a:sym typeface="Verdana"/>
+              </a:rPr>
+              <a:t>bridge</a:t>
+            </a:r>
+            <a:r>
+              <a:rPr lang="en-US" sz="1800">
+                <a:latin typeface="Verdana"/>
+                <a:ea typeface="Verdana"/>
+                <a:cs typeface="Verdana"/>
+                <a:sym typeface="Verdana"/>
+              </a:rPr>
+              <a:t> driver is the default. It allows port exposure, port binding, and linking containers.</a:t>
+            </a:r>
+          </a:p>
+          <a:p>
+            <a:pPr indent="-69850" lvl="0" marL="0" marR="0" rtl="0" algn="l">
+              <a:spcBef>
+                <a:spcPts val="0"/>
+              </a:spcBef>
+              <a:buClr>
+                <a:schemeClr val="dk1"/>
+              </a:buClr>
+              <a:buSzPct val="61111"/>
+              <a:buFont typeface="Arial"/>
+              <a:buNone/>
+            </a:pPr>
+            <a:r>
+              <a:rPr lang="en-US" sz="1800">
+                <a:latin typeface="Verdana"/>
+                <a:ea typeface="Verdana"/>
+                <a:cs typeface="Verdana"/>
+                <a:sym typeface="Verdana"/>
+              </a:rPr>
+              <a:t>The </a:t>
+            </a:r>
+            <a:r>
+              <a:rPr i="1" lang="en-US" sz="1800">
+                <a:latin typeface="Verdana"/>
+                <a:ea typeface="Verdana"/>
+                <a:cs typeface="Verdana"/>
+                <a:sym typeface="Verdana"/>
+              </a:rPr>
+              <a:t>overlay</a:t>
+            </a:r>
+            <a:r>
+              <a:rPr lang="en-US" sz="1800">
+                <a:latin typeface="Verdana"/>
+                <a:ea typeface="Verdana"/>
+                <a:cs typeface="Verdana"/>
+                <a:sym typeface="Verdana"/>
+              </a:rPr>
+              <a:t> driver allows multi-host networking. It’s used in Docker Swarm.</a:t>
+            </a:r>
+          </a:p>
+          <a:p>
+            <a:pPr indent="0" lvl="0" marL="0" marR="0" rtl="0" algn="l">
+              <a:spcBef>
+                <a:spcPts val="0"/>
+              </a:spcBef>
+              <a:buNone/>
+            </a:pPr>
+            <a:r>
+              <a:t/>
+            </a:r>
+            <a:endParaRPr b="1" sz="1800">
+              <a:latin typeface="Verdana"/>
+              <a:ea typeface="Verdana"/>
+              <a:cs typeface="Verdana"/>
+              <a:sym typeface="Verdana"/>
+            </a:endParaRPr>
+          </a:p>
+          <a:p>
+            <a:pPr indent="0" lvl="0" marL="0" marR="0" rtl="0" algn="l">
+              <a:spcBef>
+                <a:spcPts val="0"/>
+              </a:spcBef>
+              <a:buSzPct val="25000"/>
+              <a:buNone/>
+            </a:pPr>
+            <a:r>
+              <a:rPr b="1" lang="en-US" sz="1800">
+                <a:latin typeface="Verdana"/>
+                <a:ea typeface="Verdana"/>
+                <a:cs typeface="Verdana"/>
+                <a:sym typeface="Verdana"/>
+              </a:rPr>
               <a:t>User-defined Networks</a:t>
             </a:r>
           </a:p>
@@ -12863,7 +13088,7 @@
                 <a:cs typeface="Verdana"/>
                 <a:sym typeface="Verdana"/>
               </a:rPr>
-              <a:t>The default driver bridge, so the option is not needed in the command.</a:t>
+              <a:t>As bridge is the default driver, the option is not needed in the command.</a:t>
             </a:r>
           </a:p>
           <a:p>
@@ -12938,6 +13163,47 @@
                 <a:sym typeface="Verdana"/>
               </a:rPr>
               <a:t># docker network create &lt;network_name&gt;</a:t>
+            </a:r>
+          </a:p>
+          <a:p>
+            <a:pPr lvl="0" rtl="0">
+              <a:spcBef>
+                <a:spcPts val="0"/>
+              </a:spcBef>
+              <a:buNone/>
+            </a:pPr>
+            <a:r>
+              <a:t/>
+            </a:r>
+            <a:endParaRPr b="1" sz="1800">
+              <a:solidFill>
+                <a:schemeClr val="dk1"/>
+              </a:solidFill>
+              <a:latin typeface="Verdana"/>
+              <a:ea typeface="Verdana"/>
+              <a:cs typeface="Verdana"/>
+              <a:sym typeface="Verdana"/>
+            </a:endParaRPr>
+          </a:p>
+          <a:p>
+            <a:pPr lvl="0" rtl="0">
+              <a:spcBef>
+                <a:spcPts val="0"/>
+              </a:spcBef>
+              <a:buSzPct val="25000"/>
+              <a:buNone/>
+            </a:pPr>
+            <a:r>
+              <a:rPr lang="en-US" sz="1800">
+                <a:solidFill>
+                  <a:schemeClr val="dk1"/>
+                </a:solidFill>
+                <a:latin typeface="Verdana"/>
+                <a:ea typeface="Verdana"/>
+                <a:cs typeface="Verdana"/>
+                <a:sym typeface="Verdana"/>
+              </a:rPr>
+              <a:t>List and inspect the networks afterwards.</a:t>
             </a:r>
           </a:p>
           <a:p>
@@ -12978,67 +13244,6 @@
                 <a:cs typeface="Verdana"/>
                 <a:sym typeface="Verdana"/>
               </a:rPr>
-              <a:t>List and inspect the networks afterwards.</a:t>
-            </a:r>
-          </a:p>
-          <a:p>
-            <a:pPr lvl="0" rtl="0">
-              <a:spcBef>
-                <a:spcPts val="0"/>
-              </a:spcBef>
-              <a:buNone/>
-            </a:pPr>
-            <a:r>
-              <a:t/>
-            </a:r>
-            <a:endParaRPr sz="1800">
-              <a:solidFill>
-                <a:schemeClr val="dk1"/>
-              </a:solidFill>
-              <a:latin typeface="Verdana"/>
-              <a:ea typeface="Verdana"/>
-              <a:cs typeface="Verdana"/>
-              <a:sym typeface="Verdana"/>
-            </a:endParaRPr>
-          </a:p>
-          <a:p>
-            <a:pPr lvl="0" rtl="0">
-              <a:spcBef>
-                <a:spcPts val="0"/>
-              </a:spcBef>
-              <a:buNone/>
-            </a:pPr>
-            <a:r>
-              <a:t/>
-            </a:r>
-            <a:endParaRPr sz="1800">
-              <a:solidFill>
-                <a:schemeClr val="dk1"/>
-              </a:solidFill>
-              <a:latin typeface="Verdana"/>
-              <a:ea typeface="Verdana"/>
-              <a:cs typeface="Verdana"/>
-              <a:sym typeface="Verdana"/>
-            </a:endParaRPr>
-          </a:p>
-          <a:p>
-            <a:pPr lvl="0" rtl="0">
-              <a:spcBef>
-                <a:spcPts val="0"/>
-              </a:spcBef>
-              <a:buSzPct val="25000"/>
-              <a:buNone/>
-            </a:pPr>
-            <a:r>
-              <a:rPr lang="en-US" sz="1800">
-                <a:solidFill>
-                  <a:schemeClr val="dk1"/>
-                </a:solidFill>
-                <a:latin typeface="Verdana"/>
-                <a:ea typeface="Verdana"/>
-                <a:cs typeface="Verdana"/>
-                <a:sym typeface="Verdana"/>
-              </a:rPr>
               <a:t>When containers are created, can be associated with the networks,</a:t>
             </a:r>
           </a:p>
@@ -13071,7 +13276,7 @@
       </p:sp>
       <p:pic>
         <p:nvPicPr>
-          <p:cNvPr descr="An isolated network" id="176" name="Shape 176"/>
+          <p:cNvPr descr="An isolated network" id="177" name="Shape 177"/>
           <p:cNvPicPr preferRelativeResize="0"/>
           <p:nvPr/>
         </p:nvPicPr>
@@ -13085,7 +13290,7 @@
         </p:blipFill>
         <p:spPr>
           <a:xfrm>
-            <a:off x="7810300" y="2214550"/>
+            <a:off x="8158700" y="3233250"/>
             <a:ext cx="3790950" cy="2428875"/>
           </a:xfrm>
           <a:prstGeom prst="rect">
@@ -13122,7 +13327,7 @@
     </p:bg>
     <p:spTree>
       <p:nvGrpSpPr>
-        <p:cNvPr id="180" name="Shape 180"/>
+        <p:cNvPr id="181" name="Shape 181"/>
         <p:cNvGrpSpPr/>
         <p:nvPr/>
       </p:nvGrpSpPr>
@@ -13136,7 +13341,7 @@
       </p:grpSpPr>
       <p:sp>
         <p:nvSpPr>
-          <p:cNvPr id="181" name="Shape 181"/>
+          <p:cNvPr id="182" name="Shape 182"/>
           <p:cNvSpPr txBox="1"/>
           <p:nvPr/>
         </p:nvSpPr>
@@ -13211,7 +13416,7 @@
                 <a:cs typeface="Verdana"/>
                 <a:sym typeface="Verdana"/>
               </a:rPr>
-              <a:t>What are data volumes?</a:t>
+              <a:t>What are volumes?</a:t>
             </a:r>
           </a:p>
           <a:p>
@@ -13229,7 +13434,7 @@
                 <a:cs typeface="Verdana"/>
                 <a:sym typeface="Verdana"/>
               </a:rPr>
-              <a:t>A data volume is a specially-designated directory within one or more containers that bypasses the Union File System. Data volumes provide several useful features for persistent or shared data:</a:t>
+              <a:t>A volume is a specially-designated directory within one or more containers that bypasses the Union File System. Provide several useful features for persistent or shared data:</a:t>
             </a:r>
           </a:p>
           <a:p>
@@ -13248,7 +13453,7 @@
                 <a:cs typeface="Verdana"/>
                 <a:sym typeface="Verdana"/>
               </a:rPr>
-              <a:t>Data volumes can be shared and reused among containers.</a:t>
+              <a:t>Can be shared and reused among containers.</a:t>
             </a:r>
           </a:p>
           <a:p>
@@ -13267,7 +13472,7 @@
                 <a:cs typeface="Verdana"/>
                 <a:sym typeface="Verdana"/>
               </a:rPr>
-              <a:t>Changes to a data volume are made directly.</a:t>
+              <a:t>Changes will not be included when and image is updated.</a:t>
             </a:r>
           </a:p>
           <a:p>
@@ -13286,26 +13491,7 @@
                 <a:cs typeface="Verdana"/>
                 <a:sym typeface="Verdana"/>
               </a:rPr>
-              <a:t>Changes to a data volume will not be included when and image is updated.</a:t>
-            </a:r>
-          </a:p>
-          <a:p>
-            <a:pPr indent="-342900" lvl="0" marL="457200" marR="0" rtl="0" algn="l">
-              <a:spcBef>
-                <a:spcPts val="0"/>
-              </a:spcBef>
-              <a:buSzPct val="100000"/>
-              <a:buFont typeface="Verdana"/>
-              <a:buChar char="●"/>
-            </a:pPr>
-            <a:r>
-              <a:rPr lang="en-US" sz="1800">
-                <a:latin typeface="Verdana"/>
-                <a:ea typeface="Verdana"/>
-                <a:cs typeface="Verdana"/>
-                <a:sym typeface="Verdana"/>
-              </a:rPr>
-              <a:t>Data volumes persist even if the container itself is deleted.</a:t>
+              <a:t>Persist even if the container itself is deleted.</a:t>
             </a:r>
           </a:p>
           <a:p>
@@ -13340,7 +13526,7 @@
                 <a:cs typeface="Verdana"/>
                 <a:sym typeface="Verdana"/>
               </a:rPr>
-              <a:t>Data volumes are designed to persist data, independent of the container’s life cycle. Docker therefore never automatically deletes volumes when you remove a container, nor will it “garbage collect” volumes that are no longer referenced by a container.</a:t>
+              <a:t>Docker never automatically deletes volumes when you remove a container, nor will it “garbage collect” volumes that are no longer referenced by a container.</a:t>
             </a:r>
           </a:p>
           <a:p>
@@ -13375,7 +13561,7 @@
                 <a:cs typeface="Verdana"/>
                 <a:sym typeface="Verdana"/>
               </a:rPr>
-              <a:t>Listing data volumes</a:t>
+              <a:t>Listing volumes</a:t>
             </a:r>
           </a:p>
           <a:p>
@@ -13428,7 +13614,7 @@
                 <a:cs typeface="Verdana"/>
                 <a:sym typeface="Verdana"/>
               </a:rPr>
-              <a:t>Creating data volumes</a:t>
+              <a:t>Creating volumes</a:t>
             </a:r>
           </a:p>
           <a:p>
@@ -13499,7 +13685,51 @@
                 <a:cs typeface="Verdana"/>
                 <a:sym typeface="Verdana"/>
               </a:rPr>
-              <a:t>Data Volumes can be assigned to containers during container creation, using -v flag.</a:t>
+              <a:t>Can be assigned to containers during container creation, using -v flag.</a:t>
+            </a:r>
+            <a:br>
+              <a:rPr lang="en-US" sz="1800">
+                <a:latin typeface="Verdana"/>
+                <a:ea typeface="Verdana"/>
+                <a:cs typeface="Verdana"/>
+                <a:sym typeface="Verdana"/>
+              </a:rPr>
+            </a:br>
+            <a:r>
+              <a:rPr lang="en-US" sz="1800">
+                <a:latin typeface="Verdana"/>
+                <a:ea typeface="Verdana"/>
+                <a:cs typeface="Verdana"/>
+                <a:sym typeface="Verdana"/>
+              </a:rPr>
+              <a:t>docker run … -v </a:t>
+            </a:r>
+            <a:r>
+              <a:rPr i="1" lang="en-US" sz="1800">
+                <a:latin typeface="Verdana"/>
+                <a:ea typeface="Verdana"/>
+                <a:cs typeface="Verdana"/>
+                <a:sym typeface="Verdana"/>
+              </a:rPr>
+              <a:t>path_or_name</a:t>
+            </a:r>
+            <a:r>
+              <a:rPr lang="en-US" sz="1800">
+                <a:latin typeface="Verdana"/>
+                <a:ea typeface="Verdana"/>
+                <a:cs typeface="Verdana"/>
+                <a:sym typeface="Verdana"/>
+              </a:rPr>
+              <a:t>:</a:t>
+            </a:r>
+            <a:r>
+              <a:rPr i="1" lang="en-US" sz="1800">
+                <a:latin typeface="Verdana"/>
+                <a:ea typeface="Verdana"/>
+                <a:cs typeface="Verdana"/>
+                <a:sym typeface="Verdana"/>
+              </a:rPr>
+              <a:t>container_destination ...</a:t>
             </a:r>
           </a:p>
         </p:txBody>
@@ -13529,7 +13759,7 @@
     </p:bg>
     <p:spTree>
       <p:nvGrpSpPr>
-        <p:cNvPr id="185" name="Shape 185"/>
+        <p:cNvPr id="186" name="Shape 186"/>
         <p:cNvGrpSpPr/>
         <p:nvPr/>
       </p:nvGrpSpPr>
@@ -13543,7 +13773,7 @@
       </p:grpSpPr>
       <p:sp>
         <p:nvSpPr>
-          <p:cNvPr id="186" name="Shape 186"/>
+          <p:cNvPr id="187" name="Shape 187"/>
           <p:cNvSpPr txBox="1"/>
           <p:nvPr/>
         </p:nvSpPr>
@@ -13708,7 +13938,7 @@
                 <a:cs typeface="Verdana"/>
                 <a:sym typeface="Verdana"/>
               </a:rPr>
-              <a:t>DB data will be kept in volume</a:t>
+              <a:t>Database data will be kept in volume</a:t>
             </a:r>
           </a:p>
           <a:p>
@@ -13727,7 +13957,7 @@
                 <a:cs typeface="Verdana"/>
                 <a:sym typeface="Verdana"/>
               </a:rPr>
-              <a:t>Scale Wordpress, using a Load balancer</a:t>
+              <a:t>Scale Wordpress, using a Load balancer (PoC)</a:t>
             </a:r>
           </a:p>
           <a:p>
@@ -13746,7 +13976,7 @@
                 <a:cs typeface="Verdana"/>
                 <a:sym typeface="Verdana"/>
               </a:rPr>
-              <a:t>Upgrade Wordpress, using Blue/Green Deployment</a:t>
+              <a:t>Upgrade Wordpress, using Blue/Green Deployment (PoC)</a:t>
             </a:r>
           </a:p>
           <a:p>
@@ -13765,6 +13995,32 @@
               <a:cs typeface="Verdana"/>
               <a:sym typeface="Verdana"/>
             </a:endParaRPr>
+          </a:p>
+          <a:p>
+            <a:pPr lvl="0" marR="0" rtl="0" algn="l">
+              <a:spcBef>
+                <a:spcPts val="0"/>
+              </a:spcBef>
+              <a:buNone/>
+            </a:pPr>
+            <a:r>
+              <a:rPr b="1" lang="en-US" sz="1800">
+                <a:latin typeface="Verdana"/>
+                <a:ea typeface="Verdana"/>
+                <a:cs typeface="Verdana"/>
+                <a:sym typeface="Verdana"/>
+              </a:rPr>
+              <a:t>NOTE: </a:t>
+            </a:r>
+            <a:r>
+              <a:rPr lang="en-US" sz="1800">
+                <a:latin typeface="Verdana"/>
+                <a:ea typeface="Verdana"/>
+                <a:cs typeface="Verdana"/>
+                <a:sym typeface="Verdana"/>
+              </a:rPr>
+              <a:t>We will create an environment for Development and Testing (QA), not for Staging/Production</a:t>
+            </a:r>
           </a:p>
         </p:txBody>
       </p:sp>
@@ -13793,7 +14049,7 @@
     </p:bg>
     <p:spTree>
       <p:nvGrpSpPr>
-        <p:cNvPr id="190" name="Shape 190"/>
+        <p:cNvPr id="191" name="Shape 191"/>
         <p:cNvGrpSpPr/>
         <p:nvPr/>
       </p:nvGrpSpPr>
@@ -13807,7 +14063,7 @@
       </p:grpSpPr>
       <p:sp>
         <p:nvSpPr>
-          <p:cNvPr id="191" name="Shape 191"/>
+          <p:cNvPr id="192" name="Shape 192"/>
           <p:cNvSpPr txBox="1"/>
           <p:nvPr/>
         </p:nvSpPr>
@@ -13944,57 +14200,6 @@
                 <a:hlinkClick r:id="rId5"/>
               </a:rPr>
               <a:t>https://wordpress.org/wordpress-4.6.1.tar.gz</a:t>
-            </a:r>
-          </a:p>
-          <a:p>
-            <a:pPr lvl="0" marR="0" rtl="0" algn="l">
-              <a:spcBef>
-                <a:spcPts val="0"/>
-              </a:spcBef>
-              <a:buNone/>
-            </a:pPr>
-            <a:r>
-              <a:t/>
-            </a:r>
-            <a:endParaRPr b="1" sz="1800">
-              <a:latin typeface="Verdana"/>
-              <a:ea typeface="Verdana"/>
-              <a:cs typeface="Verdana"/>
-              <a:sym typeface="Verdana"/>
-            </a:endParaRPr>
-          </a:p>
-          <a:p>
-            <a:pPr lvl="0" marR="0" rtl="0" algn="l">
-              <a:spcBef>
-                <a:spcPts val="0"/>
-              </a:spcBef>
-              <a:buNone/>
-            </a:pPr>
-            <a:r>
-              <a:rPr b="1" lang="en-US" sz="1800">
-                <a:latin typeface="Verdana"/>
-                <a:ea typeface="Verdana"/>
-                <a:cs typeface="Verdana"/>
-                <a:sym typeface="Verdana"/>
-              </a:rPr>
-              <a:t>Organize Project in folders</a:t>
-            </a:r>
-          </a:p>
-          <a:p>
-            <a:pPr lvl="0" marR="0" rtl="0" algn="l">
-              <a:spcBef>
-                <a:spcPts val="0"/>
-              </a:spcBef>
-              <a:buNone/>
-            </a:pPr>
-            <a:r>
-              <a:rPr lang="en-US" sz="1800">
-                <a:latin typeface="Verdana"/>
-                <a:ea typeface="Verdana"/>
-                <a:cs typeface="Verdana"/>
-                <a:sym typeface="Verdana"/>
-              </a:rPr>
-              <a:t>mkdir web_server database load_balancer registry</a:t>
             </a:r>
           </a:p>
           <a:p>
@@ -14126,7 +14331,7 @@
     </p:bg>
     <p:spTree>
       <p:nvGrpSpPr>
-        <p:cNvPr id="195" name="Shape 195"/>
+        <p:cNvPr id="196" name="Shape 196"/>
         <p:cNvGrpSpPr/>
         <p:nvPr/>
       </p:nvGrpSpPr>
@@ -14140,7 +14345,7 @@
       </p:grpSpPr>
       <p:sp>
         <p:nvSpPr>
-          <p:cNvPr id="196" name="Shape 196"/>
+          <p:cNvPr id="197" name="Shape 197"/>
           <p:cNvSpPr txBox="1"/>
           <p:nvPr/>
         </p:nvSpPr>
@@ -14460,7 +14665,7 @@
                 <a:cs typeface="Verdana"/>
                 <a:sym typeface="Verdana"/>
               </a:rPr>
-              <a:t>The container will automatically use the created network and volume.</a:t>
+              <a:t>The root password is general, not associated with any project, as MariaDB server can be used for multiple projects/databases.</a:t>
             </a:r>
           </a:p>
           <a:p>
@@ -14477,24 +14682,7 @@
                 <a:cs typeface="Verdana"/>
                 <a:sym typeface="Verdana"/>
               </a:rPr>
-              <a:t>The root password is defined in a global way, as the MariaDB server can be used for more projects/databases.</a:t>
-            </a:r>
-          </a:p>
-          <a:p>
-            <a:pPr lvl="0" marR="0" rtl="0" algn="l">
-              <a:spcBef>
-                <a:spcPts val="0"/>
-              </a:spcBef>
-              <a:buNone/>
-            </a:pPr>
-            <a:r>
-              <a:rPr lang="en-US" sz="1800">
-                <a:latin typeface="Verdana"/>
-                <a:ea typeface="Verdana"/>
-                <a:cs typeface="Verdana"/>
-                <a:sym typeface="Verdana"/>
-              </a:rPr>
-              <a:t>The other variables are to create a new database and define a user and password associated with it.</a:t>
+              <a:t>The other variables are used to create a new database and define a user/password pair associated.</a:t>
             </a:r>
           </a:p>
         </p:txBody>
@@ -14524,7 +14712,7 @@
     </p:bg>
     <p:spTree>
       <p:nvGrpSpPr>
-        <p:cNvPr id="200" name="Shape 200"/>
+        <p:cNvPr id="201" name="Shape 201"/>
         <p:cNvGrpSpPr/>
         <p:nvPr/>
       </p:nvGrpSpPr>
@@ -14538,7 +14726,7 @@
       </p:grpSpPr>
       <p:sp>
         <p:nvSpPr>
-          <p:cNvPr id="201" name="Shape 201"/>
+          <p:cNvPr id="202" name="Shape 202"/>
           <p:cNvSpPr/>
           <p:nvPr/>
         </p:nvSpPr>
@@ -14584,7 +14772,7 @@
       </p:sp>
       <p:sp>
         <p:nvSpPr>
-          <p:cNvPr id="202" name="Shape 202"/>
+          <p:cNvPr id="203" name="Shape 203"/>
           <p:cNvSpPr txBox="1"/>
           <p:nvPr/>
         </p:nvSpPr>
@@ -14998,7 +15186,16 @@
                 <a:cs typeface="Verdana"/>
                 <a:sym typeface="Verdana"/>
               </a:rPr>
-              <a:t> files/entrypoint.sh /opt/utils/</a:t>
+              <a:t> </a:t>
+            </a:r>
+            <a:r>
+              <a:rPr lang="en-US">
+                <a:latin typeface="Verdana"/>
+                <a:ea typeface="Verdana"/>
+                <a:cs typeface="Verdana"/>
+                <a:sym typeface="Verdana"/>
+              </a:rPr>
+              <a:t>entrypoint.sh /opt/utils/</a:t>
             </a:r>
           </a:p>
           <a:p>
@@ -15024,7 +15221,16 @@
                 <a:cs typeface="Verdana"/>
                 <a:sym typeface="Verdana"/>
               </a:rPr>
-              <a:t> files/wordpress-${WORDPRESS_VERSION}.tar.gz /app/</a:t>
+              <a:t> </a:t>
+            </a:r>
+            <a:r>
+              <a:rPr lang="en-US">
+                <a:latin typeface="Verdana"/>
+                <a:ea typeface="Verdana"/>
+                <a:cs typeface="Verdana"/>
+                <a:sym typeface="Verdana"/>
+              </a:rPr>
+              <a:t>wordpress-${WORDPRESS_VERSION}.tar.gz /app/</a:t>
             </a:r>
           </a:p>
           <a:p>
@@ -15140,7 +15346,7 @@
     </p:bg>
     <p:spTree>
       <p:nvGrpSpPr>
-        <p:cNvPr id="206" name="Shape 206"/>
+        <p:cNvPr id="207" name="Shape 207"/>
         <p:cNvGrpSpPr/>
         <p:nvPr/>
       </p:nvGrpSpPr>
@@ -15154,7 +15360,7 @@
       </p:grpSpPr>
       <p:sp>
         <p:nvSpPr>
-          <p:cNvPr id="207" name="Shape 207"/>
+          <p:cNvPr id="208" name="Shape 208"/>
           <p:cNvSpPr txBox="1"/>
           <p:nvPr/>
         </p:nvSpPr>
@@ -15461,7 +15667,7 @@
                 <a:cs typeface="Verdana"/>
                 <a:sym typeface="Verdana"/>
               </a:rPr>
-              <a:t>-p $EXTERNAL_PORT:80 \</a:t>
+              <a:t>-p 8001:80 \</a:t>
             </a:r>
           </a:p>
           <a:p>
@@ -15679,7 +15885,7 @@
     </p:bg>
     <p:spTree>
       <p:nvGrpSpPr>
-        <p:cNvPr id="211" name="Shape 211"/>
+        <p:cNvPr id="212" name="Shape 212"/>
         <p:cNvGrpSpPr/>
         <p:nvPr/>
       </p:nvGrpSpPr>
@@ -15693,7 +15899,7 @@
       </p:grpSpPr>
       <p:sp>
         <p:nvSpPr>
-          <p:cNvPr id="212" name="Shape 212"/>
+          <p:cNvPr id="213" name="Shape 213"/>
           <p:cNvSpPr txBox="1"/>
           <p:nvPr/>
         </p:nvSpPr>
@@ -16024,7 +16230,7 @@
     </p:bg>
     <p:spTree>
       <p:nvGrpSpPr>
-        <p:cNvPr id="118" name="Shape 118"/>
+        <p:cNvPr id="119" name="Shape 119"/>
         <p:cNvGrpSpPr/>
         <p:nvPr/>
       </p:nvGrpSpPr>
@@ -16038,7 +16244,7 @@
       </p:grpSpPr>
       <p:sp>
         <p:nvSpPr>
-          <p:cNvPr id="119" name="Shape 119"/>
+          <p:cNvPr id="120" name="Shape 120"/>
           <p:cNvSpPr txBox="1"/>
           <p:nvPr/>
         </p:nvSpPr>
@@ -16494,7 +16700,7 @@
     </p:bg>
     <p:spTree>
       <p:nvGrpSpPr>
-        <p:cNvPr id="216" name="Shape 216"/>
+        <p:cNvPr id="217" name="Shape 217"/>
         <p:cNvGrpSpPr/>
         <p:nvPr/>
       </p:nvGrpSpPr>
@@ -16508,7 +16714,7 @@
       </p:grpSpPr>
       <p:sp>
         <p:nvSpPr>
-          <p:cNvPr id="217" name="Shape 217"/>
+          <p:cNvPr id="218" name="Shape 218"/>
           <p:cNvSpPr txBox="1"/>
           <p:nvPr/>
         </p:nvSpPr>
@@ -16596,7 +16802,7 @@
                 <a:cs typeface="Verdana"/>
                 <a:sym typeface="Verdana"/>
               </a:rPr>
-              <a:t>Rename the first container, run the container again with a new name. Use different external ports, with a load balancer to redirect to one or the other (ex: HAProxy or NGINX)</a:t>
+              <a:t>Rename the first container, run a new container, with a new name. Use different external ports, with a load balancer to redirect to one or the other (ex: HAProxy or NGINX)</a:t>
             </a:r>
           </a:p>
           <a:p>
@@ -16872,7 +17078,7 @@
     </p:bg>
     <p:spTree>
       <p:nvGrpSpPr>
-        <p:cNvPr id="221" name="Shape 221"/>
+        <p:cNvPr id="222" name="Shape 222"/>
         <p:cNvGrpSpPr/>
         <p:nvPr/>
       </p:nvGrpSpPr>
@@ -16886,7 +17092,7 @@
       </p:grpSpPr>
       <p:sp>
         <p:nvSpPr>
-          <p:cNvPr id="222" name="Shape 222"/>
+          <p:cNvPr id="223" name="Shape 223"/>
           <p:cNvSpPr txBox="1"/>
           <p:nvPr/>
         </p:nvSpPr>
@@ -17183,7 +17389,7 @@
     </p:bg>
     <p:spTree>
       <p:nvGrpSpPr>
-        <p:cNvPr id="226" name="Shape 226"/>
+        <p:cNvPr id="227" name="Shape 227"/>
         <p:cNvGrpSpPr/>
         <p:nvPr/>
       </p:nvGrpSpPr>
@@ -17197,7 +17403,7 @@
       </p:grpSpPr>
       <p:sp>
         <p:nvSpPr>
-          <p:cNvPr id="227" name="Shape 227"/>
+          <p:cNvPr id="228" name="Shape 228"/>
           <p:cNvSpPr txBox="1"/>
           <p:nvPr/>
         </p:nvSpPr>
@@ -17268,7 +17474,33 @@
                 <a:cs typeface="Verdana"/>
                 <a:sym typeface="Verdana"/>
               </a:rPr>
-              <a:t>As the project is based in MicroServices, the idea is to destroy old containers and replace them with new ones. But if we do that, we will have downtime, from the moment the containers are destroyed until the new ones are created, which can be a huge deal, if there are any issues with the new version.</a:t>
+              <a:t>Containers are disposable.</a:t>
+            </a:r>
+            <a:r>
+              <a:rPr lang="en-US" sz="1800">
+                <a:latin typeface="Verdana"/>
+                <a:ea typeface="Verdana"/>
+                <a:cs typeface="Verdana"/>
+                <a:sym typeface="Verdana"/>
+              </a:rPr>
+              <a:t> When upgrading, the idea is to destroy old containers and replace them with new ones, with the new software versions (new images). But if we do that, we will have downtime, from the moment the containers are destroyed until the new ones are created.</a:t>
+            </a:r>
+            <a:br>
+              <a:rPr lang="en-US" sz="1800">
+                <a:latin typeface="Verdana"/>
+                <a:ea typeface="Verdana"/>
+                <a:cs typeface="Verdana"/>
+                <a:sym typeface="Verdana"/>
+              </a:rPr>
+            </a:br>
+            <a:r>
+              <a:rPr lang="en-US" sz="1800">
+                <a:latin typeface="Verdana"/>
+                <a:ea typeface="Verdana"/>
+                <a:cs typeface="Verdana"/>
+                <a:sym typeface="Verdana"/>
+              </a:rPr>
+              <a:t>That can have undesirable side effects, if issues occur with the new version.</a:t>
             </a:r>
           </a:p>
           <a:p>
@@ -17375,7 +17607,7 @@
                 <a:cs typeface="Verdana"/>
                 <a:sym typeface="Verdana"/>
               </a:rPr>
-              <a:t>Create a new container (or multiple) in a different port (ex: 8003).</a:t>
+              <a:t>Create new containers running in parallel, in different ports (ex: 8003).</a:t>
             </a:r>
           </a:p>
           <a:p>
@@ -17394,7 +17626,7 @@
                 <a:cs typeface="Verdana"/>
                 <a:sym typeface="Verdana"/>
               </a:rPr>
-              <a:t>Test if everything is ok in the new container.</a:t>
+              <a:t>Test if everything is ok in the new containers.</a:t>
             </a:r>
           </a:p>
           <a:p>
@@ -17465,7 +17697,7 @@
                 <a:cs typeface="Verdana"/>
                 <a:sym typeface="Verdana"/>
               </a:rPr>
-              <a:t> (some companies don’t know that’s a reality).</a:t>
+              <a:t> (many companies don’t know that’s a reality).</a:t>
             </a:r>
           </a:p>
         </p:txBody>
@@ -17495,7 +17727,7 @@
     </p:bg>
     <p:spTree>
       <p:nvGrpSpPr>
-        <p:cNvPr id="231" name="Shape 231"/>
+        <p:cNvPr id="232" name="Shape 232"/>
         <p:cNvGrpSpPr/>
         <p:nvPr/>
       </p:nvGrpSpPr>
@@ -17509,14 +17741,14 @@
       </p:grpSpPr>
       <p:sp>
         <p:nvSpPr>
-          <p:cNvPr id="232" name="Shape 232"/>
+          <p:cNvPr id="233" name="Shape 233"/>
           <p:cNvSpPr txBox="1"/>
           <p:nvPr/>
         </p:nvSpPr>
         <p:spPr>
           <a:xfrm>
-            <a:off x="182875" y="183250"/>
-            <a:ext cx="11704200" cy="6055500"/>
+            <a:off x="182875" y="183249"/>
+            <a:ext cx="11704200" cy="6226200"/>
           </a:xfrm>
           <a:prstGeom prst="rect">
             <a:avLst/>
@@ -17580,7 +17812,7 @@
                 <a:cs typeface="Verdana"/>
                 <a:sym typeface="Verdana"/>
               </a:rPr>
-              <a:t>Create a new container (or multiple)</a:t>
+              <a:t>Create new containers</a:t>
             </a:r>
           </a:p>
           <a:p>
@@ -17624,7 +17856,7 @@
                 <a:cs typeface="Verdana"/>
                 <a:sym typeface="Verdana"/>
               </a:rPr>
-              <a:t>--name fm-wordpress-new-1 \</a:t>
+              <a:t>--name fm-wordpress-green \</a:t>
             </a:r>
           </a:p>
           <a:p>
@@ -17863,31 +18095,6 @@
                 <a:sym typeface="Verdana"/>
               </a:rPr>
               <a:t># sed -i 's/8001/8003/g' haproxy.cfg</a:t>
-            </a:r>
-          </a:p>
-          <a:p>
-            <a:pPr lvl="0" rtl="0">
-              <a:spcBef>
-                <a:spcPts val="0"/>
-              </a:spcBef>
-              <a:buClr>
-                <a:schemeClr val="dk1"/>
-              </a:buClr>
-              <a:buSzPct val="61111"/>
-              <a:buFont typeface="Arial"/>
-              <a:buNone/>
-            </a:pPr>
-            <a:r>
-              <a:rPr lang="en-US" sz="1800">
-                <a:solidFill>
-                  <a:schemeClr val="dk1"/>
-                </a:solidFill>
-                <a:latin typeface="Verdana"/>
-                <a:ea typeface="Verdana"/>
-                <a:cs typeface="Verdana"/>
-                <a:sym typeface="Verdana"/>
-              </a:rPr>
-              <a:t># sed -i '/8002/d' haproxy.cfg</a:t>
             </a:r>
           </a:p>
           <a:p>
@@ -17934,7 +18141,7 @@
     </p:bg>
     <p:spTree>
       <p:nvGrpSpPr>
-        <p:cNvPr id="236" name="Shape 236"/>
+        <p:cNvPr id="237" name="Shape 237"/>
         <p:cNvGrpSpPr/>
         <p:nvPr/>
       </p:nvGrpSpPr>
@@ -17948,14 +18155,14 @@
       </p:grpSpPr>
       <p:sp>
         <p:nvSpPr>
-          <p:cNvPr id="237" name="Shape 237"/>
+          <p:cNvPr id="238" name="Shape 238"/>
           <p:cNvSpPr txBox="1"/>
           <p:nvPr/>
         </p:nvSpPr>
         <p:spPr>
           <a:xfrm>
             <a:off x="182875" y="183250"/>
-            <a:ext cx="11704200" cy="6281999"/>
+            <a:ext cx="11704200" cy="6055500"/>
           </a:xfrm>
           <a:prstGeom prst="rect">
             <a:avLst/>
@@ -17979,20 +18186,94 @@
               <a:buNone/>
             </a:pPr>
             <a:r>
-              <a:rPr b="1" lang="en-US" sz="2400" strike="noStrike">
+              <a:rPr b="1" lang="en-US" sz="2400">
+                <a:latin typeface="Verdana"/>
+                <a:ea typeface="Verdana"/>
+                <a:cs typeface="Verdana"/>
+                <a:sym typeface="Verdana"/>
+              </a:rPr>
+              <a:t>Automation - It’s DevOps time</a:t>
+            </a:r>
+          </a:p>
+          <a:p>
+            <a:pPr lvl="0" marR="0" rtl="0" algn="l">
+              <a:spcBef>
+                <a:spcPts val="0"/>
+              </a:spcBef>
+              <a:buNone/>
+            </a:pPr>
+            <a:r>
+              <a:t/>
+            </a:r>
+            <a:endParaRPr b="1" sz="2000">
+              <a:latin typeface="Verdana"/>
+              <a:ea typeface="Verdana"/>
+              <a:cs typeface="Verdana"/>
+              <a:sym typeface="Verdana"/>
+            </a:endParaRPr>
+          </a:p>
+          <a:p>
+            <a:pPr lvl="0">
+              <a:spcBef>
+                <a:spcPts val="0"/>
+              </a:spcBef>
+              <a:buNone/>
+            </a:pPr>
+            <a:r>
+              <a:rPr b="1" lang="en-US" sz="1800">
                 <a:solidFill>
-                  <a:srgbClr val="000000"/>
+                  <a:schemeClr val="dk1"/>
                 </a:solidFill>
                 <a:latin typeface="Verdana"/>
                 <a:ea typeface="Verdana"/>
                 <a:cs typeface="Verdana"/>
                 <a:sym typeface="Verdana"/>
               </a:rPr>
-              <a:t>Where can I get more information?</a:t>
-            </a:r>
-          </a:p>
-          <a:p>
-            <a:pPr indent="0" lvl="0" marL="0" marR="0" rtl="0" algn="l">
+              <a:t>Scripting</a:t>
+            </a:r>
+          </a:p>
+          <a:p>
+            <a:pPr lvl="0">
+              <a:spcBef>
+                <a:spcPts val="0"/>
+              </a:spcBef>
+              <a:buNone/>
+            </a:pPr>
+            <a:r>
+              <a:rPr lang="en-US" sz="1800">
+                <a:solidFill>
+                  <a:schemeClr val="dk1"/>
+                </a:solidFill>
+                <a:latin typeface="Verdana"/>
+                <a:ea typeface="Verdana"/>
+                <a:cs typeface="Verdana"/>
+                <a:sym typeface="Verdana"/>
+              </a:rPr>
+              <a:t>Shell Scripting, Python, or other languages, can be used to automate Docker.</a:t>
+            </a:r>
+          </a:p>
+          <a:p>
+            <a:pPr lvl="0" rtl="0">
+              <a:spcBef>
+                <a:spcPts val="0"/>
+              </a:spcBef>
+              <a:buNone/>
+            </a:pPr>
+            <a:r>
+              <a:rPr lang="en-US" sz="1800">
+                <a:solidFill>
+                  <a:schemeClr val="dk1"/>
+                </a:solidFill>
+                <a:latin typeface="Verdana"/>
+                <a:ea typeface="Verdana"/>
+                <a:cs typeface="Verdana"/>
+                <a:sym typeface="Verdana"/>
+              </a:rPr>
+              <a:t>Scripts to build, run, restart, with command line arguments, variables, or simply checkers/validators in crontab can be used to check status and act on the results.</a:t>
+            </a:r>
+          </a:p>
+          <a:p>
+            <a:pPr lvl="0" rtl="0">
               <a:spcBef>
                 <a:spcPts val="0"/>
               </a:spcBef>
@@ -18001,9 +18282,9 @@
             <a:r>
               <a:t/>
             </a:r>
-            <a:endParaRPr b="0" sz="1800" strike="noStrike">
+            <a:endParaRPr sz="1800">
               <a:solidFill>
-                <a:srgbClr val="000000"/>
+                <a:schemeClr val="dk1"/>
               </a:solidFill>
               <a:latin typeface="Verdana"/>
               <a:ea typeface="Verdana"/>
@@ -18012,7 +18293,47 @@
             </a:endParaRPr>
           </a:p>
           <a:p>
-            <a:pPr indent="0" lvl="0" marL="0" marR="0" rtl="0" algn="l">
+            <a:pPr lvl="0">
+              <a:spcBef>
+                <a:spcPts val="0"/>
+              </a:spcBef>
+              <a:buNone/>
+            </a:pPr>
+            <a:r>
+              <a:rPr b="1" lang="en-US" sz="1800">
+                <a:solidFill>
+                  <a:schemeClr val="dk1"/>
+                </a:solidFill>
+                <a:latin typeface="Verdana"/>
+                <a:ea typeface="Verdana"/>
+                <a:cs typeface="Verdana"/>
+                <a:sym typeface="Verdana"/>
+              </a:rPr>
+              <a:t>CI/CD</a:t>
+            </a:r>
+          </a:p>
+          <a:p>
+            <a:pPr lvl="0" rtl="0">
+              <a:spcBef>
+                <a:spcPts val="0"/>
+              </a:spcBef>
+              <a:buNone/>
+            </a:pPr>
+            <a:r>
+              <a:rPr lang="en-US" sz="1800">
+                <a:solidFill>
+                  <a:schemeClr val="dk1"/>
+                </a:solidFill>
+                <a:latin typeface="Verdana"/>
+                <a:ea typeface="Verdana"/>
+                <a:cs typeface="Verdana"/>
+                <a:sym typeface="Verdana"/>
+              </a:rPr>
+              <a:t>Jenkins can be used to compile code and then build images and deploy software on them. This is usually the choice in corporate environments. It works with the principles of Continuous Integration and Continuous Delivery, among others.</a:t>
+            </a:r>
+          </a:p>
+          <a:p>
+            <a:pPr lvl="0" rtl="0">
               <a:spcBef>
                 <a:spcPts val="0"/>
               </a:spcBef>
@@ -18021,9 +18342,9 @@
             <a:r>
               <a:t/>
             </a:r>
-            <a:endParaRPr b="0" sz="1800" strike="noStrike">
+            <a:endParaRPr sz="1800">
               <a:solidFill>
-                <a:srgbClr val="000000"/>
+                <a:schemeClr val="dk1"/>
               </a:solidFill>
               <a:latin typeface="Verdana"/>
               <a:ea typeface="Verdana"/>
@@ -18032,178 +18353,47 @@
             </a:endParaRPr>
           </a:p>
           <a:p>
-            <a:pPr indent="0" lvl="0" marL="0" marR="0" rtl="0" algn="l">
-              <a:spcBef>
-                <a:spcPts val="0"/>
-              </a:spcBef>
-              <a:buSzPct val="25000"/>
-              <a:buNone/>
-            </a:pPr>
-            <a:r>
-              <a:rPr b="1" lang="en-US" sz="1800" strike="noStrike">
+            <a:pPr lvl="0">
+              <a:spcBef>
+                <a:spcPts val="0"/>
+              </a:spcBef>
+              <a:buNone/>
+            </a:pPr>
+            <a:r>
+              <a:rPr b="1" lang="en-US" sz="1800">
                 <a:solidFill>
-                  <a:srgbClr val="000000"/>
+                  <a:schemeClr val="dk1"/>
                 </a:solidFill>
                 <a:latin typeface="Verdana"/>
                 <a:ea typeface="Verdana"/>
                 <a:cs typeface="Verdana"/>
                 <a:sym typeface="Verdana"/>
               </a:rPr>
-              <a:t>Docker Documentation</a:t>
-            </a:r>
-            <a:r>
-              <a:rPr b="0" lang="en-US" sz="1800" strike="noStrike">
+              <a:t>Ansible</a:t>
+            </a:r>
+          </a:p>
+          <a:p>
+            <a:pPr lvl="0" rtl="0">
+              <a:spcBef>
+                <a:spcPts val="0"/>
+              </a:spcBef>
+              <a:buNone/>
+            </a:pPr>
+            <a:r>
+              <a:rPr lang="en-US" sz="1800">
                 <a:solidFill>
-                  <a:srgbClr val="000000"/>
+                  <a:schemeClr val="dk1"/>
                 </a:solidFill>
                 <a:latin typeface="Verdana"/>
                 <a:ea typeface="Verdana"/>
                 <a:cs typeface="Verdana"/>
                 <a:sym typeface="Verdana"/>
               </a:rPr>
-              <a:t>: </a:t>
-            </a:r>
-            <a:r>
-              <a:rPr b="0" lang="en-US" sz="1800" u="sng" strike="noStrike">
-                <a:solidFill>
-                  <a:schemeClr val="hlink"/>
-                </a:solidFill>
-                <a:latin typeface="Verdana"/>
-                <a:ea typeface="Verdana"/>
-                <a:cs typeface="Verdana"/>
-                <a:sym typeface="Verdana"/>
-                <a:hlinkClick r:id="rId4"/>
-              </a:rPr>
-              <a:t>https://docs.docker.com</a:t>
-            </a:r>
-          </a:p>
-          <a:p>
-            <a:pPr indent="0" lvl="0" marL="0" marR="0" rtl="0" algn="l">
-              <a:spcBef>
-                <a:spcPts val="0"/>
-              </a:spcBef>
-              <a:buSzPct val="25000"/>
-              <a:buNone/>
-            </a:pPr>
-            <a:r>
-              <a:rPr b="1" lang="en-US" sz="1800" strike="noStrike">
-                <a:solidFill>
-                  <a:srgbClr val="000000"/>
-                </a:solidFill>
-                <a:latin typeface="Verdana"/>
-                <a:ea typeface="Verdana"/>
-                <a:cs typeface="Verdana"/>
-                <a:sym typeface="Verdana"/>
-              </a:rPr>
-              <a:t>Understanding Docker</a:t>
-            </a:r>
-            <a:r>
-              <a:rPr b="0" lang="en-US" sz="1800" strike="noStrike">
-                <a:solidFill>
-                  <a:srgbClr val="000000"/>
-                </a:solidFill>
-                <a:latin typeface="Verdana"/>
-                <a:ea typeface="Verdana"/>
-                <a:cs typeface="Verdana"/>
-                <a:sym typeface="Verdana"/>
-              </a:rPr>
-              <a:t>: </a:t>
-            </a:r>
-            <a:r>
-              <a:rPr b="0" lang="en-US" sz="1800" u="sng" strike="noStrike">
-                <a:solidFill>
-                  <a:schemeClr val="hlink"/>
-                </a:solidFill>
-                <a:latin typeface="Verdana"/>
-                <a:ea typeface="Verdana"/>
-                <a:cs typeface="Verdana"/>
-                <a:sym typeface="Verdana"/>
-                <a:hlinkClick r:id="rId5"/>
-              </a:rPr>
-              <a:t>https://docs.docker.com/engine/understanding-docker/</a:t>
-            </a:r>
-          </a:p>
-          <a:p>
-            <a:pPr indent="0" lvl="0" marL="0" marR="0" rtl="0" algn="l">
-              <a:spcBef>
-                <a:spcPts val="0"/>
-              </a:spcBef>
-              <a:buSzPct val="25000"/>
-              <a:buNone/>
-            </a:pPr>
-            <a:r>
-              <a:rPr b="1" lang="en-US" sz="1800">
-                <a:latin typeface="Verdana"/>
-                <a:ea typeface="Verdana"/>
-                <a:cs typeface="Verdana"/>
-                <a:sym typeface="Verdana"/>
-              </a:rPr>
-              <a:t>Networks</a:t>
-            </a:r>
-            <a:r>
-              <a:rPr lang="en-US" sz="1800">
-                <a:latin typeface="Verdana"/>
-                <a:ea typeface="Verdana"/>
-                <a:cs typeface="Verdana"/>
-                <a:sym typeface="Verdana"/>
-              </a:rPr>
-              <a:t>: </a:t>
-            </a:r>
-            <a:r>
-              <a:rPr lang="en-US" sz="1800" u="sng">
-                <a:solidFill>
-                  <a:schemeClr val="hlink"/>
-                </a:solidFill>
-                <a:latin typeface="Verdana"/>
-                <a:ea typeface="Verdana"/>
-                <a:cs typeface="Verdana"/>
-                <a:sym typeface="Verdana"/>
-                <a:hlinkClick r:id="rId6"/>
-              </a:rPr>
-              <a:t>https://docs.docker.com/engine/tutorials/networkingcontainers/</a:t>
-            </a:r>
-            <a:br>
-              <a:rPr lang="en-US" sz="1800">
-                <a:latin typeface="Verdana"/>
-                <a:ea typeface="Verdana"/>
-                <a:cs typeface="Verdana"/>
-                <a:sym typeface="Verdana"/>
-              </a:rPr>
-            </a:br>
-            <a:r>
-              <a:rPr b="1" lang="en-US" sz="1800">
-                <a:latin typeface="Verdana"/>
-                <a:ea typeface="Verdana"/>
-                <a:cs typeface="Verdana"/>
-                <a:sym typeface="Verdana"/>
-              </a:rPr>
-              <a:t>Volumes</a:t>
-            </a:r>
-            <a:r>
-              <a:rPr lang="en-US" sz="1800">
-                <a:latin typeface="Verdana"/>
-                <a:ea typeface="Verdana"/>
-                <a:cs typeface="Verdana"/>
-                <a:sym typeface="Verdana"/>
-              </a:rPr>
-              <a:t>: </a:t>
-            </a:r>
-            <a:r>
-              <a:rPr lang="en-US" sz="1800" u="sng">
-                <a:solidFill>
-                  <a:schemeClr val="hlink"/>
-                </a:solidFill>
-                <a:latin typeface="Verdana"/>
-                <a:ea typeface="Verdana"/>
-                <a:cs typeface="Verdana"/>
-                <a:sym typeface="Verdana"/>
-                <a:hlinkClick r:id="rId7"/>
-              </a:rPr>
-              <a:t>https://docs.docker.com/engine/tutorials/dockervolumes/</a:t>
-            </a:r>
-          </a:p>
-          <a:p>
-            <a:pPr indent="0" lvl="0" marL="0" marR="0" rtl="0" algn="l">
+              <a:t>Ansible is a configuration management tool like Puppet, Chef or Salt, but with some differences. It’s more usable with Docker than the ones referred.</a:t>
+            </a:r>
+          </a:p>
+          <a:p>
+            <a:pPr lvl="0" rtl="0">
               <a:spcBef>
                 <a:spcPts val="0"/>
               </a:spcBef>
@@ -18213,131 +18403,8 @@
               <a:t/>
             </a:r>
             <a:endParaRPr sz="1800">
-              <a:latin typeface="Verdana"/>
-              <a:ea typeface="Verdana"/>
-              <a:cs typeface="Verdana"/>
-              <a:sym typeface="Verdana"/>
-            </a:endParaRPr>
-          </a:p>
-          <a:p>
-            <a:pPr indent="0" lvl="0" marL="0" marR="0" rtl="0" algn="l">
-              <a:spcBef>
-                <a:spcPts val="0"/>
-              </a:spcBef>
-              <a:buNone/>
-            </a:pPr>
-            <a:r>
-              <a:t/>
-            </a:r>
-            <a:endParaRPr sz="1800">
-              <a:latin typeface="Verdana"/>
-              <a:ea typeface="Verdana"/>
-              <a:cs typeface="Verdana"/>
-              <a:sym typeface="Verdana"/>
-            </a:endParaRPr>
-          </a:p>
-          <a:p>
-            <a:pPr indent="0" lvl="0" marL="0" marR="0" rtl="0" algn="l">
-              <a:spcBef>
-                <a:spcPts val="0"/>
-              </a:spcBef>
-              <a:buSzPct val="25000"/>
-              <a:buNone/>
-            </a:pPr>
-            <a:r>
-              <a:rPr b="1" lang="en-US" sz="1800" strike="noStrike">
-                <a:solidFill>
-                  <a:srgbClr val="000000"/>
-                </a:solidFill>
-                <a:latin typeface="Verdana"/>
-                <a:ea typeface="Verdana"/>
-                <a:cs typeface="Verdana"/>
-                <a:sym typeface="Verdana"/>
-              </a:rPr>
-              <a:t>Dockerfile</a:t>
-            </a:r>
-          </a:p>
-          <a:p>
-            <a:pPr indent="0" lvl="0" marL="0" marR="0" rtl="0" algn="l">
-              <a:spcBef>
-                <a:spcPts val="0"/>
-              </a:spcBef>
-              <a:buSzPct val="25000"/>
-              <a:buNone/>
-            </a:pPr>
-            <a:r>
-              <a:rPr b="0" lang="en-US" sz="1800" strike="noStrike">
-                <a:solidFill>
-                  <a:srgbClr val="000000"/>
-                </a:solidFill>
-                <a:latin typeface="Verdana"/>
-                <a:ea typeface="Verdana"/>
-                <a:cs typeface="Verdana"/>
-                <a:sym typeface="Verdana"/>
-              </a:rPr>
-              <a:t>Dockerfile reference: </a:t>
-            </a:r>
-            <a:r>
-              <a:rPr b="0" lang="en-US" sz="1800" u="sng" strike="noStrike">
-                <a:solidFill>
-                  <a:schemeClr val="hlink"/>
-                </a:solidFill>
-                <a:latin typeface="Verdana"/>
-                <a:ea typeface="Verdana"/>
-                <a:cs typeface="Verdana"/>
-                <a:sym typeface="Verdana"/>
-                <a:hlinkClick r:id="rId8"/>
-              </a:rPr>
-              <a:t>https://docs.docker.com/engine/reference/builder/</a:t>
-            </a:r>
-          </a:p>
-          <a:p>
-            <a:pPr indent="0" lvl="0" marL="0" marR="0" rtl="0" algn="l">
-              <a:spcBef>
-                <a:spcPts val="0"/>
-              </a:spcBef>
-              <a:buSzPct val="25000"/>
-              <a:buNone/>
-            </a:pPr>
-            <a:r>
-              <a:rPr b="0" lang="en-US" sz="1800" strike="noStrike">
-                <a:solidFill>
-                  <a:srgbClr val="000000"/>
-                </a:solidFill>
-                <a:latin typeface="Verdana"/>
-                <a:ea typeface="Verdana"/>
-                <a:cs typeface="Verdana"/>
-                <a:sym typeface="Verdana"/>
-              </a:rPr>
-              <a:t>CentOS Dockerfile examples: </a:t>
-            </a:r>
-            <a:r>
-              <a:rPr b="0" lang="en-US" sz="1800" u="sng" strike="noStrike">
-                <a:solidFill>
-                  <a:schemeClr val="hlink"/>
-                </a:solidFill>
-                <a:latin typeface="Verdana"/>
-                <a:ea typeface="Verdana"/>
-                <a:cs typeface="Verdana"/>
-                <a:sym typeface="Verdana"/>
-                <a:hlinkClick r:id="rId9"/>
-              </a:rPr>
-              <a:t>https://docs.docker.com/engine/reference/builder/</a:t>
-            </a:r>
-          </a:p>
-          <a:p>
-            <a:pPr indent="0" lvl="0" marL="0" marR="0" rtl="0" algn="l">
-              <a:spcBef>
-                <a:spcPts val="0"/>
-              </a:spcBef>
-              <a:buNone/>
-            </a:pPr>
-            <a:r>
-              <a:t/>
-            </a:r>
-            <a:endParaRPr b="0" sz="1800" strike="noStrike">
               <a:solidFill>
-                <a:srgbClr val="000000"/>
+                <a:schemeClr val="dk1"/>
               </a:solidFill>
               <a:latin typeface="Verdana"/>
               <a:ea typeface="Verdana"/>
@@ -18346,211 +18413,66 @@
             </a:endParaRPr>
           </a:p>
           <a:p>
-            <a:pPr indent="0" lvl="0" marL="0" marR="0" rtl="0" algn="l">
-              <a:spcBef>
-                <a:spcPts val="0"/>
-              </a:spcBef>
-              <a:buSzPct val="25000"/>
-              <a:buNone/>
-            </a:pPr>
-            <a:r>
-              <a:rPr b="0" lang="en-US" sz="1800" strike="noStrike">
+            <a:pPr lvl="0">
+              <a:spcBef>
+                <a:spcPts val="0"/>
+              </a:spcBef>
+              <a:buNone/>
+            </a:pPr>
+            <a:r>
+              <a:rPr b="1" lang="en-US" sz="1800">
                 <a:solidFill>
-                  <a:srgbClr val="000000"/>
+                  <a:schemeClr val="dk1"/>
                 </a:solidFill>
                 <a:latin typeface="Verdana"/>
                 <a:ea typeface="Verdana"/>
                 <a:cs typeface="Verdana"/>
                 <a:sym typeface="Verdana"/>
               </a:rPr>
-              <a:t>ENTRYPOINT vs ADD: </a:t>
-            </a:r>
-            <a:r>
-              <a:rPr b="0" lang="en-US" sz="1800" u="sng" strike="noStrike">
+              <a:t>Docker Compose</a:t>
+            </a:r>
+          </a:p>
+          <a:p>
+            <a:pPr lvl="0" rtl="0">
+              <a:spcBef>
+                <a:spcPts val="0"/>
+              </a:spcBef>
+              <a:buNone/>
+            </a:pPr>
+            <a:r>
+              <a:rPr lang="en-US" sz="1800">
                 <a:solidFill>
-                  <a:schemeClr val="hlink"/>
+                  <a:schemeClr val="dk1"/>
                 </a:solidFill>
                 <a:latin typeface="Verdana"/>
                 <a:ea typeface="Verdana"/>
                 <a:cs typeface="Verdana"/>
                 <a:sym typeface="Verdana"/>
-                <a:hlinkClick r:id="rId10"/>
-              </a:rPr>
-              <a:t>https://www.ctl.io/developers/blog/post/dockerfile-entrypoint-vs-cmd/</a:t>
-            </a:r>
-          </a:p>
-          <a:p>
-            <a:pPr indent="0" lvl="0" marL="0" marR="0" rtl="0" algn="l">
-              <a:spcBef>
-                <a:spcPts val="0"/>
-              </a:spcBef>
-              <a:buSzPct val="25000"/>
-              <a:buNone/>
-            </a:pPr>
-            <a:r>
-              <a:rPr b="0" lang="en-US" sz="1800" strike="noStrike">
+              </a:rPr>
+              <a:t>It’s an official Docker tool. With a .yml file, much like a Dockerfile, a full integrated group of containers can be built. Right now is going through huge changes, with it’s best functionality now in Experimental state.</a:t>
+            </a:r>
+            <a:br>
+              <a:rPr lang="en-US" sz="1800">
                 <a:solidFill>
-                  <a:srgbClr val="000000"/>
+                  <a:schemeClr val="dk1"/>
                 </a:solidFill>
                 <a:latin typeface="Verdana"/>
                 <a:ea typeface="Verdana"/>
                 <a:cs typeface="Verdana"/>
                 <a:sym typeface="Verdana"/>
               </a:rPr>
-              <a:t>ADD vs COPY: </a:t>
-            </a:r>
-            <a:r>
-              <a:rPr b="0" lang="en-US" sz="1800" u="sng" strike="noStrike">
+            </a:br>
+            <a:r>
+              <a:rPr lang="en-US" sz="1800">
                 <a:solidFill>
-                  <a:schemeClr val="hlink"/>
+                  <a:schemeClr val="dk1"/>
                 </a:solidFill>
                 <a:latin typeface="Verdana"/>
                 <a:ea typeface="Verdana"/>
                 <a:cs typeface="Verdana"/>
                 <a:sym typeface="Verdana"/>
-                <a:hlinkClick r:id="rId11"/>
-              </a:rPr>
-              <a:t>https://www.ctl.io/developers/blog/post/dockerfile-add-vs-copy/</a:t>
-            </a:r>
-          </a:p>
-          <a:p>
-            <a:pPr indent="0" lvl="0" marL="0" marR="0" rtl="0" algn="l">
-              <a:spcBef>
-                <a:spcPts val="0"/>
-              </a:spcBef>
-              <a:buNone/>
-            </a:pPr>
-            <a:r>
-              <a:t/>
-            </a:r>
-            <a:endParaRPr b="0" sz="1800" strike="noStrike">
-              <a:solidFill>
-                <a:srgbClr val="000000"/>
-              </a:solidFill>
-              <a:latin typeface="Verdana"/>
-              <a:ea typeface="Verdana"/>
-              <a:cs typeface="Verdana"/>
-              <a:sym typeface="Verdana"/>
-            </a:endParaRPr>
-          </a:p>
-          <a:p>
-            <a:pPr indent="0" lvl="0" marL="0" marR="0" rtl="0" algn="l">
-              <a:spcBef>
-                <a:spcPts val="0"/>
-              </a:spcBef>
-              <a:buNone/>
-            </a:pPr>
-            <a:r>
-              <a:t/>
-            </a:r>
-            <a:endParaRPr b="0" sz="1800" strike="noStrike">
-              <a:solidFill>
-                <a:srgbClr val="000000"/>
-              </a:solidFill>
-              <a:latin typeface="Verdana"/>
-              <a:ea typeface="Verdana"/>
-              <a:cs typeface="Verdana"/>
-              <a:sym typeface="Verdana"/>
-            </a:endParaRPr>
-          </a:p>
-          <a:p>
-            <a:pPr indent="0" lvl="0" marL="0" marR="0" rtl="0" algn="l">
-              <a:spcBef>
-                <a:spcPts val="0"/>
-              </a:spcBef>
-              <a:buSzPct val="25000"/>
-              <a:buNone/>
-            </a:pPr>
-            <a:r>
-              <a:rPr b="1" lang="en-US" sz="1800" strike="noStrike">
-                <a:solidFill>
-                  <a:srgbClr val="000000"/>
-                </a:solidFill>
-                <a:latin typeface="Verdana"/>
-                <a:ea typeface="Verdana"/>
-                <a:cs typeface="Verdana"/>
-                <a:sym typeface="Verdana"/>
-              </a:rPr>
-              <a:t>Docker Swarm mode</a:t>
-            </a:r>
-          </a:p>
-          <a:p>
-            <a:pPr indent="0" lvl="0" marL="0" marR="0" rtl="0" algn="l">
-              <a:spcBef>
-                <a:spcPts val="0"/>
-              </a:spcBef>
-              <a:buSzPct val="25000"/>
-              <a:buNone/>
-            </a:pPr>
-            <a:r>
-              <a:rPr b="0" lang="en-US" sz="1800" u="sng" strike="noStrike">
-                <a:solidFill>
-                  <a:schemeClr val="hlink"/>
-                </a:solidFill>
-                <a:latin typeface="Verdana"/>
-                <a:ea typeface="Verdana"/>
-                <a:cs typeface="Verdana"/>
-                <a:sym typeface="Verdana"/>
-                <a:hlinkClick r:id="rId12"/>
-              </a:rPr>
-              <a:t>https://docs.docker.com/engine/swarm/</a:t>
-            </a:r>
-          </a:p>
-          <a:p>
-            <a:pPr indent="0" lvl="0" marL="0" marR="0" rtl="0" algn="l">
-              <a:spcBef>
-                <a:spcPts val="0"/>
-              </a:spcBef>
-              <a:buNone/>
-            </a:pPr>
-            <a:r>
-              <a:t/>
-            </a:r>
-            <a:endParaRPr sz="1800">
-              <a:latin typeface="Verdana"/>
-              <a:ea typeface="Verdana"/>
-              <a:cs typeface="Verdana"/>
-              <a:sym typeface="Verdana"/>
-            </a:endParaRPr>
-          </a:p>
-          <a:p>
-            <a:pPr indent="0" lvl="0" marL="0" marR="0" rtl="0" algn="l">
-              <a:spcBef>
-                <a:spcPts val="0"/>
-              </a:spcBef>
-              <a:buSzPct val="25000"/>
-              <a:buNone/>
-            </a:pPr>
-            <a:r>
-              <a:rPr b="1" lang="en-US" sz="1800">
-                <a:latin typeface="Verdana"/>
-                <a:ea typeface="Verdana"/>
-                <a:cs typeface="Verdana"/>
-                <a:sym typeface="Verdana"/>
-              </a:rPr>
-              <a:t>GitHub</a:t>
-            </a:r>
-          </a:p>
-          <a:p>
-            <a:pPr indent="0" lvl="0" marL="0" marR="0" rtl="0" algn="l">
-              <a:spcBef>
-                <a:spcPts val="0"/>
-              </a:spcBef>
-              <a:buSzPct val="25000"/>
-              <a:buNone/>
-            </a:pPr>
-            <a:r>
-              <a:rPr lang="en-US" sz="1800" u="sng">
-                <a:solidFill>
-                  <a:schemeClr val="hlink"/>
-                </a:solidFill>
-                <a:latin typeface="Verdana"/>
-                <a:ea typeface="Verdana"/>
-                <a:cs typeface="Verdana"/>
-                <a:sym typeface="Verdana"/>
-                <a:hlinkClick r:id="rId13"/>
-              </a:rPr>
-              <a:t>https://github.com/luisnabais/course_docker</a:t>
+              </a:rPr>
+              <a:t>It will be fully integrated with Docker Swarm soon.</a:t>
             </a:r>
           </a:p>
         </p:txBody>
@@ -18580,7 +18502,7 @@
     </p:bg>
     <p:spTree>
       <p:nvGrpSpPr>
-        <p:cNvPr id="241" name="Shape 241"/>
+        <p:cNvPr id="242" name="Shape 242"/>
         <p:cNvGrpSpPr/>
         <p:nvPr/>
       </p:nvGrpSpPr>
@@ -18594,7 +18516,1122 @@
       </p:grpSpPr>
       <p:sp>
         <p:nvSpPr>
-          <p:cNvPr id="242" name="Shape 242"/>
+          <p:cNvPr id="243" name="Shape 243"/>
+          <p:cNvSpPr txBox="1"/>
+          <p:nvPr/>
+        </p:nvSpPr>
+        <p:spPr>
+          <a:xfrm>
+            <a:off x="182875" y="183250"/>
+            <a:ext cx="11704200" cy="6055500"/>
+          </a:xfrm>
+          <a:prstGeom prst="rect">
+            <a:avLst/>
+          </a:prstGeom>
+          <a:noFill/>
+          <a:ln>
+            <a:noFill/>
+          </a:ln>
+        </p:spPr>
+        <p:txBody>
+          <a:bodyPr anchorCtr="0" anchor="t" bIns="45000" lIns="90000" rIns="90000" tIns="45000">
+            <a:noAutofit/>
+          </a:bodyPr>
+          <a:lstStyle/>
+          <a:p>
+            <a:pPr indent="0" lvl="0" marL="0" marR="0" rtl="0" algn="l">
+              <a:spcBef>
+                <a:spcPts val="0"/>
+              </a:spcBef>
+              <a:buSzPct val="25000"/>
+              <a:buNone/>
+            </a:pPr>
+            <a:r>
+              <a:rPr b="1" lang="en-US" sz="2400">
+                <a:latin typeface="Verdana"/>
+                <a:ea typeface="Verdana"/>
+                <a:cs typeface="Verdana"/>
+                <a:sym typeface="Verdana"/>
+              </a:rPr>
+              <a:t>Misc</a:t>
+            </a:r>
+          </a:p>
+          <a:p>
+            <a:pPr lvl="0" marR="0" rtl="0" algn="l">
+              <a:spcBef>
+                <a:spcPts val="0"/>
+              </a:spcBef>
+              <a:buNone/>
+            </a:pPr>
+            <a:r>
+              <a:t/>
+            </a:r>
+            <a:endParaRPr sz="1800">
+              <a:latin typeface="Verdana"/>
+              <a:ea typeface="Verdana"/>
+              <a:cs typeface="Verdana"/>
+              <a:sym typeface="Verdana"/>
+            </a:endParaRPr>
+          </a:p>
+          <a:p>
+            <a:pPr lvl="0" marR="0" rtl="0" algn="l">
+              <a:spcBef>
+                <a:spcPts val="0"/>
+              </a:spcBef>
+              <a:buNone/>
+            </a:pPr>
+            <a:r>
+              <a:rPr b="1" lang="en-US" sz="1800">
+                <a:latin typeface="Verdana"/>
+                <a:ea typeface="Verdana"/>
+                <a:cs typeface="Verdana"/>
+                <a:sym typeface="Verdana"/>
+              </a:rPr>
+              <a:t>Other Docker commands</a:t>
+            </a:r>
+          </a:p>
+          <a:p>
+            <a:pPr lvl="0" marR="0" rtl="0" algn="l">
+              <a:spcBef>
+                <a:spcPts val="0"/>
+              </a:spcBef>
+              <a:buNone/>
+            </a:pPr>
+            <a:r>
+              <a:rPr b="1" lang="en-US" sz="1800">
+                <a:latin typeface="Verdana"/>
+                <a:ea typeface="Verdana"/>
+                <a:cs typeface="Verdana"/>
+                <a:sym typeface="Verdana"/>
+              </a:rPr>
+              <a:t>Update</a:t>
+            </a:r>
+          </a:p>
+          <a:p>
+            <a:pPr lvl="0" rtl="0">
+              <a:spcBef>
+                <a:spcPts val="0"/>
+              </a:spcBef>
+              <a:buClr>
+                <a:schemeClr val="dk1"/>
+              </a:buClr>
+              <a:buSzPct val="61111"/>
+              <a:buFont typeface="Arial"/>
+              <a:buNone/>
+            </a:pPr>
+            <a:r>
+              <a:rPr lang="en-US" sz="1800">
+                <a:solidFill>
+                  <a:schemeClr val="dk1"/>
+                </a:solidFill>
+                <a:latin typeface="Verdana"/>
+                <a:ea typeface="Verdana"/>
+                <a:cs typeface="Verdana"/>
+                <a:sym typeface="Verdana"/>
+              </a:rPr>
+              <a:t># docker update --restart always </a:t>
+            </a:r>
+          </a:p>
+          <a:p>
+            <a:pPr lvl="0" marR="0" rtl="0" algn="l">
+              <a:spcBef>
+                <a:spcPts val="0"/>
+              </a:spcBef>
+              <a:buClr>
+                <a:schemeClr val="dk1"/>
+              </a:buClr>
+              <a:buSzPct val="61111"/>
+              <a:buFont typeface="Arial"/>
+              <a:buNone/>
+            </a:pPr>
+            <a:r>
+              <a:rPr lang="en-US" sz="1800">
+                <a:latin typeface="Verdana"/>
+                <a:ea typeface="Verdana"/>
+                <a:cs typeface="Verdana"/>
+                <a:sym typeface="Verdana"/>
+              </a:rPr>
+              <a:t># docker update --cpu-shares 512 </a:t>
+            </a:r>
+            <a:r>
+              <a:rPr i="1" lang="en-US" sz="1800">
+                <a:solidFill>
+                  <a:schemeClr val="dk1"/>
+                </a:solidFill>
+                <a:latin typeface="Verdana"/>
+                <a:ea typeface="Verdana"/>
+                <a:cs typeface="Verdana"/>
+                <a:sym typeface="Verdana"/>
+              </a:rPr>
+              <a:t>container_name</a:t>
+            </a:r>
+          </a:p>
+          <a:p>
+            <a:pPr lvl="0">
+              <a:spcBef>
+                <a:spcPts val="0"/>
+              </a:spcBef>
+              <a:buClr>
+                <a:schemeClr val="dk1"/>
+              </a:buClr>
+              <a:buSzPct val="61111"/>
+              <a:buFont typeface="Arial"/>
+              <a:buNone/>
+            </a:pPr>
+            <a:r>
+              <a:rPr lang="en-US" sz="1800">
+                <a:solidFill>
+                  <a:schemeClr val="dk1"/>
+                </a:solidFill>
+                <a:latin typeface="Verdana"/>
+                <a:ea typeface="Verdana"/>
+                <a:cs typeface="Verdana"/>
+                <a:sym typeface="Verdana"/>
+              </a:rPr>
+              <a:t># docker update -m 300M </a:t>
+            </a:r>
+            <a:r>
+              <a:rPr i="1" lang="en-US" sz="1800">
+                <a:solidFill>
+                  <a:schemeClr val="dk1"/>
+                </a:solidFill>
+                <a:latin typeface="Verdana"/>
+                <a:ea typeface="Verdana"/>
+                <a:cs typeface="Verdana"/>
+                <a:sym typeface="Verdana"/>
+              </a:rPr>
+              <a:t>container_name</a:t>
+            </a:r>
+          </a:p>
+          <a:p>
+            <a:pPr lvl="0">
+              <a:spcBef>
+                <a:spcPts val="0"/>
+              </a:spcBef>
+              <a:buClr>
+                <a:schemeClr val="dk1"/>
+              </a:buClr>
+              <a:buFont typeface="Arial"/>
+              <a:buNone/>
+            </a:pPr>
+            <a:r>
+              <a:t/>
+            </a:r>
+            <a:endParaRPr sz="1800">
+              <a:solidFill>
+                <a:schemeClr val="dk1"/>
+              </a:solidFill>
+              <a:latin typeface="Verdana"/>
+              <a:ea typeface="Verdana"/>
+              <a:cs typeface="Verdana"/>
+              <a:sym typeface="Verdana"/>
+            </a:endParaRPr>
+          </a:p>
+          <a:p>
+            <a:pPr lvl="0">
+              <a:spcBef>
+                <a:spcPts val="0"/>
+              </a:spcBef>
+              <a:buClr>
+                <a:schemeClr val="dk1"/>
+              </a:buClr>
+              <a:buSzPct val="61111"/>
+              <a:buFont typeface="Arial"/>
+              <a:buNone/>
+            </a:pPr>
+            <a:r>
+              <a:rPr b="1" lang="en-US" sz="1800">
+                <a:solidFill>
+                  <a:schemeClr val="dk1"/>
+                </a:solidFill>
+                <a:latin typeface="Verdana"/>
+                <a:ea typeface="Verdana"/>
+                <a:cs typeface="Verdana"/>
+                <a:sym typeface="Verdana"/>
+              </a:rPr>
+              <a:t>Stats</a:t>
+            </a:r>
+          </a:p>
+          <a:p>
+            <a:pPr lvl="0" rtl="0">
+              <a:spcBef>
+                <a:spcPts val="0"/>
+              </a:spcBef>
+              <a:buClr>
+                <a:schemeClr val="dk1"/>
+              </a:buClr>
+              <a:buSzPct val="61111"/>
+              <a:buFont typeface="Arial"/>
+              <a:buNone/>
+            </a:pPr>
+            <a:r>
+              <a:rPr lang="en-US" sz="1800">
+                <a:solidFill>
+                  <a:schemeClr val="dk1"/>
+                </a:solidFill>
+                <a:latin typeface="Verdana"/>
+                <a:ea typeface="Verdana"/>
+                <a:cs typeface="Verdana"/>
+                <a:sym typeface="Verdana"/>
+              </a:rPr>
+              <a:t># docker stats </a:t>
+            </a:r>
+            <a:r>
+              <a:rPr i="1" lang="en-US" sz="1800">
+                <a:solidFill>
+                  <a:schemeClr val="dk1"/>
+                </a:solidFill>
+                <a:latin typeface="Verdana"/>
+                <a:ea typeface="Verdana"/>
+                <a:cs typeface="Verdana"/>
+                <a:sym typeface="Verdana"/>
+              </a:rPr>
+              <a:t>container_name</a:t>
+            </a:r>
+          </a:p>
+          <a:p>
+            <a:pPr lvl="0" rtl="0">
+              <a:spcBef>
+                <a:spcPts val="0"/>
+              </a:spcBef>
+              <a:buClr>
+                <a:schemeClr val="dk1"/>
+              </a:buClr>
+              <a:buFont typeface="Arial"/>
+              <a:buNone/>
+            </a:pPr>
+            <a:r>
+              <a:t/>
+            </a:r>
+            <a:endParaRPr sz="1800">
+              <a:solidFill>
+                <a:schemeClr val="dk1"/>
+              </a:solidFill>
+              <a:latin typeface="Verdana"/>
+              <a:ea typeface="Verdana"/>
+              <a:cs typeface="Verdana"/>
+              <a:sym typeface="Verdana"/>
+            </a:endParaRPr>
+          </a:p>
+          <a:p>
+            <a:pPr lvl="0" rtl="0">
+              <a:spcBef>
+                <a:spcPts val="0"/>
+              </a:spcBef>
+              <a:buClr>
+                <a:schemeClr val="dk1"/>
+              </a:buClr>
+              <a:buFont typeface="Arial"/>
+              <a:buNone/>
+            </a:pPr>
+            <a:r>
+              <a:t/>
+            </a:r>
+            <a:endParaRPr sz="1800">
+              <a:solidFill>
+                <a:schemeClr val="dk1"/>
+              </a:solidFill>
+              <a:latin typeface="Verdana"/>
+              <a:ea typeface="Verdana"/>
+              <a:cs typeface="Verdana"/>
+              <a:sym typeface="Verdana"/>
+            </a:endParaRPr>
+          </a:p>
+          <a:p>
+            <a:pPr lvl="0" rtl="0">
+              <a:spcBef>
+                <a:spcPts val="0"/>
+              </a:spcBef>
+              <a:buClr>
+                <a:schemeClr val="dk1"/>
+              </a:buClr>
+              <a:buFont typeface="Arial"/>
+              <a:buNone/>
+            </a:pPr>
+            <a:r>
+              <a:t/>
+            </a:r>
+            <a:endParaRPr sz="1800">
+              <a:solidFill>
+                <a:schemeClr val="dk1"/>
+              </a:solidFill>
+              <a:latin typeface="Verdana"/>
+              <a:ea typeface="Verdana"/>
+              <a:cs typeface="Verdana"/>
+              <a:sym typeface="Verdana"/>
+            </a:endParaRPr>
+          </a:p>
+          <a:p>
+            <a:pPr lvl="0" rtl="0">
+              <a:spcBef>
+                <a:spcPts val="0"/>
+              </a:spcBef>
+              <a:buClr>
+                <a:schemeClr val="dk1"/>
+              </a:buClr>
+              <a:buFont typeface="Arial"/>
+              <a:buNone/>
+            </a:pPr>
+            <a:r>
+              <a:t/>
+            </a:r>
+            <a:endParaRPr sz="1800">
+              <a:solidFill>
+                <a:schemeClr val="dk1"/>
+              </a:solidFill>
+              <a:latin typeface="Verdana"/>
+              <a:ea typeface="Verdana"/>
+              <a:cs typeface="Verdana"/>
+              <a:sym typeface="Verdana"/>
+            </a:endParaRPr>
+          </a:p>
+          <a:p>
+            <a:pPr lvl="0" marR="0" rtl="0" algn="l">
+              <a:spcBef>
+                <a:spcPts val="0"/>
+              </a:spcBef>
+              <a:buClr>
+                <a:schemeClr val="dk1"/>
+              </a:buClr>
+              <a:buFont typeface="Arial"/>
+              <a:buNone/>
+            </a:pPr>
+            <a:r>
+              <a:t/>
+            </a:r>
+            <a:endParaRPr sz="1800">
+              <a:latin typeface="Verdana"/>
+              <a:ea typeface="Verdana"/>
+              <a:cs typeface="Verdana"/>
+              <a:sym typeface="Verdana"/>
+            </a:endParaRPr>
+          </a:p>
+          <a:p>
+            <a:pPr lvl="0" marR="0" rtl="0" algn="l">
+              <a:spcBef>
+                <a:spcPts val="0"/>
+              </a:spcBef>
+              <a:buNone/>
+            </a:pPr>
+            <a:r>
+              <a:rPr b="1" lang="en-US" sz="1800">
+                <a:latin typeface="Verdana"/>
+                <a:ea typeface="Verdana"/>
+                <a:cs typeface="Verdana"/>
+                <a:sym typeface="Verdana"/>
+              </a:rPr>
+              <a:t>Command line reference</a:t>
+            </a:r>
+            <a:br>
+              <a:rPr lang="en-US" sz="1800">
+                <a:latin typeface="Verdana"/>
+                <a:ea typeface="Verdana"/>
+                <a:cs typeface="Verdana"/>
+                <a:sym typeface="Verdana"/>
+              </a:rPr>
+            </a:br>
+            <a:r>
+              <a:rPr lang="en-US" sz="1800" u="sng">
+                <a:solidFill>
+                  <a:schemeClr val="hlink"/>
+                </a:solidFill>
+                <a:latin typeface="Verdana"/>
+                <a:ea typeface="Verdana"/>
+                <a:cs typeface="Verdana"/>
+                <a:sym typeface="Verdana"/>
+                <a:hlinkClick r:id="rId4"/>
+              </a:rPr>
+              <a:t>https://docs.docker.com/engine/reference/commandline/</a:t>
+            </a:r>
+          </a:p>
+        </p:txBody>
+      </p:sp>
+    </p:spTree>
+  </p:cSld>
+  <p:clrMapOvr>
+    <a:masterClrMapping/>
+  </p:clrMapOvr>
+</p:sld>
+</file>
+
+<file path=ppt/slides/slide26.xml><?xml version="1.0" encoding="utf-8"?>
+<p:sld xmlns:a="http://schemas.openxmlformats.org/drawingml/2006/main" xmlns:r="http://schemas.openxmlformats.org/officeDocument/2006/relationships" xmlns:mc="http://schemas.openxmlformats.org/markup-compatibility/2006" xmlns:mv="urn:schemas-microsoft-com:mac:vml" xmlns:p="http://schemas.openxmlformats.org/presentationml/2006/main" xmlns:c="http://schemas.openxmlformats.org/drawingml/2006/chart" xmlns:dgm="http://schemas.openxmlformats.org/drawingml/2006/diagram" xmlns:o="urn:schemas-microsoft-com:office:office" xmlns:v="urn:schemas-microsoft-com:vml" xmlns:pvml="urn:schemas-microsoft-com:office:powerpoint" xmlns:com="http://schemas.openxmlformats.org/drawingml/2006/compatibility" xmlns:p14="http://schemas.microsoft.com/office/powerpoint/2010/main">
+  <p:cSld>
+    <p:bg>
+      <p:bgPr>
+        <a:blipFill rotWithShape="1">
+          <a:blip r:embed="rId3">
+            <a:alphaModFix/>
+          </a:blip>
+          <a:stretch>
+            <a:fillRect b="0" l="0" r="0" t="0"/>
+          </a:stretch>
+        </a:blipFill>
+      </p:bgPr>
+    </p:bg>
+    <p:spTree>
+      <p:nvGrpSpPr>
+        <p:cNvPr id="247" name="Shape 247"/>
+        <p:cNvGrpSpPr/>
+        <p:nvPr/>
+      </p:nvGrpSpPr>
+      <p:grpSpPr>
+        <a:xfrm>
+          <a:off x="0" y="0"/>
+          <a:ext cx="0" cy="0"/>
+          <a:chOff x="0" y="0"/>
+          <a:chExt cx="0" cy="0"/>
+        </a:xfrm>
+      </p:grpSpPr>
+      <p:sp>
+        <p:nvSpPr>
+          <p:cNvPr id="248" name="Shape 248"/>
+          <p:cNvSpPr txBox="1"/>
+          <p:nvPr/>
+        </p:nvSpPr>
+        <p:spPr>
+          <a:xfrm>
+            <a:off x="182875" y="183250"/>
+            <a:ext cx="11704200" cy="6281999"/>
+          </a:xfrm>
+          <a:prstGeom prst="rect">
+            <a:avLst/>
+          </a:prstGeom>
+          <a:noFill/>
+          <a:ln>
+            <a:noFill/>
+          </a:ln>
+        </p:spPr>
+        <p:txBody>
+          <a:bodyPr anchorCtr="0" anchor="t" bIns="45000" lIns="90000" rIns="90000" tIns="45000">
+            <a:noAutofit/>
+          </a:bodyPr>
+          <a:lstStyle/>
+          <a:p>
+            <a:pPr indent="0" lvl="0" marL="0" marR="0" rtl="0" algn="l">
+              <a:spcBef>
+                <a:spcPts val="0"/>
+              </a:spcBef>
+              <a:buSzPct val="25000"/>
+              <a:buNone/>
+            </a:pPr>
+            <a:r>
+              <a:rPr b="1" lang="en-US" sz="2400" strike="noStrike">
+                <a:solidFill>
+                  <a:srgbClr val="000000"/>
+                </a:solidFill>
+                <a:latin typeface="Verdana"/>
+                <a:ea typeface="Verdana"/>
+                <a:cs typeface="Verdana"/>
+                <a:sym typeface="Verdana"/>
+              </a:rPr>
+              <a:t>Where can I get more information?</a:t>
+            </a:r>
+          </a:p>
+          <a:p>
+            <a:pPr indent="0" lvl="0" marL="0" marR="0" rtl="0" algn="l">
+              <a:spcBef>
+                <a:spcPts val="0"/>
+              </a:spcBef>
+              <a:buNone/>
+            </a:pPr>
+            <a:r>
+              <a:t/>
+            </a:r>
+            <a:endParaRPr b="0" sz="1800" strike="noStrike">
+              <a:solidFill>
+                <a:srgbClr val="000000"/>
+              </a:solidFill>
+              <a:latin typeface="Verdana"/>
+              <a:ea typeface="Verdana"/>
+              <a:cs typeface="Verdana"/>
+              <a:sym typeface="Verdana"/>
+            </a:endParaRPr>
+          </a:p>
+          <a:p>
+            <a:pPr indent="0" lvl="0" marL="0" marR="0" rtl="0" algn="l">
+              <a:spcBef>
+                <a:spcPts val="0"/>
+              </a:spcBef>
+              <a:buNone/>
+            </a:pPr>
+            <a:r>
+              <a:t/>
+            </a:r>
+            <a:endParaRPr b="0" sz="1800" strike="noStrike">
+              <a:solidFill>
+                <a:srgbClr val="000000"/>
+              </a:solidFill>
+              <a:latin typeface="Verdana"/>
+              <a:ea typeface="Verdana"/>
+              <a:cs typeface="Verdana"/>
+              <a:sym typeface="Verdana"/>
+            </a:endParaRPr>
+          </a:p>
+          <a:p>
+            <a:pPr indent="0" lvl="0" marL="0" marR="0" rtl="0" algn="l">
+              <a:spcBef>
+                <a:spcPts val="0"/>
+              </a:spcBef>
+              <a:buSzPct val="25000"/>
+              <a:buNone/>
+            </a:pPr>
+            <a:r>
+              <a:rPr b="1" lang="en-US" sz="1800" strike="noStrike">
+                <a:solidFill>
+                  <a:srgbClr val="000000"/>
+                </a:solidFill>
+                <a:latin typeface="Verdana"/>
+                <a:ea typeface="Verdana"/>
+                <a:cs typeface="Verdana"/>
+                <a:sym typeface="Verdana"/>
+              </a:rPr>
+              <a:t>Docker Documentation</a:t>
+            </a:r>
+            <a:r>
+              <a:rPr b="0" lang="en-US" sz="1800" strike="noStrike">
+                <a:solidFill>
+                  <a:srgbClr val="000000"/>
+                </a:solidFill>
+                <a:latin typeface="Verdana"/>
+                <a:ea typeface="Verdana"/>
+                <a:cs typeface="Verdana"/>
+                <a:sym typeface="Verdana"/>
+              </a:rPr>
+              <a:t>: </a:t>
+            </a:r>
+            <a:r>
+              <a:rPr b="0" lang="en-US" sz="1800" u="sng" strike="noStrike">
+                <a:solidFill>
+                  <a:schemeClr val="hlink"/>
+                </a:solidFill>
+                <a:latin typeface="Verdana"/>
+                <a:ea typeface="Verdana"/>
+                <a:cs typeface="Verdana"/>
+                <a:sym typeface="Verdana"/>
+                <a:hlinkClick r:id="rId4"/>
+              </a:rPr>
+              <a:t>https://docs.docker.com</a:t>
+            </a:r>
+          </a:p>
+          <a:p>
+            <a:pPr indent="0" lvl="0" marL="0" marR="0" rtl="0" algn="l">
+              <a:spcBef>
+                <a:spcPts val="0"/>
+              </a:spcBef>
+              <a:buSzPct val="25000"/>
+              <a:buNone/>
+            </a:pPr>
+            <a:r>
+              <a:rPr b="1" lang="en-US" sz="1800" strike="noStrike">
+                <a:solidFill>
+                  <a:srgbClr val="000000"/>
+                </a:solidFill>
+                <a:latin typeface="Verdana"/>
+                <a:ea typeface="Verdana"/>
+                <a:cs typeface="Verdana"/>
+                <a:sym typeface="Verdana"/>
+              </a:rPr>
+              <a:t>Understanding Docker</a:t>
+            </a:r>
+            <a:r>
+              <a:rPr b="0" lang="en-US" sz="1800" strike="noStrike">
+                <a:solidFill>
+                  <a:srgbClr val="000000"/>
+                </a:solidFill>
+                <a:latin typeface="Verdana"/>
+                <a:ea typeface="Verdana"/>
+                <a:cs typeface="Verdana"/>
+                <a:sym typeface="Verdana"/>
+              </a:rPr>
+              <a:t>: </a:t>
+            </a:r>
+            <a:r>
+              <a:rPr b="0" lang="en-US" sz="1800" u="sng" strike="noStrike">
+                <a:solidFill>
+                  <a:schemeClr val="hlink"/>
+                </a:solidFill>
+                <a:latin typeface="Verdana"/>
+                <a:ea typeface="Verdana"/>
+                <a:cs typeface="Verdana"/>
+                <a:sym typeface="Verdana"/>
+                <a:hlinkClick r:id="rId5"/>
+              </a:rPr>
+              <a:t>https://docs.docker.com/engine/understanding-docker/</a:t>
+            </a:r>
+          </a:p>
+          <a:p>
+            <a:pPr indent="0" lvl="0" marL="0" marR="0" rtl="0" algn="l">
+              <a:spcBef>
+                <a:spcPts val="0"/>
+              </a:spcBef>
+              <a:buSzPct val="25000"/>
+              <a:buNone/>
+            </a:pPr>
+            <a:r>
+              <a:rPr b="1" lang="en-US" sz="1800">
+                <a:latin typeface="Verdana"/>
+                <a:ea typeface="Verdana"/>
+                <a:cs typeface="Verdana"/>
+                <a:sym typeface="Verdana"/>
+              </a:rPr>
+              <a:t>Networks</a:t>
+            </a:r>
+            <a:r>
+              <a:rPr lang="en-US" sz="1800">
+                <a:latin typeface="Verdana"/>
+                <a:ea typeface="Verdana"/>
+                <a:cs typeface="Verdana"/>
+                <a:sym typeface="Verdana"/>
+              </a:rPr>
+              <a:t>: </a:t>
+            </a:r>
+            <a:r>
+              <a:rPr lang="en-US" sz="1800" u="sng">
+                <a:solidFill>
+                  <a:schemeClr val="hlink"/>
+                </a:solidFill>
+                <a:latin typeface="Verdana"/>
+                <a:ea typeface="Verdana"/>
+                <a:cs typeface="Verdana"/>
+                <a:sym typeface="Verdana"/>
+                <a:hlinkClick r:id="rId6"/>
+              </a:rPr>
+              <a:t>https://docs.docker.com/engine/tutorials/networkingcontainers/</a:t>
+            </a:r>
+            <a:br>
+              <a:rPr lang="en-US" sz="1800">
+                <a:latin typeface="Verdana"/>
+                <a:ea typeface="Verdana"/>
+                <a:cs typeface="Verdana"/>
+                <a:sym typeface="Verdana"/>
+              </a:rPr>
+            </a:br>
+            <a:r>
+              <a:rPr b="1" lang="en-US" sz="1800">
+                <a:latin typeface="Verdana"/>
+                <a:ea typeface="Verdana"/>
+                <a:cs typeface="Verdana"/>
+                <a:sym typeface="Verdana"/>
+              </a:rPr>
+              <a:t>Volumes</a:t>
+            </a:r>
+            <a:r>
+              <a:rPr lang="en-US" sz="1800">
+                <a:latin typeface="Verdana"/>
+                <a:ea typeface="Verdana"/>
+                <a:cs typeface="Verdana"/>
+                <a:sym typeface="Verdana"/>
+              </a:rPr>
+              <a:t>: </a:t>
+            </a:r>
+            <a:r>
+              <a:rPr lang="en-US" sz="1800" u="sng">
+                <a:solidFill>
+                  <a:schemeClr val="hlink"/>
+                </a:solidFill>
+                <a:latin typeface="Verdana"/>
+                <a:ea typeface="Verdana"/>
+                <a:cs typeface="Verdana"/>
+                <a:sym typeface="Verdana"/>
+                <a:hlinkClick r:id="rId7"/>
+              </a:rPr>
+              <a:t>https://docs.docker.com/engine/tutorials/dockervolumes/</a:t>
+            </a:r>
+          </a:p>
+          <a:p>
+            <a:pPr indent="0" lvl="0" marL="0" marR="0" rtl="0" algn="l">
+              <a:spcBef>
+                <a:spcPts val="0"/>
+              </a:spcBef>
+              <a:buNone/>
+            </a:pPr>
+            <a:r>
+              <a:t/>
+            </a:r>
+            <a:endParaRPr sz="1800">
+              <a:latin typeface="Verdana"/>
+              <a:ea typeface="Verdana"/>
+              <a:cs typeface="Verdana"/>
+              <a:sym typeface="Verdana"/>
+            </a:endParaRPr>
+          </a:p>
+          <a:p>
+            <a:pPr indent="0" lvl="0" marL="0" marR="0" rtl="0" algn="l">
+              <a:spcBef>
+                <a:spcPts val="0"/>
+              </a:spcBef>
+              <a:buNone/>
+            </a:pPr>
+            <a:r>
+              <a:t/>
+            </a:r>
+            <a:endParaRPr sz="1800">
+              <a:latin typeface="Verdana"/>
+              <a:ea typeface="Verdana"/>
+              <a:cs typeface="Verdana"/>
+              <a:sym typeface="Verdana"/>
+            </a:endParaRPr>
+          </a:p>
+          <a:p>
+            <a:pPr indent="0" lvl="0" marL="0" marR="0" rtl="0" algn="l">
+              <a:spcBef>
+                <a:spcPts val="0"/>
+              </a:spcBef>
+              <a:buSzPct val="25000"/>
+              <a:buNone/>
+            </a:pPr>
+            <a:r>
+              <a:rPr b="1" lang="en-US" sz="1800" strike="noStrike">
+                <a:solidFill>
+                  <a:srgbClr val="000000"/>
+                </a:solidFill>
+                <a:latin typeface="Verdana"/>
+                <a:ea typeface="Verdana"/>
+                <a:cs typeface="Verdana"/>
+                <a:sym typeface="Verdana"/>
+              </a:rPr>
+              <a:t>Dockerfile</a:t>
+            </a:r>
+          </a:p>
+          <a:p>
+            <a:pPr indent="0" lvl="0" marL="0" marR="0" rtl="0" algn="l">
+              <a:spcBef>
+                <a:spcPts val="0"/>
+              </a:spcBef>
+              <a:buSzPct val="25000"/>
+              <a:buNone/>
+            </a:pPr>
+            <a:r>
+              <a:rPr b="0" lang="en-US" sz="1800" strike="noStrike">
+                <a:solidFill>
+                  <a:srgbClr val="000000"/>
+                </a:solidFill>
+                <a:latin typeface="Verdana"/>
+                <a:ea typeface="Verdana"/>
+                <a:cs typeface="Verdana"/>
+                <a:sym typeface="Verdana"/>
+              </a:rPr>
+              <a:t>Dockerfile reference: </a:t>
+            </a:r>
+            <a:r>
+              <a:rPr b="0" lang="en-US" sz="1800" u="sng" strike="noStrike">
+                <a:solidFill>
+                  <a:schemeClr val="hlink"/>
+                </a:solidFill>
+                <a:latin typeface="Verdana"/>
+                <a:ea typeface="Verdana"/>
+                <a:cs typeface="Verdana"/>
+                <a:sym typeface="Verdana"/>
+                <a:hlinkClick r:id="rId8"/>
+              </a:rPr>
+              <a:t>https://docs.docker.com/engine/reference/builder/</a:t>
+            </a:r>
+          </a:p>
+          <a:p>
+            <a:pPr indent="0" lvl="0" marL="0" marR="0" rtl="0" algn="l">
+              <a:spcBef>
+                <a:spcPts val="0"/>
+              </a:spcBef>
+              <a:buSzPct val="25000"/>
+              <a:buNone/>
+            </a:pPr>
+            <a:r>
+              <a:rPr b="0" lang="en-US" sz="1800" strike="noStrike">
+                <a:solidFill>
+                  <a:srgbClr val="000000"/>
+                </a:solidFill>
+                <a:latin typeface="Verdana"/>
+                <a:ea typeface="Verdana"/>
+                <a:cs typeface="Verdana"/>
+                <a:sym typeface="Verdana"/>
+              </a:rPr>
+              <a:t>CentOS Dockerfile examples: </a:t>
+            </a:r>
+            <a:r>
+              <a:rPr b="0" lang="en-US" sz="1800" u="sng" strike="noStrike">
+                <a:solidFill>
+                  <a:schemeClr val="hlink"/>
+                </a:solidFill>
+                <a:latin typeface="Verdana"/>
+                <a:ea typeface="Verdana"/>
+                <a:cs typeface="Verdana"/>
+                <a:sym typeface="Verdana"/>
+                <a:hlinkClick r:id="rId9"/>
+              </a:rPr>
+              <a:t>https://docs.docker.com/engine/reference/builder/</a:t>
+            </a:r>
+          </a:p>
+          <a:p>
+            <a:pPr indent="0" lvl="0" marL="0" marR="0" rtl="0" algn="l">
+              <a:spcBef>
+                <a:spcPts val="0"/>
+              </a:spcBef>
+              <a:buNone/>
+            </a:pPr>
+            <a:r>
+              <a:t/>
+            </a:r>
+            <a:endParaRPr b="0" sz="1800" strike="noStrike">
+              <a:solidFill>
+                <a:srgbClr val="000000"/>
+              </a:solidFill>
+              <a:latin typeface="Verdana"/>
+              <a:ea typeface="Verdana"/>
+              <a:cs typeface="Verdana"/>
+              <a:sym typeface="Verdana"/>
+            </a:endParaRPr>
+          </a:p>
+          <a:p>
+            <a:pPr indent="0" lvl="0" marL="0" marR="0" rtl="0" algn="l">
+              <a:spcBef>
+                <a:spcPts val="0"/>
+              </a:spcBef>
+              <a:buSzPct val="25000"/>
+              <a:buNone/>
+            </a:pPr>
+            <a:r>
+              <a:rPr b="0" lang="en-US" sz="1800" strike="noStrike">
+                <a:solidFill>
+                  <a:srgbClr val="000000"/>
+                </a:solidFill>
+                <a:latin typeface="Verdana"/>
+                <a:ea typeface="Verdana"/>
+                <a:cs typeface="Verdana"/>
+                <a:sym typeface="Verdana"/>
+              </a:rPr>
+              <a:t>ENTRYPOINT vs ADD: </a:t>
+            </a:r>
+            <a:r>
+              <a:rPr b="0" lang="en-US" sz="1800" u="sng" strike="noStrike">
+                <a:solidFill>
+                  <a:schemeClr val="hlink"/>
+                </a:solidFill>
+                <a:latin typeface="Verdana"/>
+                <a:ea typeface="Verdana"/>
+                <a:cs typeface="Verdana"/>
+                <a:sym typeface="Verdana"/>
+                <a:hlinkClick r:id="rId10"/>
+              </a:rPr>
+              <a:t>https://www.ctl.io/developers/blog/post/dockerfile-entrypoint-vs-cmd/</a:t>
+            </a:r>
+          </a:p>
+          <a:p>
+            <a:pPr indent="0" lvl="0" marL="0" marR="0" rtl="0" algn="l">
+              <a:spcBef>
+                <a:spcPts val="0"/>
+              </a:spcBef>
+              <a:buSzPct val="25000"/>
+              <a:buNone/>
+            </a:pPr>
+            <a:r>
+              <a:rPr b="0" lang="en-US" sz="1800" strike="noStrike">
+                <a:solidFill>
+                  <a:srgbClr val="000000"/>
+                </a:solidFill>
+                <a:latin typeface="Verdana"/>
+                <a:ea typeface="Verdana"/>
+                <a:cs typeface="Verdana"/>
+                <a:sym typeface="Verdana"/>
+              </a:rPr>
+              <a:t>ADD vs COPY: </a:t>
+            </a:r>
+            <a:r>
+              <a:rPr b="0" lang="en-US" sz="1800" u="sng" strike="noStrike">
+                <a:solidFill>
+                  <a:schemeClr val="hlink"/>
+                </a:solidFill>
+                <a:latin typeface="Verdana"/>
+                <a:ea typeface="Verdana"/>
+                <a:cs typeface="Verdana"/>
+                <a:sym typeface="Verdana"/>
+                <a:hlinkClick r:id="rId11"/>
+              </a:rPr>
+              <a:t>https://www.ctl.io/developers/blog/post/dockerfile-add-vs-copy/</a:t>
+            </a:r>
+          </a:p>
+          <a:p>
+            <a:pPr indent="0" lvl="0" marL="0" marR="0" rtl="0" algn="l">
+              <a:spcBef>
+                <a:spcPts val="0"/>
+              </a:spcBef>
+              <a:buNone/>
+            </a:pPr>
+            <a:r>
+              <a:t/>
+            </a:r>
+            <a:endParaRPr b="0" sz="1800" strike="noStrike">
+              <a:solidFill>
+                <a:srgbClr val="000000"/>
+              </a:solidFill>
+              <a:latin typeface="Verdana"/>
+              <a:ea typeface="Verdana"/>
+              <a:cs typeface="Verdana"/>
+              <a:sym typeface="Verdana"/>
+            </a:endParaRPr>
+          </a:p>
+          <a:p>
+            <a:pPr indent="0" lvl="0" marL="0" marR="0" rtl="0" algn="l">
+              <a:spcBef>
+                <a:spcPts val="0"/>
+              </a:spcBef>
+              <a:buNone/>
+            </a:pPr>
+            <a:r>
+              <a:t/>
+            </a:r>
+            <a:endParaRPr b="0" sz="1800" strike="noStrike">
+              <a:solidFill>
+                <a:srgbClr val="000000"/>
+              </a:solidFill>
+              <a:latin typeface="Verdana"/>
+              <a:ea typeface="Verdana"/>
+              <a:cs typeface="Verdana"/>
+              <a:sym typeface="Verdana"/>
+            </a:endParaRPr>
+          </a:p>
+          <a:p>
+            <a:pPr indent="0" lvl="0" marL="0" marR="0" rtl="0" algn="l">
+              <a:spcBef>
+                <a:spcPts val="0"/>
+              </a:spcBef>
+              <a:buSzPct val="25000"/>
+              <a:buNone/>
+            </a:pPr>
+            <a:r>
+              <a:rPr b="1" lang="en-US" sz="1800" strike="noStrike">
+                <a:solidFill>
+                  <a:srgbClr val="000000"/>
+                </a:solidFill>
+                <a:latin typeface="Verdana"/>
+                <a:ea typeface="Verdana"/>
+                <a:cs typeface="Verdana"/>
+                <a:sym typeface="Verdana"/>
+              </a:rPr>
+              <a:t>Docker Swarm mode</a:t>
+            </a:r>
+          </a:p>
+          <a:p>
+            <a:pPr indent="0" lvl="0" marL="0" marR="0" rtl="0" algn="l">
+              <a:spcBef>
+                <a:spcPts val="0"/>
+              </a:spcBef>
+              <a:buSzPct val="25000"/>
+              <a:buNone/>
+            </a:pPr>
+            <a:r>
+              <a:rPr b="0" lang="en-US" sz="1800" u="sng" strike="noStrike">
+                <a:solidFill>
+                  <a:schemeClr val="hlink"/>
+                </a:solidFill>
+                <a:latin typeface="Verdana"/>
+                <a:ea typeface="Verdana"/>
+                <a:cs typeface="Verdana"/>
+                <a:sym typeface="Verdana"/>
+                <a:hlinkClick r:id="rId12"/>
+              </a:rPr>
+              <a:t>https://docs.docker.com/engine/swarm/</a:t>
+            </a:r>
+          </a:p>
+          <a:p>
+            <a:pPr indent="0" lvl="0" marL="0" marR="0" rtl="0" algn="l">
+              <a:spcBef>
+                <a:spcPts val="0"/>
+              </a:spcBef>
+              <a:buNone/>
+            </a:pPr>
+            <a:r>
+              <a:t/>
+            </a:r>
+            <a:endParaRPr sz="1800">
+              <a:latin typeface="Verdana"/>
+              <a:ea typeface="Verdana"/>
+              <a:cs typeface="Verdana"/>
+              <a:sym typeface="Verdana"/>
+            </a:endParaRPr>
+          </a:p>
+          <a:p>
+            <a:pPr indent="0" lvl="0" marL="0" marR="0" rtl="0" algn="l">
+              <a:spcBef>
+                <a:spcPts val="0"/>
+              </a:spcBef>
+              <a:buSzPct val="25000"/>
+              <a:buNone/>
+            </a:pPr>
+            <a:r>
+              <a:rPr b="1" lang="en-US" sz="1800">
+                <a:latin typeface="Verdana"/>
+                <a:ea typeface="Verdana"/>
+                <a:cs typeface="Verdana"/>
+                <a:sym typeface="Verdana"/>
+              </a:rPr>
+              <a:t>GitHub</a:t>
+            </a:r>
+          </a:p>
+          <a:p>
+            <a:pPr indent="0" lvl="0" marL="0" marR="0" rtl="0" algn="l">
+              <a:spcBef>
+                <a:spcPts val="0"/>
+              </a:spcBef>
+              <a:buSzPct val="25000"/>
+              <a:buNone/>
+            </a:pPr>
+            <a:r>
+              <a:rPr lang="en-US" sz="1800" u="sng">
+                <a:solidFill>
+                  <a:schemeClr val="hlink"/>
+                </a:solidFill>
+                <a:latin typeface="Verdana"/>
+                <a:ea typeface="Verdana"/>
+                <a:cs typeface="Verdana"/>
+                <a:sym typeface="Verdana"/>
+                <a:hlinkClick r:id="rId13"/>
+              </a:rPr>
+              <a:t>https://github.com/luisnabais/course_docker</a:t>
+            </a:r>
+          </a:p>
+        </p:txBody>
+      </p:sp>
+    </p:spTree>
+  </p:cSld>
+  <p:clrMapOvr>
+    <a:masterClrMapping/>
+  </p:clrMapOvr>
+</p:sld>
+</file>
+
+<file path=ppt/slides/slide27.xml><?xml version="1.0" encoding="utf-8"?>
+<p:sld xmlns:a="http://schemas.openxmlformats.org/drawingml/2006/main" xmlns:r="http://schemas.openxmlformats.org/officeDocument/2006/relationships" xmlns:mc="http://schemas.openxmlformats.org/markup-compatibility/2006" xmlns:mv="urn:schemas-microsoft-com:mac:vml" xmlns:p="http://schemas.openxmlformats.org/presentationml/2006/main" xmlns:c="http://schemas.openxmlformats.org/drawingml/2006/chart" xmlns:dgm="http://schemas.openxmlformats.org/drawingml/2006/diagram" xmlns:o="urn:schemas-microsoft-com:office:office" xmlns:v="urn:schemas-microsoft-com:vml" xmlns:pvml="urn:schemas-microsoft-com:office:powerpoint" xmlns:com="http://schemas.openxmlformats.org/drawingml/2006/compatibility" xmlns:p14="http://schemas.microsoft.com/office/powerpoint/2010/main">
+  <p:cSld>
+    <p:bg>
+      <p:bgPr>
+        <a:blipFill rotWithShape="1">
+          <a:blip r:embed="rId3">
+            <a:alphaModFix/>
+          </a:blip>
+          <a:stretch>
+            <a:fillRect b="0" l="0" r="0" t="0"/>
+          </a:stretch>
+        </a:blipFill>
+      </p:bgPr>
+    </p:bg>
+    <p:spTree>
+      <p:nvGrpSpPr>
+        <p:cNvPr id="252" name="Shape 252"/>
+        <p:cNvGrpSpPr/>
+        <p:nvPr/>
+      </p:nvGrpSpPr>
+      <p:grpSpPr>
+        <a:xfrm>
+          <a:off x="0" y="0"/>
+          <a:ext cx="0" cy="0"/>
+          <a:chOff x="0" y="0"/>
+          <a:chExt cx="0" cy="0"/>
+        </a:xfrm>
+      </p:grpSpPr>
+      <p:sp>
+        <p:nvSpPr>
+          <p:cNvPr id="253" name="Shape 253"/>
           <p:cNvSpPr txBox="1"/>
           <p:nvPr/>
         </p:nvSpPr>
@@ -18732,7 +19769,7 @@
     </p:bg>
     <p:spTree>
       <p:nvGrpSpPr>
-        <p:cNvPr id="123" name="Shape 123"/>
+        <p:cNvPr id="124" name="Shape 124"/>
         <p:cNvGrpSpPr/>
         <p:nvPr/>
       </p:nvGrpSpPr>
@@ -18746,7 +19783,7 @@
       </p:grpSpPr>
       <p:sp>
         <p:nvSpPr>
-          <p:cNvPr id="124" name="Shape 124"/>
+          <p:cNvPr id="125" name="Shape 125"/>
           <p:cNvSpPr txBox="1"/>
           <p:nvPr/>
         </p:nvSpPr>
@@ -19011,7 +20048,7 @@
                 <a:cs typeface="Verdana"/>
                 <a:sym typeface="Verdana"/>
               </a:rPr>
-              <a:t>Apache Web Server with PHP language support</a:t>
+              <a:t>MySQL/MariaDB database</a:t>
             </a:r>
           </a:p>
           <a:p>
@@ -19036,7 +20073,7 @@
                 <a:cs typeface="Verdana"/>
                 <a:sym typeface="Verdana"/>
               </a:rPr>
-              <a:t>MySQL/MariaDB database</a:t>
+              <a:t>Apache Web Server with PHP language support &amp; Wordpress</a:t>
             </a:r>
           </a:p>
           <a:p>
@@ -19061,7 +20098,7 @@
                 <a:cs typeface="Verdana"/>
                 <a:sym typeface="Verdana"/>
               </a:rPr>
-              <a:t>Deploy Wordpress</a:t>
+              <a:t>Scale Wordpress, using a Load balancer (PoC)</a:t>
             </a:r>
           </a:p>
           <a:p>
@@ -19086,32 +20123,7 @@
                 <a:cs typeface="Verdana"/>
                 <a:sym typeface="Verdana"/>
               </a:rPr>
-              <a:t>Scale Wordpress, using a Load balancer</a:t>
-            </a:r>
-          </a:p>
-          <a:p>
-            <a:pPr indent="-342900" lvl="0" marL="457200" rtl="0">
-              <a:spcBef>
-                <a:spcPts val="0"/>
-              </a:spcBef>
-              <a:buClr>
-                <a:schemeClr val="dk1"/>
-              </a:buClr>
-              <a:buSzPct val="100000"/>
-              <a:buFont typeface="Verdana"/>
-              <a:buAutoNum type="arabicPeriod"/>
-            </a:pPr>
-            <a:r>
-              <a:rPr lang="en-US" sz="1800">
-                <a:solidFill>
-                  <a:schemeClr val="dk1"/>
-                </a:solidFill>
-                <a:latin typeface="Verdana"/>
-                <a:ea typeface="Verdana"/>
-                <a:cs typeface="Verdana"/>
-                <a:sym typeface="Verdana"/>
-              </a:rPr>
-              <a:t>Upgrade Wordpress, using Blue/Green Deployment</a:t>
+              <a:t>Upgrade Wordpress, using Blue/Green Deployment (PoC)</a:t>
             </a:r>
           </a:p>
           <a:p>
@@ -19176,21 +20188,68 @@
                 <a:cs typeface="Verdana"/>
                 <a:sym typeface="Verdana"/>
               </a:rPr>
-              <a:t>Docker update (ex: restart policy)</a:t>
-            </a:r>
-          </a:p>
-          <a:p>
-            <a:pPr indent="-342900" lvl="0" marL="457200" rtl="0">
-              <a:spcBef>
-                <a:spcPts val="0"/>
-              </a:spcBef>
-              <a:buClr>
+              <a:t>Automation basics (Scripting, Docker Compose, CI/CD, Ansible, DevOps)</a:t>
+            </a:r>
+          </a:p>
+          <a:p>
+            <a:pPr lvl="0" rtl="0">
+              <a:spcBef>
+                <a:spcPts val="0"/>
+              </a:spcBef>
+              <a:buNone/>
+            </a:pPr>
+            <a:r>
+              <a:t/>
+            </a:r>
+            <a:endParaRPr sz="1800">
+              <a:solidFill>
                 <a:schemeClr val="dk1"/>
-              </a:buClr>
-              <a:buSzPct val="100000"/>
-              <a:buFont typeface="Verdana"/>
-              <a:buChar char="●"/>
-            </a:pPr>
+              </a:solidFill>
+              <a:latin typeface="Verdana"/>
+              <a:ea typeface="Verdana"/>
+              <a:cs typeface="Verdana"/>
+              <a:sym typeface="Verdana"/>
+            </a:endParaRPr>
+          </a:p>
+          <a:p>
+            <a:pPr lvl="0" rtl="0">
+              <a:spcBef>
+                <a:spcPts val="0"/>
+              </a:spcBef>
+              <a:buNone/>
+            </a:pPr>
+            <a:r>
+              <a:t/>
+            </a:r>
+            <a:endParaRPr sz="1800">
+              <a:solidFill>
+                <a:schemeClr val="dk1"/>
+              </a:solidFill>
+              <a:latin typeface="Verdana"/>
+              <a:ea typeface="Verdana"/>
+              <a:cs typeface="Verdana"/>
+              <a:sym typeface="Verdana"/>
+            </a:endParaRPr>
+          </a:p>
+          <a:p>
+            <a:pPr lvl="0" rtl="0">
+              <a:spcBef>
+                <a:spcPts val="0"/>
+              </a:spcBef>
+              <a:buNone/>
+            </a:pPr>
+            <a:r>
+              <a:rPr b="1" lang="en-US" sz="1800">
+                <a:solidFill>
+                  <a:schemeClr val="dk1"/>
+                </a:solidFill>
+                <a:latin typeface="Verdana"/>
+                <a:ea typeface="Verdana"/>
+                <a:cs typeface="Verdana"/>
+                <a:sym typeface="Verdana"/>
+              </a:rPr>
+              <a:t>NOTE</a:t>
+            </a:r>
             <a:r>
               <a:rPr lang="en-US" sz="1800">
                 <a:solidFill>
@@ -19201,7 +20260,20 @@
                 <a:cs typeface="Verdana"/>
                 <a:sym typeface="Verdana"/>
               </a:rPr>
-              <a:t>Automation basics (Scripting, CI/CD, Ansible, DevOps)</a:t>
+              <a:t>: All resources are available at </a:t>
+            </a:r>
+            <a:r>
+              <a:rPr lang="en-US" sz="1800" u="sng">
+                <a:solidFill>
+                  <a:schemeClr val="hlink"/>
+                </a:solidFill>
+                <a:latin typeface="Verdana"/>
+                <a:ea typeface="Verdana"/>
+                <a:cs typeface="Verdana"/>
+                <a:sym typeface="Verdana"/>
+                <a:hlinkClick r:id="rId4"/>
+              </a:rPr>
+              <a:t>https://github.com/luisnabais/course_docker</a:t>
             </a:r>
           </a:p>
         </p:txBody>
@@ -19231,7 +20303,7 @@
     </p:bg>
     <p:spTree>
       <p:nvGrpSpPr>
-        <p:cNvPr id="128" name="Shape 128"/>
+        <p:cNvPr id="129" name="Shape 129"/>
         <p:cNvGrpSpPr/>
         <p:nvPr/>
       </p:nvGrpSpPr>
@@ -19245,7 +20317,7 @@
       </p:grpSpPr>
       <p:sp>
         <p:nvSpPr>
-          <p:cNvPr id="129" name="Shape 129"/>
+          <p:cNvPr id="130" name="Shape 130"/>
           <p:cNvSpPr txBox="1"/>
           <p:nvPr/>
         </p:nvSpPr>
@@ -19341,7 +20413,7 @@
       </p:sp>
       <p:pic>
         <p:nvPicPr>
-          <p:cNvPr descr="Monolith vs Microservices.png" id="130" name="Shape 130"/>
+          <p:cNvPr descr="Monolith vs Microservices.png" id="131" name="Shape 131"/>
           <p:cNvPicPr preferRelativeResize="0"/>
           <p:nvPr/>
         </p:nvPicPr>
@@ -19391,7 +20463,7 @@
     </p:bg>
     <p:spTree>
       <p:nvGrpSpPr>
-        <p:cNvPr id="134" name="Shape 134"/>
+        <p:cNvPr id="135" name="Shape 135"/>
         <p:cNvGrpSpPr/>
         <p:nvPr/>
       </p:nvGrpSpPr>
@@ -19405,7 +20477,7 @@
       </p:grpSpPr>
       <p:sp>
         <p:nvSpPr>
-          <p:cNvPr id="135" name="Shape 135"/>
+          <p:cNvPr id="136" name="Shape 136"/>
           <p:cNvSpPr txBox="1"/>
           <p:nvPr/>
         </p:nvSpPr>
@@ -19493,7 +20565,7 @@
       </p:sp>
       <p:graphicFrame>
         <p:nvGraphicFramePr>
-          <p:cNvPr id="136" name="Shape 136"/>
+          <p:cNvPr id="137" name="Shape 137"/>
           <p:cNvGraphicFramePr/>
           <p:nvPr/>
         </p:nvGraphicFramePr>
@@ -19506,7 +20578,7 @@
             <a:tbl>
               <a:tblPr>
                 <a:noFill/>
-                <a:tableStyleId>{0F5AFBBD-0132-4098-B4D4-5C2DB458ECBB}</a:tableStyleId>
+                <a:tableStyleId>{26064C0A-906A-447C-9007-10C3C800CA92}</a:tableStyleId>
               </a:tblPr>
               <a:tblGrid>
                 <a:gridCol w="872600"/>
@@ -19660,7 +20732,7 @@
                       </a:pPr>
                       <a:r>
                         <a:rPr lang="en-US"/>
-                        <a:t>Easier to develop, understand and maintain</a:t>
+                        <a:t>Easier to develop, understand, upgrade and maintain</a:t>
                       </a:r>
                     </a:p>
                     <a:p>
@@ -19709,18 +20781,6 @@
                       <a:r>
                         <a:rPr lang="en-US"/>
                         <a:t>Not stuck with any stack</a:t>
-                      </a:r>
-                    </a:p>
-                    <a:p>
-                      <a:pPr indent="-228600" lvl="0" marL="457200" rtl="0">
-                        <a:spcBef>
-                          <a:spcPts val="0"/>
-                        </a:spcBef>
-                        <a:buChar char="●"/>
-                      </a:pPr>
-                      <a:r>
-                        <a:rPr lang="en-US"/>
-                        <a:t>Allows easy and fast deployment, regardless of environment</a:t>
                       </a:r>
                     </a:p>
                   </a:txBody>
@@ -19861,7 +20921,7 @@
     </p:bg>
     <p:spTree>
       <p:nvGrpSpPr>
-        <p:cNvPr id="140" name="Shape 140"/>
+        <p:cNvPr id="141" name="Shape 141"/>
         <p:cNvGrpSpPr/>
         <p:nvPr/>
       </p:nvGrpSpPr>
@@ -19875,14 +20935,14 @@
       </p:grpSpPr>
       <p:sp>
         <p:nvSpPr>
-          <p:cNvPr id="141" name="Shape 141"/>
+          <p:cNvPr id="142" name="Shape 142"/>
           <p:cNvSpPr txBox="1"/>
           <p:nvPr/>
         </p:nvSpPr>
         <p:spPr>
           <a:xfrm>
             <a:off x="182875" y="182875"/>
-            <a:ext cx="11795700" cy="6191699"/>
+            <a:ext cx="11795700" cy="6370800"/>
           </a:xfrm>
           <a:prstGeom prst="rect">
             <a:avLst/>
@@ -19977,7 +21037,15 @@
                 <a:cs typeface="Verdana"/>
                 <a:sym typeface="Verdana"/>
               </a:rPr>
-              <a:t>Remember Docker (and microservices) main rule: </a:t>
+              <a:t>Although Microservices’s main rule is </a:t>
+            </a:r>
+            <a:r>
+              <a:rPr i="1" lang="en-US" sz="1800">
+                <a:solidFill>
+                  <a:schemeClr val="dk1"/>
+                </a:solidFill>
+              </a:rPr>
+              <a:t>One container per process</a:t>
             </a:r>
             <a:r>
               <a:rPr lang="en-US" sz="1800">
@@ -19985,7 +21053,7 @@
                   <a:schemeClr val="dk1"/>
                 </a:solidFill>
               </a:rPr>
-              <a:t>One container per process. But </a:t>
+              <a:t>, </a:t>
             </a:r>
             <a:r>
               <a:rPr lang="en-US" sz="1800">
@@ -19997,7 +21065,7 @@
                 <a:cs typeface="Verdana"/>
                 <a:sym typeface="Verdana"/>
               </a:rPr>
-              <a:t>sometimes a Monolith Application is the only way. Prepare for some complications, though.</a:t>
+              <a:t>sometimes a Monolith Application is the only way.</a:t>
             </a:r>
           </a:p>
           <a:p>
@@ -20059,7 +21127,7 @@
                 <a:cs typeface="Verdana"/>
                 <a:sym typeface="Verdana"/>
               </a:rPr>
-              <a:t>We need to use a tool such as Supervisord, a process control system. That way, Docker only needs to manage Supervisord process, which by itself keeps the processes running, allows start/stop/restart.</a:t>
+              <a:t>With a process control tool such as Supervisord. Docker only needs to manage Supervisord process, which by itself keeps the processes running and allows start/stop/restart.</a:t>
             </a:r>
           </a:p>
           <a:p>
@@ -20112,6 +21180,18 @@
               <a:buNone/>
             </a:pPr>
             <a:r>
+              <a:rPr lang="en-US" sz="1800" u="sng">
+                <a:solidFill>
+                  <a:schemeClr val="dk1"/>
+                </a:solidFill>
+                <a:latin typeface="Verdana"/>
+                <a:ea typeface="Verdana"/>
+                <a:cs typeface="Verdana"/>
+                <a:sym typeface="Verdana"/>
+              </a:rPr>
+              <a:t>Docker is not a VM</a:t>
+            </a:r>
+            <a:r>
               <a:rPr lang="en-US" sz="1800">
                 <a:solidFill>
                   <a:schemeClr val="dk1"/>
@@ -20121,7 +21201,7 @@
                 <a:cs typeface="Verdana"/>
                 <a:sym typeface="Verdana"/>
               </a:rPr>
-              <a:t>Let’s just go a little bit low level.</a:t>
+              <a:t>. Can’t have it’s own modules, doesn’t need init as PID 1, doesn’t have syslogd, cron, etc.</a:t>
             </a:r>
           </a:p>
           <a:p>
@@ -20142,7 +21222,7 @@
                 <a:cs typeface="Verdana"/>
                 <a:sym typeface="Verdana"/>
               </a:rPr>
-              <a:t>Docker is not a VM. It uses the host’s kernel (or docker machine’s, if it’s not a Linux Host), can’t have it’s own modules, doesn’t need init as PID 1, doesn’t need syslogd, cron, etc.</a:t>
+              <a:t>Docker uses the host’s kernel (or docker machine’s, if it’s not a Linux Host), it’s processes are visible on the host machine. It’s a glorified chroot, which uses the host’s systemd, Kernel Namespaces and Control Groups.</a:t>
             </a:r>
           </a:p>
           <a:p>
@@ -20163,7 +21243,7 @@
                 <a:cs typeface="Verdana"/>
                 <a:sym typeface="Verdana"/>
               </a:rPr>
-              <a:t>Docker’s processes are visible on the host machine. It’s a glorified chroot, which uses the host’s systemd, Kernel Namespaces, Control Groups (cgroups), </a:t>
+              <a:t>That’s why docker processes run in the foreground, not in the background, such as daemons. If a process is started in the background, the container will be stopped.</a:t>
             </a:r>
           </a:p>
           <a:p>
@@ -20174,7 +21254,7 @@
               <a:buSzPct val="25000"/>
               <a:buNone/>
             </a:pPr>
-            <a:r>
+            <a:br>
               <a:rPr lang="en-US" sz="1800">
                 <a:solidFill>
                   <a:schemeClr val="dk1"/>
@@ -20184,28 +21264,30 @@
                 <a:cs typeface="Verdana"/>
                 <a:sym typeface="Verdana"/>
               </a:rPr>
-              <a:t>That’s why docker processes run in the foreground, not in the background, such as daemons. If a process is started in the background, the container will be stopped.</a:t>
-            </a:r>
-          </a:p>
-          <a:p>
-            <a:pPr lvl="0" rtl="0">
-              <a:spcBef>
-                <a:spcPts val="0"/>
-              </a:spcBef>
-              <a:buNone/>
-            </a:pPr>
-            <a:r>
-              <a:t/>
-            </a:r>
-            <a:endParaRPr sz="1800">
-              <a:solidFill>
-                <a:schemeClr val="dk1"/>
-              </a:solidFill>
-              <a:latin typeface="Verdana"/>
-              <a:ea typeface="Verdana"/>
-              <a:cs typeface="Verdana"/>
-              <a:sym typeface="Verdana"/>
-            </a:endParaRPr>
+            </a:br>
+            <a:r>
+              <a:rPr lang="en-US" sz="1800">
+                <a:solidFill>
+                  <a:schemeClr val="dk1"/>
+                </a:solidFill>
+                <a:latin typeface="Verdana"/>
+                <a:ea typeface="Verdana"/>
+                <a:cs typeface="Verdana"/>
+                <a:sym typeface="Verdana"/>
+              </a:rPr>
+              <a:t>But please, if possible, use only Microservices.</a:t>
+            </a:r>
+            <a:br>
+              <a:rPr lang="en-US" sz="1800">
+                <a:solidFill>
+                  <a:schemeClr val="dk1"/>
+                </a:solidFill>
+                <a:latin typeface="Verdana"/>
+                <a:ea typeface="Verdana"/>
+                <a:cs typeface="Verdana"/>
+                <a:sym typeface="Verdana"/>
+              </a:rPr>
+            </a:br>
           </a:p>
           <a:p>
             <a:pPr lvl="0" rtl="0">
@@ -20420,7 +21502,7 @@
     </p:bg>
     <p:spTree>
       <p:nvGrpSpPr>
-        <p:cNvPr id="145" name="Shape 145"/>
+        <p:cNvPr id="146" name="Shape 146"/>
         <p:cNvGrpSpPr/>
         <p:nvPr/>
       </p:nvGrpSpPr>
@@ -20434,7 +21516,7 @@
       </p:grpSpPr>
       <p:sp>
         <p:nvSpPr>
-          <p:cNvPr id="146" name="Shape 146"/>
+          <p:cNvPr id="147" name="Shape 147"/>
           <p:cNvSpPr txBox="1"/>
           <p:nvPr/>
         </p:nvSpPr>
@@ -20518,7 +21600,7 @@
       </p:sp>
       <p:pic>
         <p:nvPicPr>
-          <p:cNvPr id="147" name="Shape 147"/>
+          <p:cNvPr id="148" name="Shape 148"/>
           <p:cNvPicPr preferRelativeResize="0"/>
           <p:nvPr/>
         </p:nvPicPr>
@@ -20569,7 +21651,7 @@
     </p:bg>
     <p:spTree>
       <p:nvGrpSpPr>
-        <p:cNvPr id="151" name="Shape 151"/>
+        <p:cNvPr id="152" name="Shape 152"/>
         <p:cNvGrpSpPr/>
         <p:nvPr/>
       </p:nvGrpSpPr>
@@ -20583,7 +21665,7 @@
       </p:grpSpPr>
       <p:sp>
         <p:nvSpPr>
-          <p:cNvPr id="152" name="Shape 152"/>
+          <p:cNvPr id="153" name="Shape 153"/>
           <p:cNvSpPr txBox="1"/>
           <p:nvPr/>
         </p:nvSpPr>
@@ -20667,7 +21749,7 @@
       </p:sp>
       <p:pic>
         <p:nvPicPr>
-          <p:cNvPr id="153" name="Shape 153"/>
+          <p:cNvPr id="154" name="Shape 154"/>
           <p:cNvPicPr preferRelativeResize="0"/>
           <p:nvPr/>
         </p:nvPicPr>
@@ -20717,7 +21799,7 @@
     </p:bg>
     <p:spTree>
       <p:nvGrpSpPr>
-        <p:cNvPr id="157" name="Shape 157"/>
+        <p:cNvPr id="158" name="Shape 158"/>
         <p:cNvGrpSpPr/>
         <p:nvPr/>
       </p:nvGrpSpPr>
@@ -20731,7 +21813,7 @@
       </p:grpSpPr>
       <p:sp>
         <p:nvSpPr>
-          <p:cNvPr id="158" name="Shape 158"/>
+          <p:cNvPr id="159" name="Shape 159"/>
           <p:cNvSpPr txBox="1"/>
           <p:nvPr/>
         </p:nvSpPr>
@@ -20962,33 +22044,6 @@
             </a:pPr>
             <a:r>
               <a:rPr lang="en-US" sz="1800">
-                <a:latin typeface="Verdana"/>
-                <a:ea typeface="Verdana"/>
-                <a:cs typeface="Verdana"/>
-                <a:sym typeface="Verdana"/>
-              </a:rPr>
-              <a:t>We can create our own Docker Registry. It allows to have the images we need locally, or in an internal network, as many as we want.</a:t>
-            </a:r>
-          </a:p>
-          <a:p>
-            <a:pPr indent="0" lvl="0" marL="0" marR="0" rtl="0" algn="l">
-              <a:spcBef>
-                <a:spcPts val="0"/>
-              </a:spcBef>
-              <a:buSzPct val="25000"/>
-              <a:buNone/>
-            </a:pPr>
-            <a:r>
-              <a:rPr lang="en-US" sz="1800">
-                <a:latin typeface="Verdana"/>
-                <a:ea typeface="Verdana"/>
-                <a:cs typeface="Verdana"/>
-                <a:sym typeface="Verdana"/>
-              </a:rPr>
-              <a:t>A custom registry, regardless of the tool used, if publicly (or in internal network) available, </a:t>
-            </a:r>
-            <a:r>
-              <a:rPr lang="en-US" sz="1800">
                 <a:solidFill>
                   <a:schemeClr val="dk1"/>
                 </a:solidFill>
@@ -20997,7 +22052,7 @@
                 <a:cs typeface="Verdana"/>
                 <a:sym typeface="Verdana"/>
               </a:rPr>
-              <a:t>allows much easier deployment, as it allows sharing.</a:t>
+              <a:t>Allows much easier deployment, as it allows sharing images in a network.</a:t>
             </a:r>
           </a:p>
           <a:p>
@@ -21015,7 +22070,7 @@
                 <a:cs typeface="Verdana"/>
                 <a:sym typeface="Verdana"/>
               </a:rPr>
-              <a:t>There are plenty of ways to do that. The easiest is to use the registry container, like this:</a:t>
+              <a:t>The easiest way to create a Registry is to use the registry container, like this:</a:t>
             </a:r>
           </a:p>
           <a:p>
@@ -21103,7 +22158,7 @@
                 <a:cs typeface="Verdana"/>
                 <a:sym typeface="Verdana"/>
               </a:rPr>
-              <a:t>Insert image in custom registry</a:t>
+              <a:t>Push image to custom registry</a:t>
             </a:r>
           </a:p>
           <a:p>
@@ -21254,7 +22309,7 @@
       </p:sp>
       <p:sp>
         <p:nvSpPr>
-          <p:cNvPr id="159" name="Shape 159"/>
+          <p:cNvPr id="160" name="Shape 160"/>
           <p:cNvSpPr/>
           <p:nvPr/>
         </p:nvSpPr>

</xml_diff>

<commit_message>
Added Docker Swarm slides
</commit_message>
<xml_diff>
--- a/slides/02_intermediate_course_slides.pptx
+++ b/slides/02_intermediate_course_slides.pptx
@@ -14438,7 +14438,7 @@
                 <a:cs typeface="Verdana"/>
                 <a:sym typeface="Verdana"/>
               </a:rPr>
-              <a:t>docker run -d -ti \</a:t>
+              <a:t>docker container run -d -ti \</a:t>
             </a:r>
           </a:p>
           <a:p>
@@ -15587,7 +15587,7 @@
                 <a:cs typeface="Verdana"/>
                 <a:sym typeface="Verdana"/>
               </a:rPr>
-              <a:t># docker build -t fm-wordpress:4.6.1 .</a:t>
+              <a:t># docker image build -t fm-wordpress:4.6.1 .</a:t>
             </a:r>
           </a:p>
           <a:p>
@@ -15643,7 +15643,7 @@
                 <a:cs typeface="Verdana"/>
                 <a:sym typeface="Verdana"/>
               </a:rPr>
-              <a:t># docker run -d -ti \</a:t>
+              <a:t># docker container run -d -ti \</a:t>
             </a:r>
           </a:p>
           <a:p>
@@ -16029,7 +16029,7 @@
                 <a:cs typeface="Verdana"/>
                 <a:sym typeface="Verdana"/>
               </a:rPr>
-              <a:t># docker run -d -ti \</a:t>
+              <a:t># docker container run -d -ti \</a:t>
             </a:r>
           </a:p>
           <a:p>
@@ -16895,7 +16895,7 @@
                 <a:cs typeface="Verdana"/>
                 <a:sym typeface="Verdana"/>
               </a:rPr>
-              <a:t># docker rename fm-wordpress fm-wordpress-1</a:t>
+              <a:t># docker container rename fm-wordpress fm-wordpress-1</a:t>
             </a:r>
           </a:p>
           <a:p>
@@ -16954,7 +16954,28 @@
                 <a:cs typeface="Verdana"/>
                 <a:sym typeface="Verdana"/>
               </a:rPr>
-              <a:t># docker run -d -ti \</a:t>
+              <a:t># docker </a:t>
+            </a:r>
+            <a:r>
+              <a:rPr lang="en-US" sz="1800">
+                <a:solidFill>
+                  <a:schemeClr val="dk1"/>
+                </a:solidFill>
+                <a:latin typeface="Verdana"/>
+                <a:ea typeface="Verdana"/>
+                <a:cs typeface="Verdana"/>
+                <a:sym typeface="Verdana"/>
+              </a:rPr>
+              <a:t>container </a:t>
+            </a:r>
+            <a:r>
+              <a:rPr lang="en-US" sz="1800">
+                <a:latin typeface="Verdana"/>
+                <a:ea typeface="Verdana"/>
+                <a:cs typeface="Verdana"/>
+                <a:sym typeface="Verdana"/>
+              </a:rPr>
+              <a:t>run -d -ti \</a:t>
             </a:r>
           </a:p>
           <a:p>
@@ -17256,7 +17277,28 @@
                 <a:cs typeface="Verdana"/>
                 <a:sym typeface="Verdana"/>
               </a:rPr>
-              <a:t>docker run -d -ti \</a:t>
+              <a:t>docker </a:t>
+            </a:r>
+            <a:r>
+              <a:rPr lang="en-US" sz="1800">
+                <a:solidFill>
+                  <a:schemeClr val="dk1"/>
+                </a:solidFill>
+                <a:latin typeface="Verdana"/>
+                <a:ea typeface="Verdana"/>
+                <a:cs typeface="Verdana"/>
+                <a:sym typeface="Verdana"/>
+              </a:rPr>
+              <a:t>container </a:t>
+            </a:r>
+            <a:r>
+              <a:rPr lang="en-US" sz="1800">
+                <a:latin typeface="Verdana"/>
+                <a:ea typeface="Verdana"/>
+                <a:cs typeface="Verdana"/>
+                <a:sym typeface="Verdana"/>
+              </a:rPr>
+              <a:t>run -d -ti \</a:t>
             </a:r>
           </a:p>
           <a:p>
@@ -17876,7 +17918,28 @@
                 <a:cs typeface="Verdana"/>
                 <a:sym typeface="Verdana"/>
               </a:rPr>
-              <a:t>docker run -d -ti \</a:t>
+              <a:t>docker </a:t>
+            </a:r>
+            <a:r>
+              <a:rPr lang="en-US" sz="1800">
+                <a:solidFill>
+                  <a:schemeClr val="dk1"/>
+                </a:solidFill>
+                <a:latin typeface="Verdana"/>
+                <a:ea typeface="Verdana"/>
+                <a:cs typeface="Verdana"/>
+                <a:sym typeface="Verdana"/>
+              </a:rPr>
+              <a:t>container </a:t>
+            </a:r>
+            <a:r>
+              <a:rPr lang="en-US" sz="1800">
+                <a:latin typeface="Verdana"/>
+                <a:ea typeface="Verdana"/>
+                <a:cs typeface="Verdana"/>
+                <a:sym typeface="Verdana"/>
+              </a:rPr>
+              <a:t>run -d -ti \</a:t>
             </a:r>
           </a:p>
           <a:p>
@@ -18153,7 +18216,28 @@
                 <a:cs typeface="Verdana"/>
                 <a:sym typeface="Verdana"/>
               </a:rPr>
-              <a:t># docker restart fm-lb (it will be so fast, any request in the mean time won’t even timeout)</a:t>
+              <a:t># docker </a:t>
+            </a:r>
+            <a:r>
+              <a:rPr lang="en-US" sz="1800">
+                <a:solidFill>
+                  <a:schemeClr val="dk1"/>
+                </a:solidFill>
+                <a:latin typeface="Verdana"/>
+                <a:ea typeface="Verdana"/>
+                <a:cs typeface="Verdana"/>
+                <a:sym typeface="Verdana"/>
+              </a:rPr>
+              <a:t>container </a:t>
+            </a:r>
+            <a:r>
+              <a:rPr lang="en-US" sz="1800">
+                <a:latin typeface="Verdana"/>
+                <a:ea typeface="Verdana"/>
+                <a:cs typeface="Verdana"/>
+                <a:sym typeface="Verdana"/>
+              </a:rPr>
+              <a:t>restart fm-lb (it will be so fast, any request in the mean time won’t even timeout)</a:t>
             </a:r>
           </a:p>
         </p:txBody>
@@ -18671,7 +18755,31 @@
                 <a:cs typeface="Verdana"/>
                 <a:sym typeface="Verdana"/>
               </a:rPr>
-              <a:t># docker update --restart always </a:t>
+              <a:t># docker </a:t>
+            </a:r>
+            <a:r>
+              <a:rPr lang="en-US" sz="1800">
+                <a:solidFill>
+                  <a:schemeClr val="dk1"/>
+                </a:solidFill>
+                <a:latin typeface="Verdana"/>
+                <a:ea typeface="Verdana"/>
+                <a:cs typeface="Verdana"/>
+                <a:sym typeface="Verdana"/>
+              </a:rPr>
+              <a:t>container </a:t>
+            </a:r>
+            <a:r>
+              <a:rPr lang="en-US" sz="1800">
+                <a:solidFill>
+                  <a:schemeClr val="dk1"/>
+                </a:solidFill>
+                <a:latin typeface="Verdana"/>
+                <a:ea typeface="Verdana"/>
+                <a:cs typeface="Verdana"/>
+                <a:sym typeface="Verdana"/>
+              </a:rPr>
+              <a:t>update --restart always </a:t>
             </a:r>
           </a:p>
           <a:p>
@@ -18693,7 +18801,28 @@
                 <a:cs typeface="Verdana"/>
                 <a:sym typeface="Verdana"/>
               </a:rPr>
-              <a:t># docker update --cpu-shares 512 </a:t>
+              <a:t># docker </a:t>
+            </a:r>
+            <a:r>
+              <a:rPr lang="en-US" sz="1800">
+                <a:solidFill>
+                  <a:schemeClr val="dk1"/>
+                </a:solidFill>
+                <a:latin typeface="Verdana"/>
+                <a:ea typeface="Verdana"/>
+                <a:cs typeface="Verdana"/>
+                <a:sym typeface="Verdana"/>
+              </a:rPr>
+              <a:t>container </a:t>
+            </a:r>
+            <a:r>
+              <a:rPr lang="en-US" sz="1800">
+                <a:latin typeface="Verdana"/>
+                <a:ea typeface="Verdana"/>
+                <a:cs typeface="Verdana"/>
+                <a:sym typeface="Verdana"/>
+              </a:rPr>
+              <a:t>update --cpu-shares 512 </a:t>
             </a:r>
             <a:r>
               <a:rPr i="1" lang="en-US" sz="1800">
@@ -18730,7 +18859,31 @@
                 <a:cs typeface="Verdana"/>
                 <a:sym typeface="Verdana"/>
               </a:rPr>
-              <a:t># docker update -m 300M </a:t>
+              <a:t># docker </a:t>
+            </a:r>
+            <a:r>
+              <a:rPr lang="en-US" sz="1800">
+                <a:solidFill>
+                  <a:schemeClr val="dk1"/>
+                </a:solidFill>
+                <a:latin typeface="Verdana"/>
+                <a:ea typeface="Verdana"/>
+                <a:cs typeface="Verdana"/>
+                <a:sym typeface="Verdana"/>
+              </a:rPr>
+              <a:t>container </a:t>
+            </a:r>
+            <a:r>
+              <a:rPr lang="en-US" sz="1800">
+                <a:solidFill>
+                  <a:schemeClr val="dk1"/>
+                </a:solidFill>
+                <a:latin typeface="Verdana"/>
+                <a:ea typeface="Verdana"/>
+                <a:cs typeface="Verdana"/>
+                <a:sym typeface="Verdana"/>
+              </a:rPr>
+              <a:t>update -m 300M </a:t>
             </a:r>
             <a:r>
               <a:rPr i="1" lang="en-US" sz="1800">
@@ -18816,7 +18969,31 @@
                 <a:cs typeface="Verdana"/>
                 <a:sym typeface="Verdana"/>
               </a:rPr>
-              <a:t># docker stats </a:t>
+              <a:t># docker </a:t>
+            </a:r>
+            <a:r>
+              <a:rPr lang="en-US" sz="1800">
+                <a:solidFill>
+                  <a:schemeClr val="dk1"/>
+                </a:solidFill>
+                <a:latin typeface="Verdana"/>
+                <a:ea typeface="Verdana"/>
+                <a:cs typeface="Verdana"/>
+                <a:sym typeface="Verdana"/>
+              </a:rPr>
+              <a:t>container </a:t>
+            </a:r>
+            <a:r>
+              <a:rPr lang="en-US" sz="1800">
+                <a:solidFill>
+                  <a:schemeClr val="dk1"/>
+                </a:solidFill>
+                <a:latin typeface="Verdana"/>
+                <a:ea typeface="Verdana"/>
+                <a:cs typeface="Verdana"/>
+                <a:sym typeface="Verdana"/>
+              </a:rPr>
+              <a:t>stats </a:t>
             </a:r>
             <a:r>
               <a:rPr i="1" lang="en-US" sz="1800">
@@ -20631,7 +20808,7 @@
             <a:tbl>
               <a:tblPr>
                 <a:noFill/>
-                <a:tableStyleId>{A5AECC3D-2ACE-4F0A-8B75-9B61A747FE83}</a:tableStyleId>
+                <a:tableStyleId>{E4EE57B6-8E5A-4974-AE13-EB089E8A5BAC}</a:tableStyleId>
               </a:tblPr>
               <a:tblGrid>
                 <a:gridCol w="872600"/>
@@ -22149,7 +22326,7 @@
                 <a:cs typeface="Verdana"/>
                 <a:sym typeface="Verdana"/>
               </a:rPr>
-              <a:t># docker pull registry:2.5.1 (check versions at the link above)</a:t>
+              <a:t># docker image pull registry:2.5.1 (check versions at the link above)</a:t>
             </a:r>
           </a:p>
           <a:p>
@@ -22167,7 +22344,7 @@
                 <a:cs typeface="Verdana"/>
                 <a:sym typeface="Verdana"/>
               </a:rPr>
-              <a:t># docker run -d --name fm-registry -p 5000:5000 registry:2.5.1</a:t>
+              <a:t># docker container run -d --name fm-registry -p 5000:5000 registry:2.5.1</a:t>
             </a:r>
           </a:p>
           <a:p>
@@ -22224,7 +22401,7 @@
                 <a:cs typeface="Verdana"/>
                 <a:sym typeface="Verdana"/>
               </a:rPr>
-              <a:t># docker pull mariadb:10.1.19</a:t>
+              <a:t># docker image pull mariadb:10.1.19</a:t>
             </a:r>
           </a:p>
           <a:p>
@@ -22242,7 +22419,7 @@
                 <a:cs typeface="Verdana"/>
                 <a:sym typeface="Verdana"/>
               </a:rPr>
-              <a:t># docker tag mariadb:10.1.19 localhost:5000/mariadb:10.1.19</a:t>
+              <a:t># docker image tag mariadb:10.1.19 localhost:5000/mariadb:10.1.19</a:t>
             </a:r>
           </a:p>
           <a:p>
@@ -22260,7 +22437,7 @@
                 <a:cs typeface="Verdana"/>
                 <a:sym typeface="Verdana"/>
               </a:rPr>
-              <a:t># docker push localhost:5000/mariadb:10.1.19</a:t>
+              <a:t># docker image push localhost:5000/mariadb:10.1.19</a:t>
             </a:r>
           </a:p>
           <a:p>
@@ -22317,7 +22494,7 @@
                 <a:cs typeface="Verdana"/>
                 <a:sym typeface="Verdana"/>
               </a:rPr>
-              <a:t># docker pull </a:t>
+              <a:t># docker image pull </a:t>
             </a:r>
             <a:r>
               <a:rPr lang="en-US" sz="1800">

</xml_diff>

<commit_message>
Updated slides to last version
</commit_message>
<xml_diff>
--- a/slides/02_intermediate_course_slides.pptx
+++ b/slides/02_intermediate_course_slides.pptx
@@ -42,6 +42,7 @@
     <p:sldId id="286" r:id="rId37"/>
     <p:sldId id="287" r:id="rId38"/>
     <p:sldId id="288" r:id="rId39"/>
+    <p:sldId id="289" r:id="rId40"/>
   </p:sldIdLst>
   <p:sldSz cy="6858000" cx="12192000"/>
   <p:notesSz cx="7772400" cy="10058400"/>
@@ -2788,7 +2789,85 @@
               <a:buNone/>
             </a:pPr>
             <a:r>
+              <a:rPr lang="en-US" u="sng">
+                <a:solidFill>
+                  <a:schemeClr val="hlink"/>
+                </a:solidFill>
+                <a:hlinkClick r:id="rId2"/>
+              </a:rPr>
+              <a:t>https://docs.docker.com/compose/wordpress/</a:t>
+            </a:r>
+            <a:endParaRPr/>
+          </a:p>
+          <a:p>
+            <a:pPr indent="0" lvl="0" marL="0" rtl="0" algn="l">
+              <a:spcBef>
+                <a:spcPts val="0"/>
+              </a:spcBef>
+              <a:spcAft>
+                <a:spcPts val="0"/>
+              </a:spcAft>
+              <a:buNone/>
+            </a:pPr>
+            <a:r>
               <a:t/>
+            </a:r>
+            <a:endParaRPr/>
+          </a:p>
+          <a:p>
+            <a:pPr indent="0" lvl="0" marL="0" rtl="0" algn="l">
+              <a:spcBef>
+                <a:spcPts val="0"/>
+              </a:spcBef>
+              <a:spcAft>
+                <a:spcPts val="0"/>
+              </a:spcAft>
+              <a:buNone/>
+            </a:pPr>
+            <a:r>
+              <a:rPr lang="en-US" u="sng">
+                <a:solidFill>
+                  <a:schemeClr val="hlink"/>
+                </a:solidFill>
+                <a:hlinkClick r:id="rId3"/>
+              </a:rPr>
+              <a:t>https://docs.microsoft.com/en-us/dotnet/standard/microservices-architecture/multi-container-microservice-net-applications/multi-container-applications-docker-compose</a:t>
+            </a:r>
+            <a:endParaRPr/>
+          </a:p>
+          <a:p>
+            <a:pPr indent="0" lvl="0" marL="0" rtl="0" algn="l">
+              <a:spcBef>
+                <a:spcPts val="0"/>
+              </a:spcBef>
+              <a:spcAft>
+                <a:spcPts val="0"/>
+              </a:spcAft>
+              <a:buNone/>
+            </a:pPr>
+            <a:r>
+              <a:t/>
+            </a:r>
+            <a:endParaRPr/>
+          </a:p>
+          <a:p>
+            <a:pPr indent="0" lvl="0" marL="0" rtl="0" algn="l">
+              <a:spcBef>
+                <a:spcPts val="0"/>
+              </a:spcBef>
+              <a:spcAft>
+                <a:spcPts val="0"/>
+              </a:spcAft>
+              <a:buNone/>
+            </a:pPr>
+            <a:r>
+              <a:rPr lang="en-US" u="sng">
+                <a:solidFill>
+                  <a:schemeClr val="hlink"/>
+                </a:solidFill>
+                <a:hlinkClick r:id="rId4"/>
+              </a:rPr>
+              <a:t>https://devhints.io/docker-compose</a:t>
             </a:r>
             <a:endParaRPr/>
           </a:p>
@@ -2959,7 +3038,7 @@
       </p:grpSpPr>
       <p:sp>
         <p:nvSpPr>
-          <p:cNvPr id="273" name="Google Shape;273;g4fec7f8d0d_0_81:notes"/>
+          <p:cNvPr id="273" name="Google Shape;273;g4cf33594f7_0_10:notes"/>
           <p:cNvSpPr txBox="1"/>
           <p:nvPr>
             <p:ph idx="1" type="body"/>
@@ -3002,7 +3081,7 @@
       </p:sp>
       <p:sp>
         <p:nvSpPr>
-          <p:cNvPr id="274" name="Google Shape;274;g4fec7f8d0d_0_81:notes"/>
+          <p:cNvPr id="274" name="Google Shape;274;g4cf33594f7_0_10:notes"/>
           <p:cNvSpPr/>
           <p:nvPr>
             <p:ph idx="2" type="sldImg"/>
@@ -3151,7 +3230,7 @@
   <p:cSld>
     <p:spTree>
       <p:nvGrpSpPr>
-        <p:cNvPr id="278" name="Shape 278"/>
+        <p:cNvPr id="279" name="Shape 279"/>
         <p:cNvGrpSpPr/>
         <p:nvPr/>
       </p:nvGrpSpPr>
@@ -3165,7 +3244,7 @@
       </p:grpSpPr>
       <p:sp>
         <p:nvSpPr>
-          <p:cNvPr id="279" name="Google Shape;279;g19ff124dec_2_87:notes"/>
+          <p:cNvPr id="280" name="Google Shape;280;g4fec7f8d0d_0_81:notes"/>
           <p:cNvSpPr txBox="1"/>
           <p:nvPr>
             <p:ph idx="1" type="body"/>
@@ -3208,7 +3287,7 @@
       </p:sp>
       <p:sp>
         <p:nvSpPr>
-          <p:cNvPr id="280" name="Google Shape;280;g19ff124dec_2_87:notes"/>
+          <p:cNvPr id="281" name="Google Shape;281;g4fec7f8d0d_0_81:notes"/>
           <p:cNvSpPr/>
           <p:nvPr>
             <p:ph idx="2" type="sldImg"/>
@@ -3254,7 +3333,7 @@
   <p:cSld>
     <p:spTree>
       <p:nvGrpSpPr>
-        <p:cNvPr id="283" name="Shape 283"/>
+        <p:cNvPr id="285" name="Shape 285"/>
         <p:cNvGrpSpPr/>
         <p:nvPr/>
       </p:nvGrpSpPr>
@@ -3268,7 +3347,110 @@
       </p:grpSpPr>
       <p:sp>
         <p:nvSpPr>
-          <p:cNvPr id="284" name="Google Shape;284;p21:notes"/>
+          <p:cNvPr id="286" name="Google Shape;286;g19ff124dec_2_87:notes"/>
+          <p:cNvSpPr txBox="1"/>
+          <p:nvPr>
+            <p:ph idx="1" type="body"/>
+          </p:nvPr>
+        </p:nvSpPr>
+        <p:spPr>
+          <a:xfrm>
+            <a:off x="777225" y="4777725"/>
+            <a:ext cx="6217800" cy="4526400"/>
+          </a:xfrm>
+          <a:prstGeom prst="rect">
+            <a:avLst/>
+          </a:prstGeom>
+          <a:noFill/>
+          <a:ln>
+            <a:noFill/>
+          </a:ln>
+        </p:spPr>
+        <p:txBody>
+          <a:bodyPr anchorCtr="0" anchor="ctr" bIns="91425" lIns="91425" spcFirstLastPara="1" rIns="91425" wrap="square" tIns="91425">
+            <a:noAutofit/>
+          </a:bodyPr>
+          <a:lstStyle/>
+          <a:p>
+            <a:pPr indent="0" lvl="0" marL="0" rtl="0" algn="l">
+              <a:spcBef>
+                <a:spcPts val="0"/>
+              </a:spcBef>
+              <a:spcAft>
+                <a:spcPts val="0"/>
+              </a:spcAft>
+              <a:buNone/>
+            </a:pPr>
+            <a:r>
+              <a:t/>
+            </a:r>
+            <a:endParaRPr/>
+          </a:p>
+        </p:txBody>
+      </p:sp>
+      <p:sp>
+        <p:nvSpPr>
+          <p:cNvPr id="287" name="Google Shape;287;g19ff124dec_2_87:notes"/>
+          <p:cNvSpPr/>
+          <p:nvPr>
+            <p:ph idx="2" type="sldImg"/>
+          </p:nvPr>
+        </p:nvSpPr>
+        <p:spPr>
+          <a:xfrm>
+            <a:off x="1295650" y="754375"/>
+            <a:ext cx="5181900" cy="3771900"/>
+          </a:xfrm>
+          <a:custGeom>
+            <a:rect b="b" l="l" r="r" t="t"/>
+            <a:pathLst>
+              <a:path extrusionOk="0" h="120000" w="120000">
+                <a:moveTo>
+                  <a:pt x="0" y="0"/>
+                </a:moveTo>
+                <a:lnTo>
+                  <a:pt x="120000" y="0"/>
+                </a:lnTo>
+                <a:lnTo>
+                  <a:pt x="120000" y="120000"/>
+                </a:lnTo>
+                <a:lnTo>
+                  <a:pt x="0" y="120000"/>
+                </a:lnTo>
+                <a:close/>
+              </a:path>
+            </a:pathLst>
+          </a:custGeom>
+        </p:spPr>
+      </p:sp>
+    </p:spTree>
+  </p:cSld>
+  <p:clrMapOvr>
+    <a:masterClrMapping/>
+  </p:clrMapOvr>
+</p:notes>
+</file>
+
+<file path=ppt/notesSlides/notesSlide32.xml><?xml version="1.0" encoding="utf-8"?>
+<p:notes xmlns:a="http://schemas.openxmlformats.org/drawingml/2006/main" xmlns:r="http://schemas.openxmlformats.org/officeDocument/2006/relationships" xmlns:mc="http://schemas.openxmlformats.org/markup-compatibility/2006" xmlns:mv="urn:schemas-microsoft-com:mac:vml" xmlns:p="http://schemas.openxmlformats.org/presentationml/2006/main" xmlns:c="http://schemas.openxmlformats.org/drawingml/2006/chart" xmlns:dgm="http://schemas.openxmlformats.org/drawingml/2006/diagram" xmlns:o="urn:schemas-microsoft-com:office:office" xmlns:v="urn:schemas-microsoft-com:vml" xmlns:pvml="urn:schemas-microsoft-com:office:powerpoint" xmlns:com="http://schemas.openxmlformats.org/drawingml/2006/compatibility" xmlns:p14="http://schemas.microsoft.com/office/powerpoint/2010/main" xmlns:p15="http://schemas.microsoft.com/office/powerpoint/2012/main" showMasterPhAnim="0" showMasterSp="0">
+  <p:cSld>
+    <p:spTree>
+      <p:nvGrpSpPr>
+        <p:cNvPr id="290" name="Shape 290"/>
+        <p:cNvGrpSpPr/>
+        <p:nvPr/>
+      </p:nvGrpSpPr>
+      <p:grpSpPr>
+        <a:xfrm>
+          <a:off x="0" y="0"/>
+          <a:ext cx="0" cy="0"/>
+          <a:chOff x="0" y="0"/>
+          <a:chExt cx="0" cy="0"/>
+        </a:xfrm>
+      </p:grpSpPr>
+      <p:sp>
+        <p:nvSpPr>
+          <p:cNvPr id="291" name="Google Shape;291;p21:notes"/>
           <p:cNvSpPr txBox="1"/>
           <p:nvPr>
             <p:ph idx="1" type="body"/>
@@ -3312,7 +3494,7 @@
       </p:sp>
       <p:sp>
         <p:nvSpPr>
-          <p:cNvPr id="285" name="Google Shape;285;p21:notes"/>
+          <p:cNvPr id="292" name="Google Shape;292;p21:notes"/>
           <p:cNvSpPr/>
           <p:nvPr>
             <p:ph idx="2" type="sldImg"/>
@@ -3353,12 +3535,12 @@
 </p:notes>
 </file>
 
-<file path=ppt/notesSlides/notesSlide32.xml><?xml version="1.0" encoding="utf-8"?>
+<file path=ppt/notesSlides/notesSlide33.xml><?xml version="1.0" encoding="utf-8"?>
 <p:notes xmlns:a="http://schemas.openxmlformats.org/drawingml/2006/main" xmlns:r="http://schemas.openxmlformats.org/officeDocument/2006/relationships" xmlns:mc="http://schemas.openxmlformats.org/markup-compatibility/2006" xmlns:mv="urn:schemas-microsoft-com:mac:vml" xmlns:p="http://schemas.openxmlformats.org/presentationml/2006/main" xmlns:c="http://schemas.openxmlformats.org/drawingml/2006/chart" xmlns:dgm="http://schemas.openxmlformats.org/drawingml/2006/diagram" xmlns:o="urn:schemas-microsoft-com:office:office" xmlns:v="urn:schemas-microsoft-com:vml" xmlns:pvml="urn:schemas-microsoft-com:office:powerpoint" xmlns:com="http://schemas.openxmlformats.org/drawingml/2006/compatibility" xmlns:p14="http://schemas.microsoft.com/office/powerpoint/2010/main" xmlns:p15="http://schemas.microsoft.com/office/powerpoint/2012/main" showMasterPhAnim="0" showMasterSp="0">
   <p:cSld>
     <p:spTree>
       <p:nvGrpSpPr>
-        <p:cNvPr id="288" name="Shape 288"/>
+        <p:cNvPr id="295" name="Shape 295"/>
         <p:cNvGrpSpPr/>
         <p:nvPr/>
       </p:nvGrpSpPr>
@@ -3372,7 +3554,7 @@
       </p:grpSpPr>
       <p:sp>
         <p:nvSpPr>
-          <p:cNvPr id="289" name="Google Shape;289;g4fec5813c8_0_4:notes"/>
+          <p:cNvPr id="296" name="Google Shape;296;g4fec5813c8_0_4:notes"/>
           <p:cNvSpPr txBox="1"/>
           <p:nvPr>
             <p:ph idx="1" type="body"/>
@@ -3415,7 +3597,7 @@
       </p:sp>
       <p:sp>
         <p:nvSpPr>
-          <p:cNvPr id="290" name="Google Shape;290;g4fec5813c8_0_4:notes"/>
+          <p:cNvPr id="297" name="Google Shape;297;g4fec5813c8_0_4:notes"/>
           <p:cNvSpPr/>
           <p:nvPr>
             <p:ph idx="2" type="sldImg"/>
@@ -3456,12 +3638,12 @@
 </p:notes>
 </file>
 
-<file path=ppt/notesSlides/notesSlide33.xml><?xml version="1.0" encoding="utf-8"?>
+<file path=ppt/notesSlides/notesSlide34.xml><?xml version="1.0" encoding="utf-8"?>
 <p:notes xmlns:a="http://schemas.openxmlformats.org/drawingml/2006/main" xmlns:r="http://schemas.openxmlformats.org/officeDocument/2006/relationships" xmlns:mc="http://schemas.openxmlformats.org/markup-compatibility/2006" xmlns:mv="urn:schemas-microsoft-com:mac:vml" xmlns:p="http://schemas.openxmlformats.org/presentationml/2006/main" xmlns:c="http://schemas.openxmlformats.org/drawingml/2006/chart" xmlns:dgm="http://schemas.openxmlformats.org/drawingml/2006/diagram" xmlns:o="urn:schemas-microsoft-com:office:office" xmlns:v="urn:schemas-microsoft-com:vml" xmlns:pvml="urn:schemas-microsoft-com:office:powerpoint" xmlns:com="http://schemas.openxmlformats.org/drawingml/2006/compatibility" xmlns:p14="http://schemas.microsoft.com/office/powerpoint/2010/main" xmlns:p15="http://schemas.microsoft.com/office/powerpoint/2012/main" showMasterPhAnim="0" showMasterSp="0">
   <p:cSld>
     <p:spTree>
       <p:nvGrpSpPr>
-        <p:cNvPr id="293" name="Shape 293"/>
+        <p:cNvPr id="300" name="Shape 300"/>
         <p:cNvGrpSpPr/>
         <p:nvPr/>
       </p:nvGrpSpPr>
@@ -3475,7 +3657,7 @@
       </p:grpSpPr>
       <p:sp>
         <p:nvSpPr>
-          <p:cNvPr id="294" name="Google Shape;294;g4fec5813c8_0_0:notes"/>
+          <p:cNvPr id="301" name="Google Shape;301;g4fec5813c8_0_0:notes"/>
           <p:cNvSpPr txBox="1"/>
           <p:nvPr>
             <p:ph idx="1" type="body"/>
@@ -3518,7 +3700,7 @@
       </p:sp>
       <p:sp>
         <p:nvSpPr>
-          <p:cNvPr id="295" name="Google Shape;295;g4fec5813c8_0_0:notes"/>
+          <p:cNvPr id="302" name="Google Shape;302;g4fec5813c8_0_0:notes"/>
           <p:cNvSpPr/>
           <p:nvPr>
             <p:ph idx="2" type="sldImg"/>
@@ -26153,7 +26335,178 @@
               </a:rPr>
               <a:t>Microservice scaling</a:t>
             </a:r>
-            <a:endParaRPr b="1">
+            <a:br>
+              <a:rPr lang="en-US" sz="1800">
+                <a:solidFill>
+                  <a:schemeClr val="dk1"/>
+                </a:solidFill>
+              </a:rPr>
+            </a:br>
+            <a:endParaRPr sz="1800">
+              <a:solidFill>
+                <a:schemeClr val="dk1"/>
+              </a:solidFill>
+            </a:endParaRPr>
+          </a:p>
+          <a:p>
+            <a:pPr indent="0" lvl="0" marL="0" marR="0" rtl="0" algn="l">
+              <a:spcBef>
+                <a:spcPts val="0"/>
+              </a:spcBef>
+              <a:spcAft>
+                <a:spcPts val="0"/>
+              </a:spcAft>
+              <a:buNone/>
+            </a:pPr>
+            <a:r>
+              <a:rPr lang="en-US" sz="1800">
+                <a:solidFill>
+                  <a:schemeClr val="dk1"/>
+                </a:solidFill>
+              </a:rPr>
+              <a:t>But also some more advanced operations:</a:t>
+            </a:r>
+            <a:endParaRPr sz="1800">
+              <a:solidFill>
+                <a:schemeClr val="dk1"/>
+              </a:solidFill>
+            </a:endParaRPr>
+          </a:p>
+          <a:p>
+            <a:pPr indent="-342900" lvl="0" marL="457200" rtl="0" algn="l">
+              <a:spcBef>
+                <a:spcPts val="0"/>
+              </a:spcBef>
+              <a:spcAft>
+                <a:spcPts val="0"/>
+              </a:spcAft>
+              <a:buClr>
+                <a:schemeClr val="dk1"/>
+              </a:buClr>
+              <a:buSzPts val="1800"/>
+              <a:buChar char="●"/>
+            </a:pPr>
+            <a:r>
+              <a:rPr lang="en-US" sz="1800">
+                <a:solidFill>
+                  <a:schemeClr val="dk1"/>
+                </a:solidFill>
+              </a:rPr>
+              <a:t>Add environment variables</a:t>
+            </a:r>
+            <a:endParaRPr sz="1800">
+              <a:solidFill>
+                <a:schemeClr val="dk1"/>
+              </a:solidFill>
+            </a:endParaRPr>
+          </a:p>
+          <a:p>
+            <a:pPr indent="-342900" lvl="0" marL="457200" marR="0" rtl="0" algn="l">
+              <a:spcBef>
+                <a:spcPts val="0"/>
+              </a:spcBef>
+              <a:spcAft>
+                <a:spcPts val="0"/>
+              </a:spcAft>
+              <a:buClr>
+                <a:schemeClr val="dk1"/>
+              </a:buClr>
+              <a:buSzPts val="1800"/>
+              <a:buChar char="●"/>
+            </a:pPr>
+            <a:r>
+              <a:rPr lang="en-US" sz="1800">
+                <a:solidFill>
+                  <a:schemeClr val="dk1"/>
+                </a:solidFill>
+              </a:rPr>
+              <a:t>Customize DNS Servers</a:t>
+            </a:r>
+            <a:endParaRPr sz="1800">
+              <a:solidFill>
+                <a:schemeClr val="dk1"/>
+              </a:solidFill>
+            </a:endParaRPr>
+          </a:p>
+          <a:p>
+            <a:pPr indent="-342900" lvl="0" marL="457200" marR="0" rtl="0" algn="l">
+              <a:spcBef>
+                <a:spcPts val="0"/>
+              </a:spcBef>
+              <a:spcAft>
+                <a:spcPts val="0"/>
+              </a:spcAft>
+              <a:buClr>
+                <a:schemeClr val="dk1"/>
+              </a:buClr>
+              <a:buSzPts val="1800"/>
+              <a:buChar char="●"/>
+            </a:pPr>
+            <a:r>
+              <a:rPr lang="en-US" sz="1800">
+                <a:solidFill>
+                  <a:schemeClr val="dk1"/>
+                </a:solidFill>
+              </a:rPr>
+              <a:t>Add entries to hosts</a:t>
+            </a:r>
+            <a:endParaRPr sz="1800">
+              <a:solidFill>
+                <a:schemeClr val="dk1"/>
+              </a:solidFill>
+            </a:endParaRPr>
+          </a:p>
+          <a:p>
+            <a:pPr indent="-342900" lvl="0" marL="457200" marR="0" rtl="0" algn="l">
+              <a:spcBef>
+                <a:spcPts val="0"/>
+              </a:spcBef>
+              <a:spcAft>
+                <a:spcPts val="0"/>
+              </a:spcAft>
+              <a:buClr>
+                <a:schemeClr val="dk1"/>
+              </a:buClr>
+              <a:buSzPts val="1800"/>
+              <a:buChar char="●"/>
+            </a:pPr>
+            <a:r>
+              <a:rPr lang="en-US" sz="1800">
+                <a:solidFill>
+                  <a:schemeClr val="dk1"/>
+                </a:solidFill>
+              </a:rPr>
+              <a:t>Add labels</a:t>
+            </a:r>
+            <a:endParaRPr sz="1800">
+              <a:solidFill>
+                <a:schemeClr val="dk1"/>
+              </a:solidFill>
+            </a:endParaRPr>
+          </a:p>
+          <a:p>
+            <a:pPr indent="-342900" lvl="0" marL="457200" marR="0" rtl="0" algn="l">
+              <a:spcBef>
+                <a:spcPts val="0"/>
+              </a:spcBef>
+              <a:spcAft>
+                <a:spcPts val="0"/>
+              </a:spcAft>
+              <a:buClr>
+                <a:schemeClr val="dk1"/>
+              </a:buClr>
+              <a:buSzPts val="1800"/>
+              <a:buChar char="●"/>
+            </a:pPr>
+            <a:r>
+              <a:rPr lang="en-US" sz="1800">
+                <a:solidFill>
+                  <a:schemeClr val="dk1"/>
+                </a:solidFill>
+              </a:rPr>
+              <a:t>Add service dependencies (on the same file)</a:t>
+            </a:r>
+            <a:endParaRPr sz="1800">
               <a:solidFill>
                 <a:schemeClr val="dk1"/>
               </a:solidFill>
@@ -27130,6 +27483,35 @@
               <a:buNone/>
             </a:pPr>
             <a:r>
+              <a:rPr i="1" lang="en-US" sz="1200">
+                <a:solidFill>
+                  <a:schemeClr val="dk1"/>
+                </a:solidFill>
+              </a:rPr>
+              <a:t>$ docker-compose down --volumes</a:t>
+            </a:r>
+            <a:endParaRPr i="1" sz="1200">
+              <a:solidFill>
+                <a:schemeClr val="dk1"/>
+              </a:solidFill>
+            </a:endParaRPr>
+          </a:p>
+          <a:p>
+            <a:pPr indent="0" lvl="0" marL="0" rtl="0" algn="l">
+              <a:spcBef>
+                <a:spcPts val="0"/>
+              </a:spcBef>
+              <a:spcAft>
+                <a:spcPts val="0"/>
+              </a:spcAft>
+              <a:buClr>
+                <a:schemeClr val="dk1"/>
+              </a:buClr>
+              <a:buSzPts val="1100"/>
+              <a:buFont typeface="Arial"/>
+              <a:buNone/>
+            </a:pPr>
+            <a:r>
               <a:t/>
             </a:r>
             <a:endParaRPr i="1" sz="1200">
@@ -27239,7 +27621,7 @@
         <p:spPr>
           <a:xfrm>
             <a:off x="6298625" y="2917650"/>
-            <a:ext cx="5219100" cy="3203700"/>
+            <a:ext cx="5588400" cy="3443100"/>
           </a:xfrm>
           <a:prstGeom prst="rect">
             <a:avLst/>
@@ -27272,10 +27654,18 @@
               <a:buNone/>
             </a:pPr>
             <a:r>
-              <a:rPr lang="en-US" sz="1800"/>
+              <a:rPr lang="en-US" sz="1800">
+                <a:solidFill>
+                  <a:schemeClr val="dk1"/>
+                </a:solidFill>
+              </a:rPr>
               <a:t>version: '3'</a:t>
             </a:r>
-            <a:endParaRPr sz="1800"/>
+            <a:endParaRPr sz="1800">
+              <a:solidFill>
+                <a:schemeClr val="dk1"/>
+              </a:solidFill>
+            </a:endParaRPr>
           </a:p>
           <a:p>
             <a:pPr indent="0" lvl="0" marL="0" rtl="0" algn="l">
@@ -27295,7 +27685,11 @@
             <a:r>
               <a:t/>
             </a:r>
-            <a:endParaRPr sz="1800"/>
+            <a:endParaRPr sz="1800">
+              <a:solidFill>
+                <a:schemeClr val="dk1"/>
+              </a:solidFill>
+            </a:endParaRPr>
           </a:p>
           <a:p>
             <a:pPr indent="0" lvl="0" marL="0" rtl="0" algn="l">
@@ -27313,10 +27707,18 @@
               <a:buNone/>
             </a:pPr>
             <a:r>
-              <a:rPr lang="en-US" sz="1800"/>
+              <a:rPr lang="en-US" sz="1800">
+                <a:solidFill>
+                  <a:schemeClr val="dk1"/>
+                </a:solidFill>
+              </a:rPr>
               <a:t>services:</a:t>
             </a:r>
-            <a:endParaRPr sz="1800"/>
+            <a:endParaRPr sz="1800">
+              <a:solidFill>
+                <a:schemeClr val="dk1"/>
+              </a:solidFill>
+            </a:endParaRPr>
           </a:p>
           <a:p>
             <a:pPr indent="0" lvl="0" marL="0" rtl="0" algn="l">
@@ -27334,10 +27736,18 @@
               <a:buNone/>
             </a:pPr>
             <a:r>
-              <a:rPr lang="en-US" sz="1800"/>
+              <a:rPr lang="en-US" sz="1800">
+                <a:solidFill>
+                  <a:schemeClr val="dk1"/>
+                </a:solidFill>
+              </a:rPr>
               <a:t>  web:</a:t>
             </a:r>
-            <a:endParaRPr sz="1800"/>
+            <a:endParaRPr sz="1800">
+              <a:solidFill>
+                <a:schemeClr val="dk1"/>
+              </a:solidFill>
+            </a:endParaRPr>
           </a:p>
           <a:p>
             <a:pPr indent="0" lvl="0" marL="0" rtl="0" algn="l">
@@ -27355,10 +27765,18 @@
               <a:buNone/>
             </a:pPr>
             <a:r>
-              <a:rPr lang="en-US" sz="1800"/>
+              <a:rPr lang="en-US" sz="1800">
+                <a:solidFill>
+                  <a:schemeClr val="dk1"/>
+                </a:solidFill>
+              </a:rPr>
               <a:t>    build: .</a:t>
             </a:r>
-            <a:endParaRPr sz="1800"/>
+            <a:endParaRPr sz="1800">
+              <a:solidFill>
+                <a:schemeClr val="dk1"/>
+              </a:solidFill>
+            </a:endParaRPr>
           </a:p>
           <a:p>
             <a:pPr indent="0" lvl="0" marL="0" rtl="0" algn="l">
@@ -27376,10 +27794,18 @@
               <a:buNone/>
             </a:pPr>
             <a:r>
-              <a:rPr lang="en-US" sz="1800"/>
-              <a:t>    ports:</a:t>
-            </a:r>
-            <a:endParaRPr sz="1800"/>
+              <a:rPr lang="en-US" sz="1800">
+                <a:solidFill>
+                  <a:schemeClr val="dk1"/>
+                </a:solidFill>
+              </a:rPr>
+              <a:t>    image: my-nginx:1.0</a:t>
+            </a:r>
+            <a:endParaRPr sz="1800">
+              <a:solidFill>
+                <a:schemeClr val="dk1"/>
+              </a:solidFill>
+            </a:endParaRPr>
           </a:p>
           <a:p>
             <a:pPr indent="0" lvl="0" marL="0" rtl="0" algn="l">
@@ -27397,10 +27823,18 @@
               <a:buNone/>
             </a:pPr>
             <a:r>
-              <a:rPr lang="en-US" sz="1800"/>
-              <a:t>      - "80:80"</a:t>
-            </a:r>
-            <a:endParaRPr sz="1800"/>
+              <a:rPr lang="en-US" sz="1800">
+                <a:solidFill>
+                  <a:schemeClr val="dk1"/>
+                </a:solidFill>
+              </a:rPr>
+              <a:t>    ports:</a:t>
+            </a:r>
+            <a:endParaRPr sz="1800">
+              <a:solidFill>
+                <a:schemeClr val="dk1"/>
+              </a:solidFill>
+            </a:endParaRPr>
           </a:p>
           <a:p>
             <a:pPr indent="0" lvl="0" marL="0" rtl="0" algn="l">
@@ -27418,10 +27852,18 @@
               <a:buNone/>
             </a:pPr>
             <a:r>
-              <a:rPr lang="en-US" sz="1800"/>
-              <a:t>    volumes:</a:t>
-            </a:r>
-            <a:endParaRPr sz="1800"/>
+              <a:rPr lang="en-US" sz="1800">
+                <a:solidFill>
+                  <a:schemeClr val="dk1"/>
+                </a:solidFill>
+              </a:rPr>
+              <a:t>      - "80:80"</a:t>
+            </a:r>
+            <a:endParaRPr sz="1800">
+              <a:solidFill>
+                <a:schemeClr val="dk1"/>
+              </a:solidFill>
+            </a:endParaRPr>
           </a:p>
           <a:p>
             <a:pPr indent="0" lvl="0" marL="0" rtl="0" algn="l">
@@ -27439,10 +27881,18 @@
               <a:buNone/>
             </a:pPr>
             <a:r>
-              <a:rPr lang="en-US" sz="1800"/>
-              <a:t>      - "nginx-conf:/etc/nginx/conf.d"</a:t>
-            </a:r>
-            <a:endParaRPr sz="1800"/>
+              <a:rPr lang="en-US" sz="1800">
+                <a:solidFill>
+                  <a:schemeClr val="dk1"/>
+                </a:solidFill>
+              </a:rPr>
+              <a:t>    volumes:</a:t>
+            </a:r>
+            <a:endParaRPr sz="1800">
+              <a:solidFill>
+                <a:schemeClr val="dk1"/>
+              </a:solidFill>
+            </a:endParaRPr>
           </a:p>
           <a:p>
             <a:pPr indent="0" lvl="0" marL="0" rtl="0" algn="l">
@@ -27460,24 +27910,89 @@
               <a:buNone/>
             </a:pPr>
             <a:r>
-              <a:rPr lang="en-US" sz="1800"/>
+              <a:rPr lang="en-US" sz="1800">
+                <a:solidFill>
+                  <a:schemeClr val="dk1"/>
+                </a:solidFill>
+              </a:rPr>
+              <a:t>      - "nginx-conf:/etc/nginx/conf.d"</a:t>
+            </a:r>
+            <a:endParaRPr sz="1800">
+              <a:solidFill>
+                <a:schemeClr val="dk1"/>
+              </a:solidFill>
+            </a:endParaRPr>
+          </a:p>
+          <a:p>
+            <a:pPr indent="0" lvl="0" marL="0" rtl="0" algn="l">
+              <a:spcBef>
+                <a:spcPts val="0"/>
+              </a:spcBef>
+              <a:spcAft>
+                <a:spcPts val="0"/>
+              </a:spcAft>
+              <a:buClr>
+                <a:schemeClr val="dk1"/>
+              </a:buClr>
+              <a:buSzPts val="1100"/>
+              <a:buFont typeface="Arial"/>
+              <a:buNone/>
+            </a:pPr>
+            <a:r>
+              <a:rPr lang="en-US" sz="1800">
+                <a:solidFill>
+                  <a:schemeClr val="dk1"/>
+                </a:solidFill>
+              </a:rPr>
               <a:t>  postgres:</a:t>
             </a:r>
-            <a:endParaRPr sz="1800"/>
-          </a:p>
-          <a:p>
-            <a:pPr indent="0" lvl="0" marL="0" rtl="0" algn="l">
-              <a:spcBef>
-                <a:spcPts val="0"/>
-              </a:spcBef>
-              <a:spcAft>
-                <a:spcPts val="0"/>
-              </a:spcAft>
-              <a:buNone/>
-            </a:pPr>
-            <a:r>
-              <a:rPr lang="en-US" sz="1800"/>
+            <a:endParaRPr sz="1800">
+              <a:solidFill>
+                <a:schemeClr val="dk1"/>
+              </a:solidFill>
+            </a:endParaRPr>
+          </a:p>
+          <a:p>
+            <a:pPr indent="0" lvl="0" marL="0" rtl="0" algn="l">
+              <a:spcBef>
+                <a:spcPts val="0"/>
+              </a:spcBef>
+              <a:spcAft>
+                <a:spcPts val="0"/>
+              </a:spcAft>
+              <a:buClr>
+                <a:schemeClr val="dk1"/>
+              </a:buClr>
+              <a:buSzPts val="1100"/>
+              <a:buFont typeface="Arial"/>
+              <a:buNone/>
+            </a:pPr>
+            <a:r>
+              <a:rPr lang="en-US" sz="1800">
+                <a:solidFill>
+                  <a:schemeClr val="dk1"/>
+                </a:solidFill>
+              </a:rPr>
               <a:t>    image: "postgres:10.7"</a:t>
+            </a:r>
+            <a:endParaRPr sz="1800">
+              <a:solidFill>
+                <a:schemeClr val="dk1"/>
+              </a:solidFill>
+            </a:endParaRPr>
+          </a:p>
+          <a:p>
+            <a:pPr indent="0" lvl="0" marL="0" rtl="0" algn="l">
+              <a:spcBef>
+                <a:spcPts val="0"/>
+              </a:spcBef>
+              <a:spcAft>
+                <a:spcPts val="0"/>
+              </a:spcAft>
+              <a:buNone/>
+            </a:pPr>
+            <a:r>
+              <a:t/>
             </a:r>
             <a:endParaRPr sz="1800"/>
           </a:p>
@@ -27528,8 +28043,8 @@
         </p:nvSpPr>
         <p:spPr>
           <a:xfrm>
-            <a:off x="182880" y="183240"/>
-            <a:ext cx="11704200" cy="6126600"/>
+            <a:off x="182875" y="183250"/>
+            <a:ext cx="11704200" cy="6369000"/>
           </a:xfrm>
           <a:prstGeom prst="rect">
             <a:avLst/>
@@ -27556,13 +28071,9 @@
             </a:pPr>
             <a:r>
               <a:rPr b="1" lang="en-US" sz="2400"/>
-              <a:t>Project - The Voting App</a:t>
-            </a:r>
-            <a:endParaRPr sz="2400" strike="noStrike">
-              <a:solidFill>
-                <a:srgbClr val="000000"/>
-              </a:solidFill>
-            </a:endParaRPr>
+              <a:t>Docker Compose</a:t>
+            </a:r>
+            <a:endParaRPr b="1" sz="2400"/>
           </a:p>
           <a:p>
             <a:pPr indent="0" lvl="0" marL="0" marR="0" rtl="0" algn="l">
@@ -27577,92 +28088,39 @@
             <a:r>
               <a:t/>
             </a:r>
-            <a:endParaRPr/>
-          </a:p>
-          <a:p>
-            <a:pPr indent="0" lvl="0" marL="0" rtl="0" algn="l">
-              <a:spcBef>
-                <a:spcPts val="0"/>
-              </a:spcBef>
-              <a:spcAft>
-                <a:spcPts val="0"/>
-              </a:spcAft>
-              <a:buNone/>
-            </a:pPr>
-            <a:r>
-              <a:rPr lang="en-US" sz="1800">
-                <a:solidFill>
-                  <a:schemeClr val="dk1"/>
-                </a:solidFill>
-                <a:highlight>
-                  <a:srgbClr val="FFFFFF"/>
-                </a:highlight>
-              </a:rPr>
-              <a:t>This is an application based on micro-services architecture,</a:t>
+            <a:endParaRPr b="1" sz="1800"/>
+          </a:p>
+          <a:p>
+            <a:pPr indent="0" lvl="0" marL="0" rtl="0" algn="l">
+              <a:spcBef>
+                <a:spcPts val="0"/>
+              </a:spcBef>
+              <a:spcAft>
+                <a:spcPts val="0"/>
+              </a:spcAft>
+              <a:buClr>
+                <a:schemeClr val="dk1"/>
+              </a:buClr>
+              <a:buSzPts val="1100"/>
+              <a:buFont typeface="Arial"/>
+              <a:buNone/>
+            </a:pPr>
+            <a:r>
+              <a:rPr b="1" lang="en-US" sz="1800">
+                <a:solidFill>
+                  <a:schemeClr val="dk1"/>
+                </a:solidFill>
+              </a:rPr>
+              <a:t>Some Notes &amp; Best Practices</a:t>
             </a:r>
             <a:endParaRPr sz="1800">
               <a:solidFill>
                 <a:schemeClr val="dk1"/>
               </a:solidFill>
-              <a:highlight>
-                <a:srgbClr val="FFFFFF"/>
-              </a:highlight>
-            </a:endParaRPr>
-          </a:p>
-          <a:p>
-            <a:pPr indent="0" lvl="0" marL="0" rtl="0" algn="l">
-              <a:spcBef>
-                <a:spcPts val="0"/>
-              </a:spcBef>
-              <a:spcAft>
-                <a:spcPts val="0"/>
-              </a:spcAft>
-              <a:buNone/>
-            </a:pPr>
-            <a:r>
-              <a:rPr lang="en-US" sz="1800">
-                <a:solidFill>
-                  <a:schemeClr val="dk1"/>
-                </a:solidFill>
-                <a:highlight>
-                  <a:srgbClr val="FFFFFF"/>
-                </a:highlight>
-              </a:rPr>
-              <a:t>consisting of 5 simple services:</a:t>
-            </a:r>
-            <a:endParaRPr sz="1800">
-              <a:solidFill>
-                <a:schemeClr val="dk1"/>
-              </a:solidFill>
-              <a:highlight>
-                <a:srgbClr val="FFFFFF"/>
-              </a:highlight>
-            </a:endParaRPr>
-          </a:p>
-          <a:p>
-            <a:pPr indent="0" lvl="0" marL="0" rtl="0" algn="l">
-              <a:spcBef>
-                <a:spcPts val="0"/>
-              </a:spcBef>
-              <a:spcAft>
-                <a:spcPts val="0"/>
-              </a:spcAft>
-              <a:buNone/>
-            </a:pPr>
-            <a:r>
-              <a:t/>
-            </a:r>
-            <a:endParaRPr sz="1800">
-              <a:solidFill>
-                <a:schemeClr val="dk1"/>
-              </a:solidFill>
-              <a:highlight>
-                <a:srgbClr val="FFFFFF"/>
-              </a:highlight>
-            </a:endParaRPr>
-          </a:p>
-          <a:p>
-            <a:pPr indent="-342900" lvl="0" marL="457200" marR="0" rtl="0" algn="l">
+            </a:endParaRPr>
+          </a:p>
+          <a:p>
+            <a:pPr indent="-342900" lvl="0" marL="457200" rtl="0" algn="l">
               <a:spcBef>
                 <a:spcPts val="0"/>
               </a:spcBef>
@@ -27673,23 +28131,15 @@
                 <a:schemeClr val="dk1"/>
               </a:buClr>
               <a:buSzPts val="1800"/>
-              <a:buAutoNum type="arabicPeriod"/>
-            </a:pPr>
-            <a:r>
-              <a:rPr b="1" lang="en-US" sz="1800">
-                <a:solidFill>
-                  <a:schemeClr val="dk1"/>
-                </a:solidFill>
-              </a:rPr>
-              <a:t>Voting-App</a:t>
-            </a:r>
+              <a:buChar char="●"/>
+            </a:pPr>
             <a:r>
               <a:rPr lang="en-US" sz="1800">
                 <a:solidFill>
                   <a:schemeClr val="dk1"/>
                 </a:solidFill>
               </a:rPr>
-              <a:t>: Frontend of the application written in Python,</a:t>
+              <a:t>Docker Compose can interact with Dockerfiles</a:t>
             </a:r>
             <a:br>
               <a:rPr lang="en-US" sz="1800">
@@ -27704,7 +28154,7 @@
                   <a:schemeClr val="dk1"/>
                 </a:solidFill>
               </a:rPr>
-              <a:t>used by users to cast their votes.</a:t>
+              <a:t>for the services, if contains the build parameter</a:t>
             </a:r>
             <a:endParaRPr sz="1800">
               <a:solidFill>
@@ -27713,7 +28163,7 @@
             </a:endParaRPr>
           </a:p>
           <a:p>
-            <a:pPr indent="-342900" lvl="0" marL="457200" marR="0" rtl="0" algn="l">
+            <a:pPr indent="-342900" lvl="1" marL="914400" rtl="0" algn="l">
               <a:spcBef>
                 <a:spcPts val="0"/>
               </a:spcBef>
@@ -27724,23 +28174,30 @@
                 <a:schemeClr val="dk1"/>
               </a:buClr>
               <a:buSzPts val="1800"/>
-              <a:buAutoNum type="arabicPeriod"/>
-            </a:pPr>
-            <a:r>
-              <a:rPr b="1" lang="en-US" sz="1800">
-                <a:solidFill>
-                  <a:schemeClr val="dk1"/>
-                </a:solidFill>
-              </a:rPr>
-              <a:t>Redis</a:t>
-            </a:r>
+              <a:buChar char="○"/>
+            </a:pPr>
             <a:r>
               <a:rPr lang="en-US" sz="1800">
                 <a:solidFill>
                   <a:schemeClr val="dk1"/>
                 </a:solidFill>
               </a:rPr>
-              <a:t>: In-memory database, used as intermediate storage.</a:t>
+              <a:t>Automatically uses the image parameter for the</a:t>
+            </a:r>
+            <a:br>
+              <a:rPr lang="en-US" sz="1800">
+                <a:solidFill>
+                  <a:schemeClr val="dk1"/>
+                </a:solidFill>
+              </a:rPr>
+            </a:br>
+            <a:r>
+              <a:rPr lang="en-US" sz="1800">
+                <a:solidFill>
+                  <a:schemeClr val="dk1"/>
+                </a:solidFill>
+              </a:rPr>
+              <a:t>build for naming and tagging the image</a:t>
             </a:r>
             <a:endParaRPr sz="1800">
               <a:solidFill>
@@ -27749,7 +28206,7 @@
             </a:endParaRPr>
           </a:p>
           <a:p>
-            <a:pPr indent="-342900" lvl="0" marL="457200" marR="0" rtl="0" algn="l">
+            <a:pPr indent="-342900" lvl="0" marL="457200" rtl="0" algn="l">
               <a:spcBef>
                 <a:spcPts val="0"/>
               </a:spcBef>
@@ -27760,23 +28217,15 @@
                 <a:schemeClr val="dk1"/>
               </a:buClr>
               <a:buSzPts val="1800"/>
-              <a:buAutoNum type="arabicPeriod"/>
-            </a:pPr>
-            <a:r>
-              <a:rPr b="1" lang="en-US" sz="1800">
-                <a:solidFill>
-                  <a:schemeClr val="dk1"/>
-                </a:solidFill>
-              </a:rPr>
-              <a:t>Worker</a:t>
-            </a:r>
+              <a:buChar char="●"/>
+            </a:pPr>
             <a:r>
               <a:rPr lang="en-US" sz="1800">
                 <a:solidFill>
                   <a:schemeClr val="dk1"/>
                 </a:solidFill>
               </a:rPr>
-              <a:t>: .NET service, used to fetch votes from Redis and</a:t>
+              <a:t>We can (and should) use a file with variables,</a:t>
             </a:r>
             <a:br>
               <a:rPr lang="en-US" sz="1800">
@@ -27791,7 +28240,7 @@
                   <a:schemeClr val="dk1"/>
                 </a:solidFill>
               </a:rPr>
-              <a:t>store in PostgreSQL database.</a:t>
+              <a:t>called .env, for better organization</a:t>
             </a:r>
             <a:endParaRPr sz="1800">
               <a:solidFill>
@@ -27800,7 +28249,7 @@
             </a:endParaRPr>
           </a:p>
           <a:p>
-            <a:pPr indent="-342900" lvl="0" marL="457200" marR="0" rtl="0" algn="l">
+            <a:pPr indent="0" lvl="0" marL="0" rtl="0" algn="l">
               <a:spcBef>
                 <a:spcPts val="0"/>
               </a:spcBef>
@@ -27810,33 +28259,64 @@
               <a:buClr>
                 <a:schemeClr val="dk1"/>
               </a:buClr>
-              <a:buSzPts val="1800"/>
-              <a:buAutoNum type="arabicPeriod"/>
-            </a:pPr>
-            <a:r>
-              <a:rPr b="1" lang="en-US" sz="1800">
-                <a:solidFill>
-                  <a:schemeClr val="dk1"/>
-                </a:solidFill>
-              </a:rPr>
-              <a:t>DB</a:t>
-            </a:r>
-            <a:r>
-              <a:rPr lang="en-US" sz="1800">
-                <a:solidFill>
-                  <a:schemeClr val="dk1"/>
-                </a:solidFill>
-              </a:rPr>
-              <a:t>: PostgreSQL database, used as database.</a:t>
-            </a:r>
-            <a:endParaRPr sz="1800">
-              <a:solidFill>
-                <a:schemeClr val="dk1"/>
-              </a:solidFill>
-            </a:endParaRPr>
-          </a:p>
-          <a:p>
-            <a:pPr indent="-342900" lvl="0" marL="457200" marR="0" rtl="0" algn="l">
+              <a:buSzPts val="1100"/>
+              <a:buFont typeface="Arial"/>
+              <a:buNone/>
+            </a:pPr>
+            <a:r>
+              <a:rPr i="1" lang="en-US" sz="1200">
+                <a:solidFill>
+                  <a:schemeClr val="dk1"/>
+                </a:solidFill>
+              </a:rPr>
+              <a:t> </a:t>
+            </a:r>
+            <a:endParaRPr i="1" sz="1200">
+              <a:solidFill>
+                <a:schemeClr val="dk1"/>
+              </a:solidFill>
+            </a:endParaRPr>
+          </a:p>
+          <a:p>
+            <a:pPr indent="0" lvl="0" marL="0" marR="0" rtl="0" algn="l">
+              <a:spcBef>
+                <a:spcPts val="0"/>
+              </a:spcBef>
+              <a:spcAft>
+                <a:spcPts val="0"/>
+              </a:spcAft>
+              <a:buNone/>
+            </a:pPr>
+            <a:r>
+              <a:t/>
+            </a:r>
+            <a:endParaRPr b="1">
+              <a:solidFill>
+                <a:schemeClr val="dk1"/>
+              </a:solidFill>
+            </a:endParaRPr>
+          </a:p>
+          <a:p>
+            <a:pPr indent="0" lvl="0" marL="0" rtl="0" algn="l">
+              <a:spcBef>
+                <a:spcPts val="0"/>
+              </a:spcBef>
+              <a:spcAft>
+                <a:spcPts val="0"/>
+              </a:spcAft>
+              <a:buNone/>
+            </a:pPr>
+            <a:r>
+              <a:t/>
+            </a:r>
+            <a:endParaRPr b="1">
+              <a:solidFill>
+                <a:schemeClr val="dk1"/>
+              </a:solidFill>
+            </a:endParaRPr>
+          </a:p>
+          <a:p>
+            <a:pPr indent="0" lvl="0" marL="0" rtl="0" algn="l">
               <a:spcBef>
                 <a:spcPts val="0"/>
               </a:spcBef>
@@ -27846,60 +28326,13 @@
               <a:buClr>
                 <a:schemeClr val="dk1"/>
               </a:buClr>
-              <a:buSzPts val="1800"/>
-              <a:buAutoNum type="arabicPeriod"/>
-            </a:pPr>
-            <a:r>
-              <a:rPr b="1" lang="en-US" sz="1800">
-                <a:solidFill>
-                  <a:schemeClr val="dk1"/>
-                </a:solidFill>
-              </a:rPr>
-              <a:t>Result-App</a:t>
-            </a:r>
-            <a:r>
-              <a:rPr lang="en-US" sz="1800">
-                <a:solidFill>
-                  <a:schemeClr val="dk1"/>
-                </a:solidFill>
-              </a:rPr>
-              <a:t>: Frontend of the application written in Node.js,</a:t>
-            </a:r>
-            <a:br>
-              <a:rPr lang="en-US" sz="1800">
-                <a:solidFill>
-                  <a:schemeClr val="dk1"/>
-                </a:solidFill>
-              </a:rPr>
-            </a:br>
-            <a:r>
-              <a:rPr lang="en-US" sz="1800">
-                <a:solidFill>
-                  <a:schemeClr val="dk1"/>
-                </a:solidFill>
-              </a:rPr>
-              <a:t>displays the voting results.</a:t>
-            </a:r>
-            <a:endParaRPr sz="1800">
-              <a:solidFill>
-                <a:schemeClr val="dk1"/>
-              </a:solidFill>
-            </a:endParaRPr>
-          </a:p>
-          <a:p>
-            <a:pPr indent="0" lvl="0" marL="0" marR="0" rtl="0" algn="l">
-              <a:spcBef>
-                <a:spcPts val="0"/>
-              </a:spcBef>
-              <a:spcAft>
-                <a:spcPts val="0"/>
-              </a:spcAft>
+              <a:buFont typeface="Arial"/>
               <a:buNone/>
             </a:pPr>
             <a:r>
               <a:t/>
             </a:r>
-            <a:endParaRPr>
+            <a:endParaRPr b="1">
               <a:solidFill>
                 <a:schemeClr val="dk1"/>
               </a:solidFill>
@@ -27907,34 +28340,423 @@
           </a:p>
         </p:txBody>
       </p:sp>
-      <p:pic>
-        <p:nvPicPr>
+      <p:sp>
+        <p:nvSpPr>
           <p:cNvPr id="277" name="Google Shape;277;p55"/>
-          <p:cNvPicPr preferRelativeResize="0"/>
+          <p:cNvSpPr txBox="1"/>
           <p:nvPr/>
-        </p:nvPicPr>
-        <p:blipFill>
-          <a:blip r:embed="rId4">
-            <a:alphaModFix/>
-          </a:blip>
-          <a:stretch>
-            <a:fillRect/>
-          </a:stretch>
-        </p:blipFill>
+        </p:nvSpPr>
         <p:spPr>
           <a:xfrm>
-            <a:off x="6920800" y="1210675"/>
-            <a:ext cx="4687101" cy="4071750"/>
+            <a:off x="6298625" y="2041150"/>
+            <a:ext cx="5330700" cy="4305900"/>
           </a:xfrm>
           <a:prstGeom prst="rect">
             <a:avLst/>
           </a:prstGeom>
-          <a:noFill/>
+          <a:solidFill>
+            <a:srgbClr val="F3F3F3"/>
+          </a:solidFill>
           <a:ln>
             <a:noFill/>
           </a:ln>
         </p:spPr>
-      </p:pic>
+        <p:txBody>
+          <a:bodyPr anchorCtr="0" anchor="t" bIns="91425" lIns="91425" spcFirstLastPara="1" rIns="91425" wrap="square" tIns="91425">
+            <a:noAutofit/>
+          </a:bodyPr>
+          <a:lstStyle/>
+          <a:p>
+            <a:pPr indent="0" lvl="0" marL="0" rtl="0" algn="l">
+              <a:spcBef>
+                <a:spcPts val="0"/>
+              </a:spcBef>
+              <a:spcAft>
+                <a:spcPts val="0"/>
+              </a:spcAft>
+              <a:buClr>
+                <a:schemeClr val="dk1"/>
+              </a:buClr>
+              <a:buSzPts val="1100"/>
+              <a:buFont typeface="Arial"/>
+              <a:buNone/>
+            </a:pPr>
+            <a:r>
+              <a:rPr lang="en-US" sz="1800"/>
+              <a:t>version: '3'</a:t>
+            </a:r>
+            <a:endParaRPr sz="1800"/>
+          </a:p>
+          <a:p>
+            <a:pPr indent="0" lvl="0" marL="0" rtl="0" algn="l">
+              <a:spcBef>
+                <a:spcPts val="0"/>
+              </a:spcBef>
+              <a:spcAft>
+                <a:spcPts val="0"/>
+              </a:spcAft>
+              <a:buClr>
+                <a:schemeClr val="dk1"/>
+              </a:buClr>
+              <a:buSzPts val="1100"/>
+              <a:buFont typeface="Arial"/>
+              <a:buNone/>
+            </a:pPr>
+            <a:r>
+              <a:t/>
+            </a:r>
+            <a:endParaRPr sz="1800"/>
+          </a:p>
+          <a:p>
+            <a:pPr indent="0" lvl="0" marL="0" rtl="0" algn="l">
+              <a:spcBef>
+                <a:spcPts val="0"/>
+              </a:spcBef>
+              <a:spcAft>
+                <a:spcPts val="0"/>
+              </a:spcAft>
+              <a:buClr>
+                <a:schemeClr val="dk1"/>
+              </a:buClr>
+              <a:buSzPts val="1100"/>
+              <a:buFont typeface="Arial"/>
+              <a:buNone/>
+            </a:pPr>
+            <a:r>
+              <a:rPr lang="en-US" sz="1800"/>
+              <a:t>services:</a:t>
+            </a:r>
+            <a:endParaRPr sz="1800"/>
+          </a:p>
+          <a:p>
+            <a:pPr indent="0" lvl="0" marL="0" rtl="0" algn="l">
+              <a:spcBef>
+                <a:spcPts val="0"/>
+              </a:spcBef>
+              <a:spcAft>
+                <a:spcPts val="0"/>
+              </a:spcAft>
+              <a:buClr>
+                <a:schemeClr val="dk1"/>
+              </a:buClr>
+              <a:buSzPts val="1100"/>
+              <a:buFont typeface="Arial"/>
+              <a:buNone/>
+            </a:pPr>
+            <a:r>
+              <a:rPr lang="en-US" sz="1800"/>
+              <a:t>  web:</a:t>
+            </a:r>
+            <a:endParaRPr sz="1800"/>
+          </a:p>
+          <a:p>
+            <a:pPr indent="0" lvl="0" marL="0" rtl="0" algn="l">
+              <a:spcBef>
+                <a:spcPts val="0"/>
+              </a:spcBef>
+              <a:spcAft>
+                <a:spcPts val="0"/>
+              </a:spcAft>
+              <a:buClr>
+                <a:schemeClr val="dk1"/>
+              </a:buClr>
+              <a:buSzPts val="1100"/>
+              <a:buFont typeface="Arial"/>
+              <a:buNone/>
+            </a:pPr>
+            <a:r>
+              <a:rPr lang="en-US" sz="1800"/>
+              <a:t>    build: .</a:t>
+            </a:r>
+            <a:endParaRPr sz="1800"/>
+          </a:p>
+          <a:p>
+            <a:pPr indent="0" lvl="0" marL="0" rtl="0" algn="l">
+              <a:spcBef>
+                <a:spcPts val="0"/>
+              </a:spcBef>
+              <a:spcAft>
+                <a:spcPts val="0"/>
+              </a:spcAft>
+              <a:buClr>
+                <a:schemeClr val="dk1"/>
+              </a:buClr>
+              <a:buSzPts val="1100"/>
+              <a:buFont typeface="Arial"/>
+              <a:buNone/>
+            </a:pPr>
+            <a:r>
+              <a:rPr lang="en-US" sz="1800"/>
+              <a:t>    image: ${IMAGE_NAME}:${IMAGE_VERSION}</a:t>
+            </a:r>
+            <a:endParaRPr sz="1800"/>
+          </a:p>
+          <a:p>
+            <a:pPr indent="0" lvl="0" marL="0" rtl="0" algn="l">
+              <a:spcBef>
+                <a:spcPts val="0"/>
+              </a:spcBef>
+              <a:spcAft>
+                <a:spcPts val="0"/>
+              </a:spcAft>
+              <a:buClr>
+                <a:schemeClr val="dk1"/>
+              </a:buClr>
+              <a:buSzPts val="1100"/>
+              <a:buFont typeface="Arial"/>
+              <a:buNone/>
+            </a:pPr>
+            <a:r>
+              <a:rPr lang="en-US" sz="1800"/>
+              <a:t>    restart: always</a:t>
+            </a:r>
+            <a:endParaRPr sz="1800"/>
+          </a:p>
+          <a:p>
+            <a:pPr indent="0" lvl="0" marL="0" rtl="0" algn="l">
+              <a:spcBef>
+                <a:spcPts val="0"/>
+              </a:spcBef>
+              <a:spcAft>
+                <a:spcPts val="0"/>
+              </a:spcAft>
+              <a:buClr>
+                <a:schemeClr val="dk1"/>
+              </a:buClr>
+              <a:buSzPts val="1100"/>
+              <a:buFont typeface="Arial"/>
+              <a:buNone/>
+            </a:pPr>
+            <a:r>
+              <a:rPr lang="en-US" sz="1800"/>
+              <a:t>    container_name: ${CONTAINER_NAME}</a:t>
+            </a:r>
+            <a:endParaRPr sz="1800"/>
+          </a:p>
+          <a:p>
+            <a:pPr indent="0" lvl="0" marL="0" rtl="0" algn="l">
+              <a:spcBef>
+                <a:spcPts val="0"/>
+              </a:spcBef>
+              <a:spcAft>
+                <a:spcPts val="0"/>
+              </a:spcAft>
+              <a:buClr>
+                <a:schemeClr val="dk1"/>
+              </a:buClr>
+              <a:buSzPts val="1100"/>
+              <a:buFont typeface="Arial"/>
+              <a:buNone/>
+            </a:pPr>
+            <a:r>
+              <a:rPr lang="en-US" sz="1800">
+                <a:solidFill>
+                  <a:schemeClr val="dk1"/>
+                </a:solidFill>
+              </a:rPr>
+              <a:t>    hostname: ${CONTAINER_NAME}</a:t>
+            </a:r>
+            <a:endParaRPr sz="1800"/>
+          </a:p>
+          <a:p>
+            <a:pPr indent="0" lvl="0" marL="0" rtl="0" algn="l">
+              <a:spcBef>
+                <a:spcPts val="0"/>
+              </a:spcBef>
+              <a:spcAft>
+                <a:spcPts val="0"/>
+              </a:spcAft>
+              <a:buClr>
+                <a:schemeClr val="dk1"/>
+              </a:buClr>
+              <a:buSzPts val="1100"/>
+              <a:buFont typeface="Arial"/>
+              <a:buNone/>
+            </a:pPr>
+            <a:r>
+              <a:rPr lang="en-US" sz="1800"/>
+              <a:t>    ports:</a:t>
+            </a:r>
+            <a:endParaRPr sz="1800"/>
+          </a:p>
+          <a:p>
+            <a:pPr indent="0" lvl="0" marL="0" rtl="0" algn="l">
+              <a:spcBef>
+                <a:spcPts val="0"/>
+              </a:spcBef>
+              <a:spcAft>
+                <a:spcPts val="0"/>
+              </a:spcAft>
+              <a:buClr>
+                <a:schemeClr val="dk1"/>
+              </a:buClr>
+              <a:buSzPts val="1100"/>
+              <a:buFont typeface="Arial"/>
+              <a:buNone/>
+            </a:pPr>
+            <a:r>
+              <a:rPr lang="en-US" sz="1800"/>
+              <a:t>      - "80:80"</a:t>
+            </a:r>
+            <a:endParaRPr sz="1800"/>
+          </a:p>
+          <a:p>
+            <a:pPr indent="0" lvl="0" marL="0" rtl="0" algn="l">
+              <a:spcBef>
+                <a:spcPts val="0"/>
+              </a:spcBef>
+              <a:spcAft>
+                <a:spcPts val="0"/>
+              </a:spcAft>
+              <a:buClr>
+                <a:schemeClr val="dk1"/>
+              </a:buClr>
+              <a:buSzPts val="1100"/>
+              <a:buFont typeface="Arial"/>
+              <a:buNone/>
+            </a:pPr>
+            <a:r>
+              <a:rPr lang="en-US" sz="1800"/>
+              <a:t>    volumes:</a:t>
+            </a:r>
+            <a:endParaRPr sz="1800"/>
+          </a:p>
+          <a:p>
+            <a:pPr indent="0" lvl="0" marL="0" rtl="0" algn="l">
+              <a:spcBef>
+                <a:spcPts val="0"/>
+              </a:spcBef>
+              <a:spcAft>
+                <a:spcPts val="0"/>
+              </a:spcAft>
+              <a:buClr>
+                <a:schemeClr val="dk1"/>
+              </a:buClr>
+              <a:buSzPts val="1100"/>
+              <a:buFont typeface="Arial"/>
+              <a:buNone/>
+            </a:pPr>
+            <a:r>
+              <a:rPr lang="en-US" sz="1800"/>
+              <a:t>      - "nginx-conf:/etc/nginx/conf.d"</a:t>
+            </a:r>
+            <a:endParaRPr sz="1800"/>
+          </a:p>
+          <a:p>
+            <a:pPr indent="0" lvl="0" marL="0" rtl="0" algn="l">
+              <a:spcBef>
+                <a:spcPts val="0"/>
+              </a:spcBef>
+              <a:spcAft>
+                <a:spcPts val="0"/>
+              </a:spcAft>
+              <a:buClr>
+                <a:schemeClr val="dk1"/>
+              </a:buClr>
+              <a:buSzPts val="1100"/>
+              <a:buFont typeface="Arial"/>
+              <a:buNone/>
+            </a:pPr>
+            <a:r>
+              <a:rPr lang="en-US" sz="1800"/>
+              <a:t>  postgres:</a:t>
+            </a:r>
+            <a:endParaRPr sz="1800"/>
+          </a:p>
+          <a:p>
+            <a:pPr indent="0" lvl="0" marL="0" rtl="0" algn="l">
+              <a:spcBef>
+                <a:spcPts val="0"/>
+              </a:spcBef>
+              <a:spcAft>
+                <a:spcPts val="0"/>
+              </a:spcAft>
+              <a:buNone/>
+            </a:pPr>
+            <a:r>
+              <a:rPr lang="en-US" sz="1800"/>
+              <a:t>    image: "postgres:10.7"</a:t>
+            </a:r>
+            <a:endParaRPr sz="1800"/>
+          </a:p>
+        </p:txBody>
+      </p:sp>
+      <p:sp>
+        <p:nvSpPr>
+          <p:cNvPr id="278" name="Google Shape;278;p55"/>
+          <p:cNvSpPr txBox="1"/>
+          <p:nvPr/>
+        </p:nvSpPr>
+        <p:spPr>
+          <a:xfrm>
+            <a:off x="6298625" y="924075"/>
+            <a:ext cx="5330700" cy="970800"/>
+          </a:xfrm>
+          <a:prstGeom prst="rect">
+            <a:avLst/>
+          </a:prstGeom>
+          <a:solidFill>
+            <a:srgbClr val="F3F3F3"/>
+          </a:solidFill>
+          <a:ln>
+            <a:noFill/>
+          </a:ln>
+        </p:spPr>
+        <p:txBody>
+          <a:bodyPr anchorCtr="0" anchor="t" bIns="91425" lIns="91425" spcFirstLastPara="1" rIns="91425" wrap="square" tIns="91425">
+            <a:noAutofit/>
+          </a:bodyPr>
+          <a:lstStyle/>
+          <a:p>
+            <a:pPr indent="0" lvl="0" marL="0" rtl="0" algn="l">
+              <a:spcBef>
+                <a:spcPts val="0"/>
+              </a:spcBef>
+              <a:spcAft>
+                <a:spcPts val="0"/>
+              </a:spcAft>
+              <a:buNone/>
+            </a:pPr>
+            <a:r>
+              <a:rPr lang="en-US" sz="1800"/>
+              <a:t>IMAGE_NAME=my-nginx</a:t>
+            </a:r>
+            <a:endParaRPr sz="1800"/>
+          </a:p>
+          <a:p>
+            <a:pPr indent="0" lvl="0" marL="0" rtl="0" algn="l">
+              <a:spcBef>
+                <a:spcPts val="0"/>
+              </a:spcBef>
+              <a:spcAft>
+                <a:spcPts val="0"/>
+              </a:spcAft>
+              <a:buNone/>
+            </a:pPr>
+            <a:r>
+              <a:rPr lang="en-US" sz="1800"/>
+              <a:t>IMAGE_VERSION=1.0</a:t>
+            </a:r>
+            <a:endParaRPr sz="1800"/>
+          </a:p>
+          <a:p>
+            <a:pPr indent="0" lvl="0" marL="0" rtl="0" algn="l">
+              <a:spcBef>
+                <a:spcPts val="0"/>
+              </a:spcBef>
+              <a:spcAft>
+                <a:spcPts val="0"/>
+              </a:spcAft>
+              <a:buNone/>
+            </a:pPr>
+            <a:r>
+              <a:rPr lang="en-US" sz="1800"/>
+              <a:t>CONTAINER_NAME=my-nginx</a:t>
+            </a:r>
+            <a:endParaRPr sz="1800"/>
+          </a:p>
+        </p:txBody>
+      </p:sp>
     </p:spTree>
   </p:cSld>
   <p:clrMapOvr>
@@ -28402,7 +29224,7 @@
     </p:bg>
     <p:spTree>
       <p:nvGrpSpPr>
-        <p:cNvPr id="281" name="Shape 281"/>
+        <p:cNvPr id="282" name="Shape 282"/>
         <p:cNvGrpSpPr/>
         <p:nvPr/>
       </p:nvGrpSpPr>
@@ -28416,14 +29238,14 @@
       </p:grpSpPr>
       <p:sp>
         <p:nvSpPr>
-          <p:cNvPr id="282" name="Google Shape;282;p56"/>
+          <p:cNvPr id="283" name="Google Shape;283;p56"/>
           <p:cNvSpPr txBox="1"/>
           <p:nvPr/>
         </p:nvSpPr>
         <p:spPr>
           <a:xfrm>
-            <a:off x="182875" y="183251"/>
-            <a:ext cx="11704200" cy="6509700"/>
+            <a:off x="182880" y="183240"/>
+            <a:ext cx="11704200" cy="6126600"/>
           </a:xfrm>
           <a:prstGeom prst="rect">
             <a:avLst/>
@@ -28439,26 +29261,18 @@
           </a:bodyPr>
           <a:lstStyle/>
           <a:p>
-            <a:pPr indent="0" lvl="0" marL="0" rtl="0" algn="l">
-              <a:spcBef>
-                <a:spcPts val="0"/>
-              </a:spcBef>
-              <a:spcAft>
-                <a:spcPts val="0"/>
-              </a:spcAft>
-              <a:buClr>
-                <a:schemeClr val="dk1"/>
-              </a:buClr>
-              <a:buFont typeface="Arial"/>
-              <a:buNone/>
-            </a:pPr>
-            <a:r>
-              <a:rPr b="1" lang="en-US" sz="2400">
-                <a:solidFill>
-                  <a:schemeClr val="dk1"/>
-                </a:solidFill>
-              </a:rPr>
-              <a:t>Project - Voting App - Requirements</a:t>
+            <a:pPr indent="0" lvl="0" marL="0" marR="0" rtl="0" algn="l">
+              <a:spcBef>
+                <a:spcPts val="0"/>
+              </a:spcBef>
+              <a:spcAft>
+                <a:spcPts val="0"/>
+              </a:spcAft>
+              <a:buNone/>
+            </a:pPr>
+            <a:r>
+              <a:rPr b="1" lang="en-US" sz="2400"/>
+              <a:t>Project - The Voting App</a:t>
             </a:r>
             <a:endParaRPr sz="2400" strike="noStrike">
               <a:solidFill>
@@ -28479,94 +29293,70 @@
             <a:r>
               <a:t/>
             </a:r>
-            <a:endParaRPr sz="1800"/>
-          </a:p>
-          <a:p>
-            <a:pPr indent="0" lvl="0" marL="0" marR="0" rtl="0" algn="l">
-              <a:spcBef>
-                <a:spcPts val="0"/>
-              </a:spcBef>
-              <a:spcAft>
-                <a:spcPts val="0"/>
-              </a:spcAft>
-              <a:buNone/>
-            </a:pPr>
-            <a:r>
-              <a:rPr b="1" lang="en-US" sz="1800"/>
-              <a:t>Requirements</a:t>
-            </a:r>
-            <a:endParaRPr b="1" sz="1800"/>
-          </a:p>
-          <a:p>
-            <a:pPr indent="0" lvl="0" marL="0" marR="0" rtl="0" algn="l">
-              <a:spcBef>
-                <a:spcPts val="0"/>
-              </a:spcBef>
-              <a:spcAft>
-                <a:spcPts val="0"/>
-              </a:spcAft>
-              <a:buNone/>
-            </a:pPr>
-            <a:r>
-              <a:rPr lang="en-US" sz="1800"/>
-              <a:t>Docker</a:t>
-            </a:r>
-            <a:endParaRPr sz="1800"/>
-          </a:p>
-          <a:p>
-            <a:pPr indent="0" lvl="0" marL="0" marR="0" rtl="0" algn="l">
-              <a:spcBef>
-                <a:spcPts val="0"/>
-              </a:spcBef>
-              <a:spcAft>
-                <a:spcPts val="0"/>
-              </a:spcAft>
-              <a:buNone/>
-            </a:pPr>
-            <a:r>
-              <a:rPr lang="en-US" sz="1800"/>
-              <a:t>Docker Compose</a:t>
-            </a:r>
-            <a:endParaRPr sz="1800"/>
-          </a:p>
-          <a:p>
-            <a:pPr indent="0" lvl="0" marL="0" marR="0" rtl="0" algn="l">
-              <a:spcBef>
-                <a:spcPts val="0"/>
-              </a:spcBef>
-              <a:spcAft>
-                <a:spcPts val="0"/>
-              </a:spcAft>
-              <a:buNone/>
-            </a:pPr>
-            <a:r>
-              <a:rPr lang="en-US" sz="1800"/>
-              <a:t>Git</a:t>
-            </a:r>
-            <a:endParaRPr sz="1800"/>
-          </a:p>
-          <a:p>
-            <a:pPr indent="0" lvl="0" marL="0" marR="0" rtl="0" algn="l">
-              <a:spcBef>
-                <a:spcPts val="0"/>
-              </a:spcBef>
-              <a:spcAft>
-                <a:spcPts val="0"/>
-              </a:spcAft>
-              <a:buNone/>
-            </a:pPr>
-            <a:r>
-              <a:rPr lang="en-US" sz="1800"/>
-              <a:t>Internet Connection </a:t>
-            </a:r>
-            <a:r>
-              <a:rPr lang="en-US" sz="1800"/>
-              <a:t>needed to get tools</a:t>
-            </a:r>
-            <a:endParaRPr sz="1800"/>
-          </a:p>
-          <a:p>
-            <a:pPr indent="0" lvl="0" marL="0" marR="0" rtl="0" algn="l">
+            <a:endParaRPr/>
+          </a:p>
+          <a:p>
+            <a:pPr indent="0" lvl="0" marL="0" rtl="0" algn="l">
+              <a:spcBef>
+                <a:spcPts val="0"/>
+              </a:spcBef>
+              <a:spcAft>
+                <a:spcPts val="0"/>
+              </a:spcAft>
+              <a:buNone/>
+            </a:pPr>
+            <a:r>
+              <a:rPr lang="en-US" sz="1800">
+                <a:solidFill>
+                  <a:schemeClr val="dk1"/>
+                </a:solidFill>
+                <a:highlight>
+                  <a:srgbClr val="FFFFFF"/>
+                </a:highlight>
+              </a:rPr>
+              <a:t>This is an application based on micro-services architecture,</a:t>
+            </a:r>
+            <a:endParaRPr sz="1800">
+              <a:solidFill>
+                <a:schemeClr val="dk1"/>
+              </a:solidFill>
+              <a:highlight>
+                <a:srgbClr val="FFFFFF"/>
+              </a:highlight>
+            </a:endParaRPr>
+          </a:p>
+          <a:p>
+            <a:pPr indent="0" lvl="0" marL="0" rtl="0" algn="l">
+              <a:spcBef>
+                <a:spcPts val="0"/>
+              </a:spcBef>
+              <a:spcAft>
+                <a:spcPts val="0"/>
+              </a:spcAft>
+              <a:buNone/>
+            </a:pPr>
+            <a:r>
+              <a:rPr lang="en-US" sz="1800">
+                <a:solidFill>
+                  <a:schemeClr val="dk1"/>
+                </a:solidFill>
+                <a:highlight>
+                  <a:srgbClr val="FFFFFF"/>
+                </a:highlight>
+              </a:rPr>
+              <a:t>consisting of 5 simple services:</a:t>
+            </a:r>
+            <a:endParaRPr sz="1800">
+              <a:solidFill>
+                <a:schemeClr val="dk1"/>
+              </a:solidFill>
+              <a:highlight>
+                <a:srgbClr val="FFFFFF"/>
+              </a:highlight>
+            </a:endParaRPr>
+          </a:p>
+          <a:p>
+            <a:pPr indent="0" lvl="0" marL="0" rtl="0" algn="l">
               <a:spcBef>
                 <a:spcPts val="0"/>
               </a:spcBef>
@@ -28578,182 +29368,17 @@
             <a:r>
               <a:t/>
             </a:r>
-            <a:endParaRPr sz="1800"/>
-          </a:p>
-          <a:p>
-            <a:pPr indent="0" lvl="0" marL="0" rtl="0" algn="l">
-              <a:spcBef>
-                <a:spcPts val="0"/>
-              </a:spcBef>
-              <a:spcAft>
-                <a:spcPts val="0"/>
-              </a:spcAft>
-              <a:buNone/>
-            </a:pPr>
-            <a:r>
-              <a:rPr b="1" lang="en-US" sz="1800">
-                <a:solidFill>
-                  <a:schemeClr val="dk1"/>
-                </a:solidFill>
-              </a:rPr>
-              <a:t>Voting App Git repository</a:t>
-            </a:r>
-            <a:endParaRPr b="1" sz="1800">
-              <a:solidFill>
-                <a:schemeClr val="dk1"/>
-              </a:solidFill>
-            </a:endParaRPr>
-          </a:p>
-          <a:p>
-            <a:pPr indent="0" lvl="0" marL="0" rtl="0" algn="l">
-              <a:spcBef>
-                <a:spcPts val="0"/>
-              </a:spcBef>
-              <a:spcAft>
-                <a:spcPts val="0"/>
-              </a:spcAft>
-              <a:buNone/>
-            </a:pPr>
-            <a:r>
-              <a:rPr i="1" lang="en-US">
-                <a:solidFill>
-                  <a:schemeClr val="dk1"/>
-                </a:solidFill>
-              </a:rPr>
-              <a:t>$ git clone </a:t>
-            </a:r>
-            <a:r>
-              <a:rPr i="1" lang="en-US" u="sng">
-                <a:solidFill>
-                  <a:schemeClr val="hlink"/>
-                </a:solidFill>
-                <a:hlinkClick r:id="rId4"/>
-              </a:rPr>
-              <a:t>https://github.com/dockersamples/example-voting-app.git</a:t>
-            </a:r>
-            <a:endParaRPr/>
-          </a:p>
-          <a:p>
-            <a:pPr indent="0" lvl="0" marL="0" rtl="0" algn="l">
-              <a:spcBef>
-                <a:spcPts val="0"/>
-              </a:spcBef>
-              <a:spcAft>
-                <a:spcPts val="0"/>
-              </a:spcAft>
-              <a:buNone/>
-            </a:pPr>
-            <a:r>
-              <a:t/>
-            </a:r>
-            <a:endParaRPr sz="1800"/>
-          </a:p>
-          <a:p>
-            <a:pPr indent="0" lvl="0" marL="0" rtl="0" algn="l">
-              <a:spcBef>
-                <a:spcPts val="0"/>
-              </a:spcBef>
-              <a:spcAft>
-                <a:spcPts val="0"/>
-              </a:spcAft>
-              <a:buClr>
-                <a:schemeClr val="dk1"/>
-              </a:buClr>
-              <a:buFont typeface="Arial"/>
-              <a:buNone/>
-            </a:pPr>
-            <a:r>
-              <a:rPr b="1" lang="en-US" sz="1800">
-                <a:solidFill>
-                  <a:schemeClr val="dk1"/>
-                </a:solidFill>
-              </a:rPr>
-              <a:t>IMPORTANT</a:t>
-            </a:r>
-            <a:endParaRPr b="1" sz="1800">
-              <a:solidFill>
-                <a:schemeClr val="dk1"/>
-              </a:solidFill>
-            </a:endParaRPr>
-          </a:p>
-          <a:p>
-            <a:pPr indent="0" lvl="0" marL="0" rtl="0" algn="l">
-              <a:spcBef>
-                <a:spcPts val="0"/>
-              </a:spcBef>
-              <a:spcAft>
-                <a:spcPts val="0"/>
-              </a:spcAft>
-              <a:buClr>
-                <a:schemeClr val="dk1"/>
-              </a:buClr>
-              <a:buFont typeface="Arial"/>
-              <a:buNone/>
-            </a:pPr>
-            <a:r>
-              <a:rPr lang="en-US" sz="1800">
-                <a:solidFill>
-                  <a:schemeClr val="dk1"/>
-                </a:solidFill>
-              </a:rPr>
-              <a:t>Instead of a personal VM or Local Docker installation, you can (and should!) use Play With Docker: </a:t>
-            </a:r>
-            <a:r>
-              <a:rPr lang="en-US" sz="1800" u="sng">
-                <a:solidFill>
-                  <a:schemeClr val="hlink"/>
-                </a:solidFill>
-                <a:hlinkClick r:id="rId5"/>
-              </a:rPr>
-              <a:t>https://labs.play-with-docker.com/</a:t>
-            </a:r>
-            <a:endParaRPr sz="1800"/>
-          </a:p>
-          <a:p>
-            <a:pPr indent="0" lvl="0" marL="0" rtl="0" algn="l">
-              <a:spcBef>
-                <a:spcPts val="0"/>
-              </a:spcBef>
-              <a:spcAft>
-                <a:spcPts val="0"/>
-              </a:spcAft>
-              <a:buNone/>
-            </a:pPr>
-            <a:r>
-              <a:t/>
-            </a:r>
-            <a:endParaRPr sz="1800"/>
-          </a:p>
-          <a:p>
-            <a:pPr indent="0" lvl="0" marL="0" rtl="0" algn="l">
-              <a:spcBef>
-                <a:spcPts val="0"/>
-              </a:spcBef>
-              <a:spcAft>
-                <a:spcPts val="0"/>
-              </a:spcAft>
-              <a:buClr>
-                <a:schemeClr val="dk1"/>
-              </a:buClr>
-              <a:buFont typeface="Arial"/>
-              <a:buNone/>
-            </a:pPr>
-            <a:r>
-              <a:rPr b="1" lang="en-US" sz="1800">
-                <a:solidFill>
-                  <a:schemeClr val="dk1"/>
-                </a:solidFill>
-              </a:rPr>
-              <a:t>What will we do exactly?</a:t>
-            </a:r>
-            <a:endParaRPr b="1" sz="1800">
-              <a:solidFill>
-                <a:schemeClr val="dk1"/>
-              </a:solidFill>
-            </a:endParaRPr>
-          </a:p>
-          <a:p>
-            <a:pPr indent="-342900" lvl="0" marL="457200" rtl="0" algn="l">
+            <a:endParaRPr sz="1800">
+              <a:solidFill>
+                <a:schemeClr val="dk1"/>
+              </a:solidFill>
+              <a:highlight>
+                <a:srgbClr val="FFFFFF"/>
+              </a:highlight>
+            </a:endParaRPr>
+          </a:p>
+          <a:p>
+            <a:pPr indent="-342900" lvl="0" marL="457200" marR="0" rtl="0" algn="l">
               <a:spcBef>
                 <a:spcPts val="0"/>
               </a:spcBef>
@@ -28767,12 +29392,35 @@
               <a:buAutoNum type="arabicPeriod"/>
             </a:pPr>
             <a:r>
+              <a:rPr b="1" lang="en-US" sz="1800">
+                <a:solidFill>
+                  <a:schemeClr val="dk1"/>
+                </a:solidFill>
+              </a:rPr>
+              <a:t>Voting-App</a:t>
+            </a:r>
+            <a:r>
               <a:rPr lang="en-US" sz="1800">
                 <a:solidFill>
                   <a:schemeClr val="dk1"/>
                 </a:solidFill>
               </a:rPr>
-              <a:t>Deploy a simple distributed application running across multiple Docker containers.</a:t>
+              <a:t>: Frontend of the application written in Python,</a:t>
+            </a:r>
+            <a:br>
+              <a:rPr lang="en-US" sz="1800">
+                <a:solidFill>
+                  <a:schemeClr val="dk1"/>
+                </a:solidFill>
+              </a:rPr>
+            </a:br>
+            <a:r>
+              <a:rPr lang="en-US" sz="1800">
+                <a:solidFill>
+                  <a:schemeClr val="dk1"/>
+                </a:solidFill>
+              </a:rPr>
+              <a:t>used by users to cast their votes.</a:t>
             </a:r>
             <a:endParaRPr sz="1800">
               <a:solidFill>
@@ -28781,7 +29429,7 @@
             </a:endParaRPr>
           </a:p>
           <a:p>
-            <a:pPr indent="-342900" lvl="0" marL="457200" rtl="0" algn="l">
+            <a:pPr indent="-342900" lvl="0" marL="457200" marR="0" rtl="0" algn="l">
               <a:spcBef>
                 <a:spcPts val="0"/>
               </a:spcBef>
@@ -28795,12 +29443,20 @@
               <a:buAutoNum type="arabicPeriod"/>
             </a:pPr>
             <a:r>
+              <a:rPr b="1" lang="en-US" sz="1800">
+                <a:solidFill>
+                  <a:schemeClr val="dk1"/>
+                </a:solidFill>
+              </a:rPr>
+              <a:t>Redis</a:t>
+            </a:r>
+            <a:r>
               <a:rPr lang="en-US" sz="1800">
                 <a:solidFill>
                   <a:schemeClr val="dk1"/>
                 </a:solidFill>
               </a:rPr>
-              <a:t>Inspect and investigate the definition files</a:t>
+              <a:t>: In-memory database, used as intermediate storage.</a:t>
             </a:r>
             <a:endParaRPr sz="1800">
               <a:solidFill>
@@ -28809,7 +29465,7 @@
             </a:endParaRPr>
           </a:p>
           <a:p>
-            <a:pPr indent="-342900" lvl="0" marL="457200" rtl="0" algn="l">
+            <a:pPr indent="-342900" lvl="0" marL="457200" marR="0" rtl="0" algn="l">
               <a:spcBef>
                 <a:spcPts val="0"/>
               </a:spcBef>
@@ -28823,12 +29479,35 @@
               <a:buAutoNum type="arabicPeriod"/>
             </a:pPr>
             <a:r>
+              <a:rPr b="1" lang="en-US" sz="1800">
+                <a:solidFill>
+                  <a:schemeClr val="dk1"/>
+                </a:solidFill>
+              </a:rPr>
+              <a:t>Worker</a:t>
+            </a:r>
+            <a:r>
               <a:rPr lang="en-US" sz="1800">
                 <a:solidFill>
                   <a:schemeClr val="dk1"/>
                 </a:solidFill>
               </a:rPr>
-              <a:t>Connect containers among themselves with multiple Docker Networks</a:t>
+              <a:t>: .NET service, used to fetch votes from Redis and</a:t>
+            </a:r>
+            <a:br>
+              <a:rPr lang="en-US" sz="1800">
+                <a:solidFill>
+                  <a:schemeClr val="dk1"/>
+                </a:solidFill>
+              </a:rPr>
+            </a:br>
+            <a:r>
+              <a:rPr lang="en-US" sz="1800">
+                <a:solidFill>
+                  <a:schemeClr val="dk1"/>
+                </a:solidFill>
+              </a:rPr>
+              <a:t>store in PostgreSQL database.</a:t>
             </a:r>
             <a:endParaRPr sz="1800">
               <a:solidFill>
@@ -28837,7 +29516,7 @@
             </a:endParaRPr>
           </a:p>
           <a:p>
-            <a:pPr indent="-342900" lvl="0" marL="457200" rtl="0" algn="l">
+            <a:pPr indent="-342900" lvl="0" marL="457200" marR="0" rtl="0" algn="l">
               <a:spcBef>
                 <a:spcPts val="0"/>
               </a:spcBef>
@@ -28851,12 +29530,20 @@
               <a:buAutoNum type="arabicPeriod"/>
             </a:pPr>
             <a:r>
+              <a:rPr b="1" lang="en-US" sz="1800">
+                <a:solidFill>
+                  <a:schemeClr val="dk1"/>
+                </a:solidFill>
+              </a:rPr>
+              <a:t>DB</a:t>
+            </a:r>
+            <a:r>
               <a:rPr lang="en-US" sz="1800">
                 <a:solidFill>
                   <a:schemeClr val="dk1"/>
                 </a:solidFill>
               </a:rPr>
-              <a:t>Database data will be kept in volumes</a:t>
+              <a:t>: PostgreSQL database, used as database.</a:t>
             </a:r>
             <a:endParaRPr sz="1800">
               <a:solidFill>
@@ -28865,7 +29552,7 @@
             </a:endParaRPr>
           </a:p>
           <a:p>
-            <a:pPr indent="-342900" lvl="0" marL="457200" rtl="0" algn="l">
+            <a:pPr indent="-342900" lvl="0" marL="457200" marR="0" rtl="0" algn="l">
               <a:spcBef>
                 <a:spcPts val="0"/>
               </a:spcBef>
@@ -28879,12 +29566,35 @@
               <a:buAutoNum type="arabicPeriod"/>
             </a:pPr>
             <a:r>
+              <a:rPr b="1" lang="en-US" sz="1800">
+                <a:solidFill>
+                  <a:schemeClr val="dk1"/>
+                </a:solidFill>
+              </a:rPr>
+              <a:t>Result-App</a:t>
+            </a:r>
+            <a:r>
               <a:rPr lang="en-US" sz="1800">
                 <a:solidFill>
                   <a:schemeClr val="dk1"/>
                 </a:solidFill>
               </a:rPr>
-              <a:t>Scale microservices</a:t>
+              <a:t>: Frontend of the application written in Node.js,</a:t>
+            </a:r>
+            <a:br>
+              <a:rPr lang="en-US" sz="1800">
+                <a:solidFill>
+                  <a:schemeClr val="dk1"/>
+                </a:solidFill>
+              </a:rPr>
+            </a:br>
+            <a:r>
+              <a:rPr lang="en-US" sz="1800">
+                <a:solidFill>
+                  <a:schemeClr val="dk1"/>
+                </a:solidFill>
+              </a:rPr>
+              <a:t>displays the voting results.</a:t>
             </a:r>
             <a:endParaRPr sz="1800">
               <a:solidFill>
@@ -28893,63 +29603,7 @@
             </a:endParaRPr>
           </a:p>
           <a:p>
-            <a:pPr indent="-342900" lvl="0" marL="457200" rtl="0" algn="l">
-              <a:spcBef>
-                <a:spcPts val="0"/>
-              </a:spcBef>
-              <a:spcAft>
-                <a:spcPts val="0"/>
-              </a:spcAft>
-              <a:buClr>
-                <a:schemeClr val="dk1"/>
-              </a:buClr>
-              <a:buSzPts val="1800"/>
-              <a:buAutoNum type="arabicPeriod"/>
-            </a:pPr>
-            <a:r>
-              <a:rPr lang="en-US" sz="1800">
-                <a:solidFill>
-                  <a:schemeClr val="dk1"/>
-                </a:solidFill>
-              </a:rPr>
-              <a:t>Upgrade microservices</a:t>
-            </a:r>
-            <a:endParaRPr sz="1800">
-              <a:solidFill>
-                <a:schemeClr val="dk1"/>
-              </a:solidFill>
-            </a:endParaRPr>
-          </a:p>
-          <a:p>
-            <a:pPr indent="-342900" lvl="0" marL="457200" rtl="0" algn="l">
-              <a:spcBef>
-                <a:spcPts val="0"/>
-              </a:spcBef>
-              <a:spcAft>
-                <a:spcPts val="0"/>
-              </a:spcAft>
-              <a:buClr>
-                <a:schemeClr val="dk1"/>
-              </a:buClr>
-              <a:buSzPts val="1800"/>
-              <a:buAutoNum type="arabicPeriod"/>
-            </a:pPr>
-            <a:r>
-              <a:rPr lang="en-US" sz="1800">
-                <a:solidFill>
-                  <a:schemeClr val="dk1"/>
-                </a:solidFill>
-              </a:rPr>
-              <a:t>If possible, hide Web UI Services and load them with a Load Balancer / Reverse Proxy</a:t>
-            </a:r>
-            <a:endParaRPr sz="1800">
-              <a:solidFill>
-                <a:schemeClr val="dk1"/>
-              </a:solidFill>
-            </a:endParaRPr>
-          </a:p>
-          <a:p>
-            <a:pPr indent="0" lvl="0" marL="0" rtl="0" algn="l">
+            <a:pPr indent="0" lvl="0" marL="0" marR="0" rtl="0" algn="l">
               <a:spcBef>
                 <a:spcPts val="0"/>
               </a:spcBef>
@@ -28961,10 +29615,42 @@
             <a:r>
               <a:t/>
             </a:r>
-            <a:endParaRPr sz="1800"/>
+            <a:endParaRPr>
+              <a:solidFill>
+                <a:schemeClr val="dk1"/>
+              </a:solidFill>
+            </a:endParaRPr>
           </a:p>
         </p:txBody>
       </p:sp>
+      <p:pic>
+        <p:nvPicPr>
+          <p:cNvPr id="284" name="Google Shape;284;p56"/>
+          <p:cNvPicPr preferRelativeResize="0"/>
+          <p:nvPr/>
+        </p:nvPicPr>
+        <p:blipFill>
+          <a:blip r:embed="rId4">
+            <a:alphaModFix/>
+          </a:blip>
+          <a:stretch>
+            <a:fillRect/>
+          </a:stretch>
+        </p:blipFill>
+        <p:spPr>
+          <a:xfrm>
+            <a:off x="6920800" y="1210675"/>
+            <a:ext cx="4687101" cy="4071750"/>
+          </a:xfrm>
+          <a:prstGeom prst="rect">
+            <a:avLst/>
+          </a:prstGeom>
+          <a:noFill/>
+          <a:ln>
+            <a:noFill/>
+          </a:ln>
+        </p:spPr>
+      </p:pic>
     </p:spTree>
   </p:cSld>
   <p:clrMapOvr>
@@ -28990,7 +29676,7 @@
     </p:bg>
     <p:spTree>
       <p:nvGrpSpPr>
-        <p:cNvPr id="286" name="Shape 286"/>
+        <p:cNvPr id="288" name="Shape 288"/>
         <p:cNvGrpSpPr/>
         <p:nvPr/>
       </p:nvGrpSpPr>
@@ -29004,14 +29690,14 @@
       </p:grpSpPr>
       <p:sp>
         <p:nvSpPr>
-          <p:cNvPr id="287" name="Google Shape;287;p57"/>
+          <p:cNvPr id="289" name="Google Shape;289;p57"/>
           <p:cNvSpPr txBox="1"/>
           <p:nvPr/>
         </p:nvSpPr>
         <p:spPr>
           <a:xfrm>
-            <a:off x="182875" y="183250"/>
-            <a:ext cx="11704200" cy="6282000"/>
+            <a:off x="182875" y="183251"/>
+            <a:ext cx="11704200" cy="6509700"/>
           </a:xfrm>
           <a:prstGeom prst="rect">
             <a:avLst/>
@@ -29027,318 +29713,6 @@
           </a:bodyPr>
           <a:lstStyle/>
           <a:p>
-            <a:pPr indent="0" lvl="0" marL="0" marR="0" rtl="0" algn="l">
-              <a:spcBef>
-                <a:spcPts val="0"/>
-              </a:spcBef>
-              <a:spcAft>
-                <a:spcPts val="0"/>
-              </a:spcAft>
-              <a:buNone/>
-            </a:pPr>
-            <a:r>
-              <a:rPr b="1" lang="en-US" sz="2400" strike="noStrike">
-                <a:solidFill>
-                  <a:srgbClr val="000000"/>
-                </a:solidFill>
-              </a:rPr>
-              <a:t>Where can I get more information?</a:t>
-            </a:r>
-            <a:endParaRPr sz="2400" strike="noStrike">
-              <a:solidFill>
-                <a:srgbClr val="000000"/>
-              </a:solidFill>
-            </a:endParaRPr>
-          </a:p>
-          <a:p>
-            <a:pPr indent="0" lvl="0" marL="0" marR="0" rtl="0" algn="l">
-              <a:spcBef>
-                <a:spcPts val="0"/>
-              </a:spcBef>
-              <a:spcAft>
-                <a:spcPts val="0"/>
-              </a:spcAft>
-              <a:buNone/>
-            </a:pPr>
-            <a:r>
-              <a:t/>
-            </a:r>
-            <a:endParaRPr sz="1800" strike="noStrike">
-              <a:solidFill>
-                <a:srgbClr val="000000"/>
-              </a:solidFill>
-            </a:endParaRPr>
-          </a:p>
-          <a:p>
-            <a:pPr indent="0" lvl="0" marL="0" marR="0" rtl="0" algn="l">
-              <a:spcBef>
-                <a:spcPts val="0"/>
-              </a:spcBef>
-              <a:spcAft>
-                <a:spcPts val="0"/>
-              </a:spcAft>
-              <a:buNone/>
-            </a:pPr>
-            <a:r>
-              <a:t/>
-            </a:r>
-            <a:endParaRPr sz="1800" strike="noStrike">
-              <a:solidFill>
-                <a:srgbClr val="000000"/>
-              </a:solidFill>
-            </a:endParaRPr>
-          </a:p>
-          <a:p>
-            <a:pPr indent="0" lvl="0" marL="0" marR="0" rtl="0" algn="l">
-              <a:spcBef>
-                <a:spcPts val="0"/>
-              </a:spcBef>
-              <a:spcAft>
-                <a:spcPts val="0"/>
-              </a:spcAft>
-              <a:buNone/>
-            </a:pPr>
-            <a:r>
-              <a:rPr b="1" lang="en-US" sz="1800" strike="noStrike">
-                <a:solidFill>
-                  <a:srgbClr val="000000"/>
-                </a:solidFill>
-              </a:rPr>
-              <a:t>Docker Documentation</a:t>
-            </a:r>
-            <a:r>
-              <a:rPr lang="en-US" sz="1800" strike="noStrike">
-                <a:solidFill>
-                  <a:srgbClr val="000000"/>
-                </a:solidFill>
-              </a:rPr>
-              <a:t>: </a:t>
-            </a:r>
-            <a:r>
-              <a:rPr lang="en-US" sz="1800" u="sng" strike="noStrike">
-                <a:solidFill>
-                  <a:schemeClr val="hlink"/>
-                </a:solidFill>
-                <a:hlinkClick r:id="rId4"/>
-              </a:rPr>
-              <a:t>https://docs.docker.com</a:t>
-            </a:r>
-            <a:endParaRPr sz="1800"/>
-          </a:p>
-          <a:p>
-            <a:pPr indent="0" lvl="0" marL="0" marR="0" rtl="0" algn="l">
-              <a:spcBef>
-                <a:spcPts val="0"/>
-              </a:spcBef>
-              <a:spcAft>
-                <a:spcPts val="0"/>
-              </a:spcAft>
-              <a:buNone/>
-            </a:pPr>
-            <a:r>
-              <a:t/>
-            </a:r>
-            <a:endParaRPr sz="1800"/>
-          </a:p>
-          <a:p>
-            <a:pPr indent="0" lvl="0" marL="0" marR="0" rtl="0" algn="l">
-              <a:spcBef>
-                <a:spcPts val="0"/>
-              </a:spcBef>
-              <a:spcAft>
-                <a:spcPts val="0"/>
-              </a:spcAft>
-              <a:buNone/>
-            </a:pPr>
-            <a:r>
-              <a:rPr b="1" lang="en-US" sz="1800" strike="noStrike">
-                <a:solidFill>
-                  <a:srgbClr val="000000"/>
-                </a:solidFill>
-              </a:rPr>
-              <a:t>Docker Overview</a:t>
-            </a:r>
-            <a:r>
-              <a:rPr lang="en-US" sz="1800" strike="noStrike">
-                <a:solidFill>
-                  <a:srgbClr val="000000"/>
-                </a:solidFill>
-              </a:rPr>
-              <a:t>: </a:t>
-            </a:r>
-            <a:r>
-              <a:rPr lang="en-US" sz="1800" u="sng">
-                <a:solidFill>
-                  <a:schemeClr val="hlink"/>
-                </a:solidFill>
-                <a:hlinkClick r:id="rId5"/>
-              </a:rPr>
-              <a:t>https://docs.docker.com/engine/docker-overview/</a:t>
-            </a:r>
-            <a:endParaRPr sz="1800">
-              <a:solidFill>
-                <a:srgbClr val="000000"/>
-              </a:solidFill>
-            </a:endParaRPr>
-          </a:p>
-          <a:p>
-            <a:pPr indent="0" lvl="0" marL="0" marR="0" rtl="0" algn="l">
-              <a:spcBef>
-                <a:spcPts val="0"/>
-              </a:spcBef>
-              <a:spcAft>
-                <a:spcPts val="0"/>
-              </a:spcAft>
-              <a:buNone/>
-            </a:pPr>
-            <a:r>
-              <a:rPr b="1" lang="en-US" sz="1800"/>
-              <a:t>Networks</a:t>
-            </a:r>
-            <a:r>
-              <a:rPr lang="en-US" sz="1800"/>
-              <a:t>: </a:t>
-            </a:r>
-            <a:r>
-              <a:rPr lang="en-US" sz="1800" u="sng">
-                <a:solidFill>
-                  <a:schemeClr val="hlink"/>
-                </a:solidFill>
-                <a:hlinkClick r:id="rId6"/>
-              </a:rPr>
-              <a:t>https://docs.docker.com/network/</a:t>
-            </a:r>
-            <a:br>
-              <a:rPr lang="en-US" sz="1800"/>
-            </a:br>
-            <a:r>
-              <a:rPr b="1" lang="en-US" sz="1800"/>
-              <a:t>Storage (Binds/Mounts)</a:t>
-            </a:r>
-            <a:r>
-              <a:rPr lang="en-US" sz="1800"/>
-              <a:t>: </a:t>
-            </a:r>
-            <a:r>
-              <a:rPr lang="en-US" sz="1800" u="sng">
-                <a:solidFill>
-                  <a:schemeClr val="hlink"/>
-                </a:solidFill>
-                <a:hlinkClick r:id="rId7"/>
-              </a:rPr>
-              <a:t>https://docs.docker.com/storage/</a:t>
-            </a:r>
-            <a:endParaRPr sz="1800"/>
-          </a:p>
-          <a:p>
-            <a:pPr indent="0" lvl="0" marL="0" marR="0" rtl="0" algn="l">
-              <a:spcBef>
-                <a:spcPts val="0"/>
-              </a:spcBef>
-              <a:spcAft>
-                <a:spcPts val="0"/>
-              </a:spcAft>
-              <a:buNone/>
-            </a:pPr>
-            <a:r>
-              <a:rPr b="1" lang="en-US" sz="1800" strike="noStrike">
-                <a:solidFill>
-                  <a:srgbClr val="000000"/>
-                </a:solidFill>
-              </a:rPr>
-              <a:t>Dockerfile</a:t>
-            </a:r>
-            <a:r>
-              <a:rPr b="1" lang="en-US" sz="1800"/>
-              <a:t>:</a:t>
-            </a:r>
-            <a:r>
-              <a:rPr lang="en-US" sz="1800"/>
-              <a:t> </a:t>
-            </a:r>
-            <a:r>
-              <a:rPr lang="en-US" sz="1800" u="sng">
-                <a:solidFill>
-                  <a:schemeClr val="hlink"/>
-                </a:solidFill>
-                <a:hlinkClick r:id="rId8"/>
-              </a:rPr>
-              <a:t>https://docs.docker.com/engine/reference/builder/</a:t>
-            </a:r>
-            <a:endParaRPr sz="1800"/>
-          </a:p>
-          <a:p>
-            <a:pPr indent="0" lvl="0" marL="0" rtl="0" algn="l">
-              <a:spcBef>
-                <a:spcPts val="0"/>
-              </a:spcBef>
-              <a:spcAft>
-                <a:spcPts val="0"/>
-              </a:spcAft>
-              <a:buNone/>
-            </a:pPr>
-            <a:r>
-              <a:rPr b="1" lang="en-US" sz="1800">
-                <a:solidFill>
-                  <a:schemeClr val="dk1"/>
-                </a:solidFill>
-              </a:rPr>
-              <a:t>Docker Compose:</a:t>
-            </a:r>
-            <a:r>
-              <a:rPr lang="en-US" sz="1800">
-                <a:solidFill>
-                  <a:schemeClr val="dk1"/>
-                </a:solidFill>
-              </a:rPr>
-              <a:t> </a:t>
-            </a:r>
-            <a:r>
-              <a:rPr lang="en-US" sz="1800" u="sng">
-                <a:solidFill>
-                  <a:schemeClr val="hlink"/>
-                </a:solidFill>
-                <a:hlinkClick r:id="rId9"/>
-              </a:rPr>
-              <a:t>https://docs.docker.com/compose/</a:t>
-            </a:r>
-            <a:endParaRPr sz="1800">
-              <a:solidFill>
-                <a:schemeClr val="dk1"/>
-              </a:solidFill>
-            </a:endParaRPr>
-          </a:p>
-          <a:p>
-            <a:pPr indent="0" lvl="0" marL="0" marR="0" rtl="0" algn="l">
-              <a:spcBef>
-                <a:spcPts val="0"/>
-              </a:spcBef>
-              <a:spcAft>
-                <a:spcPts val="0"/>
-              </a:spcAft>
-              <a:buNone/>
-            </a:pPr>
-            <a:r>
-              <a:t/>
-            </a:r>
-            <a:endParaRPr sz="1800"/>
-          </a:p>
-          <a:p>
-            <a:pPr indent="0" lvl="0" marL="0" marR="0" rtl="0" algn="l">
-              <a:spcBef>
-                <a:spcPts val="0"/>
-              </a:spcBef>
-              <a:spcAft>
-                <a:spcPts val="0"/>
-              </a:spcAft>
-              <a:buNone/>
-            </a:pPr>
-            <a:r>
-              <a:t/>
-            </a:r>
-            <a:endParaRPr sz="1800"/>
-          </a:p>
-          <a:p>
             <a:pPr indent="0" lvl="0" marL="0" rtl="0" algn="l">
               <a:spcBef>
                 <a:spcPts val="0"/>
@@ -29353,18 +29727,200 @@
               <a:buNone/>
             </a:pPr>
             <a:r>
+              <a:rPr b="1" lang="en-US" sz="2400">
+                <a:solidFill>
+                  <a:schemeClr val="dk1"/>
+                </a:solidFill>
+              </a:rPr>
+              <a:t>Project - Voting App - Requirements</a:t>
+            </a:r>
+            <a:endParaRPr sz="2400" strike="noStrike">
+              <a:solidFill>
+                <a:srgbClr val="000000"/>
+              </a:solidFill>
+            </a:endParaRPr>
+          </a:p>
+          <a:p>
+            <a:pPr indent="0" lvl="0" marL="0" marR="0" rtl="0" algn="l">
+              <a:spcBef>
+                <a:spcPts val="0"/>
+              </a:spcBef>
+              <a:spcAft>
+                <a:spcPts val="0"/>
+              </a:spcAft>
+              <a:buNone/>
+            </a:pPr>
+            <a:r>
+              <a:t/>
+            </a:r>
+            <a:endParaRPr sz="1800"/>
+          </a:p>
+          <a:p>
+            <a:pPr indent="0" lvl="0" marL="0" marR="0" rtl="0" algn="l">
+              <a:spcBef>
+                <a:spcPts val="0"/>
+              </a:spcBef>
+              <a:spcAft>
+                <a:spcPts val="0"/>
+              </a:spcAft>
+              <a:buNone/>
+            </a:pPr>
+            <a:r>
+              <a:rPr b="1" lang="en-US" sz="1800"/>
+              <a:t>Requirements</a:t>
+            </a:r>
+            <a:endParaRPr b="1" sz="1800"/>
+          </a:p>
+          <a:p>
+            <a:pPr indent="0" lvl="0" marL="0" marR="0" rtl="0" algn="l">
+              <a:spcBef>
+                <a:spcPts val="0"/>
+              </a:spcBef>
+              <a:spcAft>
+                <a:spcPts val="0"/>
+              </a:spcAft>
+              <a:buNone/>
+            </a:pPr>
+            <a:r>
+              <a:rPr lang="en-US" sz="1800"/>
+              <a:t>Docker</a:t>
+            </a:r>
+            <a:endParaRPr sz="1800"/>
+          </a:p>
+          <a:p>
+            <a:pPr indent="0" lvl="0" marL="0" marR="0" rtl="0" algn="l">
+              <a:spcBef>
+                <a:spcPts val="0"/>
+              </a:spcBef>
+              <a:spcAft>
+                <a:spcPts val="0"/>
+              </a:spcAft>
+              <a:buNone/>
+            </a:pPr>
+            <a:r>
+              <a:rPr lang="en-US" sz="1800"/>
+              <a:t>Docker Compose</a:t>
+            </a:r>
+            <a:endParaRPr sz="1800"/>
+          </a:p>
+          <a:p>
+            <a:pPr indent="0" lvl="0" marL="0" marR="0" rtl="0" algn="l">
+              <a:spcBef>
+                <a:spcPts val="0"/>
+              </a:spcBef>
+              <a:spcAft>
+                <a:spcPts val="0"/>
+              </a:spcAft>
+              <a:buNone/>
+            </a:pPr>
+            <a:r>
+              <a:rPr lang="en-US" sz="1800"/>
+              <a:t>Git</a:t>
+            </a:r>
+            <a:endParaRPr sz="1800"/>
+          </a:p>
+          <a:p>
+            <a:pPr indent="0" lvl="0" marL="0" marR="0" rtl="0" algn="l">
+              <a:spcBef>
+                <a:spcPts val="0"/>
+              </a:spcBef>
+              <a:spcAft>
+                <a:spcPts val="0"/>
+              </a:spcAft>
+              <a:buNone/>
+            </a:pPr>
+            <a:r>
+              <a:rPr lang="en-US" sz="1800"/>
+              <a:t>Internet Connection </a:t>
+            </a:r>
+            <a:r>
+              <a:rPr lang="en-US" sz="1800"/>
+              <a:t>needed to get tools</a:t>
+            </a:r>
+            <a:endParaRPr sz="1800"/>
+          </a:p>
+          <a:p>
+            <a:pPr indent="0" lvl="0" marL="0" marR="0" rtl="0" algn="l">
+              <a:spcBef>
+                <a:spcPts val="0"/>
+              </a:spcBef>
+              <a:spcAft>
+                <a:spcPts val="0"/>
+              </a:spcAft>
+              <a:buNone/>
+            </a:pPr>
+            <a:r>
+              <a:t/>
+            </a:r>
+            <a:endParaRPr sz="1800"/>
+          </a:p>
+          <a:p>
+            <a:pPr indent="0" lvl="0" marL="0" rtl="0" algn="l">
+              <a:spcBef>
+                <a:spcPts val="0"/>
+              </a:spcBef>
+              <a:spcAft>
+                <a:spcPts val="0"/>
+              </a:spcAft>
+              <a:buNone/>
+            </a:pPr>
+            <a:r>
               <a:rPr b="1" lang="en-US" sz="1800">
                 <a:solidFill>
                   <a:schemeClr val="dk1"/>
                 </a:solidFill>
               </a:rPr>
-              <a:t>GitHub</a:t>
+              <a:t>Voting App Git repository</a:t>
             </a:r>
             <a:endParaRPr b="1" sz="1800">
               <a:solidFill>
                 <a:schemeClr val="dk1"/>
               </a:solidFill>
             </a:endParaRPr>
+          </a:p>
+          <a:p>
+            <a:pPr indent="0" lvl="0" marL="0" rtl="0" algn="l">
+              <a:spcBef>
+                <a:spcPts val="0"/>
+              </a:spcBef>
+              <a:spcAft>
+                <a:spcPts val="0"/>
+              </a:spcAft>
+              <a:buNone/>
+            </a:pPr>
+            <a:r>
+              <a:rPr i="1" lang="en-US">
+                <a:solidFill>
+                  <a:schemeClr val="dk1"/>
+                </a:solidFill>
+              </a:rPr>
+              <a:t>$ git clone </a:t>
+            </a:r>
+            <a:r>
+              <a:rPr i="1" lang="en-US" u="sng">
+                <a:solidFill>
+                  <a:schemeClr val="hlink"/>
+                </a:solidFill>
+                <a:hlinkClick r:id="rId4"/>
+              </a:rPr>
+              <a:t>https://github.com/dockersamples/example-voting-app.git</a:t>
+            </a:r>
+            <a:endParaRPr/>
+          </a:p>
+          <a:p>
+            <a:pPr indent="0" lvl="0" marL="0" rtl="0" algn="l">
+              <a:spcBef>
+                <a:spcPts val="0"/>
+              </a:spcBef>
+              <a:spcAft>
+                <a:spcPts val="0"/>
+              </a:spcAft>
+              <a:buNone/>
+            </a:pPr>
+            <a:r>
+              <a:t/>
+            </a:r>
+            <a:endParaRPr sz="1800"/>
           </a:p>
           <a:p>
             <a:pPr indent="0" lvl="0" marL="0" rtl="0" algn="l">
@@ -29381,15 +29937,18 @@
               <a:buNone/>
             </a:pPr>
             <a:r>
-              <a:rPr lang="en-US" sz="1800" u="sng">
-                <a:solidFill>
-                  <a:schemeClr val="hlink"/>
-                </a:solidFill>
-                <a:hlinkClick r:id="rId10"/>
-              </a:rPr>
-              <a:t>https://github.com/luisnabais-courses/course_docker</a:t>
-            </a:r>
-            <a:endParaRPr sz="1800"/>
+              <a:rPr b="1" lang="en-US" sz="1800">
+                <a:solidFill>
+                  <a:schemeClr val="dk1"/>
+                </a:solidFill>
+              </a:rPr>
+              <a:t>IMPORTANT</a:t>
+            </a:r>
+            <a:endParaRPr b="1" sz="1800">
+              <a:solidFill>
+                <a:schemeClr val="dk1"/>
+              </a:solidFill>
+            </a:endParaRPr>
           </a:p>
           <a:p>
             <a:pPr indent="0" lvl="0" marL="0" rtl="0" algn="l">
@@ -29406,6 +29965,35 @@
               <a:buNone/>
             </a:pPr>
             <a:r>
+              <a:rPr lang="en-US" sz="1800">
+                <a:solidFill>
+                  <a:schemeClr val="dk1"/>
+                </a:solidFill>
+              </a:rPr>
+              <a:t>Instead of a personal VM or Local Docker installation, you can (and should!) use Play With Docker: </a:t>
+            </a:r>
+            <a:r>
+              <a:rPr lang="en-US" sz="1800" u="sng">
+                <a:solidFill>
+                  <a:schemeClr val="hlink"/>
+                </a:solidFill>
+                <a:hlinkClick r:id="rId5"/>
+              </a:rPr>
+              <a:t>https://labs.play-with-docker.com/</a:t>
+            </a:r>
+            <a:endParaRPr sz="1800"/>
+          </a:p>
+          <a:p>
+            <a:pPr indent="0" lvl="0" marL="0" rtl="0" algn="l">
+              <a:spcBef>
+                <a:spcPts val="0"/>
+              </a:spcBef>
+              <a:spcAft>
+                <a:spcPts val="0"/>
+              </a:spcAft>
+              <a:buNone/>
+            </a:pPr>
+            <a:r>
               <a:t/>
             </a:r>
             <a:endParaRPr sz="1800"/>
@@ -29425,106 +30013,227 @@
               <a:buNone/>
             </a:pPr>
             <a:r>
+              <a:rPr b="1" lang="en-US" sz="1800">
+                <a:solidFill>
+                  <a:schemeClr val="dk1"/>
+                </a:solidFill>
+              </a:rPr>
+              <a:t>What will we do exactly?</a:t>
+            </a:r>
+            <a:endParaRPr b="1" sz="1800">
+              <a:solidFill>
+                <a:schemeClr val="dk1"/>
+              </a:solidFill>
+            </a:endParaRPr>
+          </a:p>
+          <a:p>
+            <a:pPr indent="-342900" lvl="0" marL="457200" rtl="0" algn="l">
+              <a:spcBef>
+                <a:spcPts val="0"/>
+              </a:spcBef>
+              <a:spcAft>
+                <a:spcPts val="0"/>
+              </a:spcAft>
+              <a:buClr>
+                <a:schemeClr val="dk1"/>
+              </a:buClr>
+              <a:buSzPts val="1800"/>
+              <a:buAutoNum type="arabicPeriod"/>
+            </a:pPr>
+            <a:r>
+              <a:rPr lang="en-US" sz="1800">
+                <a:solidFill>
+                  <a:schemeClr val="dk1"/>
+                </a:solidFill>
+              </a:rPr>
+              <a:t>Deploy a simple distributed application running across multiple Docker containers.</a:t>
+            </a:r>
+            <a:endParaRPr sz="1800">
+              <a:solidFill>
+                <a:schemeClr val="dk1"/>
+              </a:solidFill>
+            </a:endParaRPr>
+          </a:p>
+          <a:p>
+            <a:pPr indent="-342900" lvl="0" marL="457200" rtl="0" algn="l">
+              <a:spcBef>
+                <a:spcPts val="0"/>
+              </a:spcBef>
+              <a:spcAft>
+                <a:spcPts val="0"/>
+              </a:spcAft>
+              <a:buClr>
+                <a:schemeClr val="dk1"/>
+              </a:buClr>
+              <a:buSzPts val="1800"/>
+              <a:buAutoNum type="arabicPeriod"/>
+            </a:pPr>
+            <a:r>
+              <a:rPr lang="en-US" sz="1800">
+                <a:solidFill>
+                  <a:schemeClr val="dk1"/>
+                </a:solidFill>
+              </a:rPr>
+              <a:t>Inspect and investigate the definition files</a:t>
+            </a:r>
+            <a:endParaRPr sz="1800">
+              <a:solidFill>
+                <a:schemeClr val="dk1"/>
+              </a:solidFill>
+            </a:endParaRPr>
+          </a:p>
+          <a:p>
+            <a:pPr indent="-342900" lvl="0" marL="457200" rtl="0" algn="l">
+              <a:spcBef>
+                <a:spcPts val="0"/>
+              </a:spcBef>
+              <a:spcAft>
+                <a:spcPts val="0"/>
+              </a:spcAft>
+              <a:buClr>
+                <a:schemeClr val="dk1"/>
+              </a:buClr>
+              <a:buSzPts val="1800"/>
+              <a:buAutoNum type="arabicPeriod"/>
+            </a:pPr>
+            <a:r>
+              <a:rPr lang="en-US" sz="1800">
+                <a:solidFill>
+                  <a:schemeClr val="dk1"/>
+                </a:solidFill>
+              </a:rPr>
+              <a:t>Connect containers among themselves with multiple Docker Networks</a:t>
+            </a:r>
+            <a:endParaRPr sz="1800">
+              <a:solidFill>
+                <a:schemeClr val="dk1"/>
+              </a:solidFill>
+            </a:endParaRPr>
+          </a:p>
+          <a:p>
+            <a:pPr indent="-342900" lvl="0" marL="457200" rtl="0" algn="l">
+              <a:spcBef>
+                <a:spcPts val="0"/>
+              </a:spcBef>
+              <a:spcAft>
+                <a:spcPts val="0"/>
+              </a:spcAft>
+              <a:buClr>
+                <a:schemeClr val="dk1"/>
+              </a:buClr>
+              <a:buSzPts val="1800"/>
+              <a:buAutoNum type="arabicPeriod"/>
+            </a:pPr>
+            <a:r>
+              <a:rPr lang="en-US" sz="1800">
+                <a:solidFill>
+                  <a:schemeClr val="dk1"/>
+                </a:solidFill>
+              </a:rPr>
+              <a:t>Database data will be kept in volumes</a:t>
+            </a:r>
+            <a:endParaRPr sz="1800">
+              <a:solidFill>
+                <a:schemeClr val="dk1"/>
+              </a:solidFill>
+            </a:endParaRPr>
+          </a:p>
+          <a:p>
+            <a:pPr indent="-342900" lvl="0" marL="457200" rtl="0" algn="l">
+              <a:spcBef>
+                <a:spcPts val="0"/>
+              </a:spcBef>
+              <a:spcAft>
+                <a:spcPts val="0"/>
+              </a:spcAft>
+              <a:buClr>
+                <a:schemeClr val="dk1"/>
+              </a:buClr>
+              <a:buSzPts val="1800"/>
+              <a:buAutoNum type="arabicPeriod"/>
+            </a:pPr>
+            <a:r>
+              <a:rPr lang="en-US" sz="1800">
+                <a:solidFill>
+                  <a:schemeClr val="dk1"/>
+                </a:solidFill>
+              </a:rPr>
+              <a:t>Scale microservices</a:t>
+            </a:r>
+            <a:endParaRPr sz="1800">
+              <a:solidFill>
+                <a:schemeClr val="dk1"/>
+              </a:solidFill>
+            </a:endParaRPr>
+          </a:p>
+          <a:p>
+            <a:pPr indent="-342900" lvl="0" marL="457200" rtl="0" algn="l">
+              <a:spcBef>
+                <a:spcPts val="0"/>
+              </a:spcBef>
+              <a:spcAft>
+                <a:spcPts val="0"/>
+              </a:spcAft>
+              <a:buClr>
+                <a:schemeClr val="dk1"/>
+              </a:buClr>
+              <a:buSzPts val="1800"/>
+              <a:buAutoNum type="arabicPeriod"/>
+            </a:pPr>
+            <a:r>
+              <a:rPr lang="en-US" sz="1800">
+                <a:solidFill>
+                  <a:schemeClr val="dk1"/>
+                </a:solidFill>
+              </a:rPr>
+              <a:t>Upgrade microservices</a:t>
+            </a:r>
+            <a:endParaRPr sz="1800">
+              <a:solidFill>
+                <a:schemeClr val="dk1"/>
+              </a:solidFill>
+            </a:endParaRPr>
+          </a:p>
+          <a:p>
+            <a:pPr indent="-342900" lvl="0" marL="457200" rtl="0" algn="l">
+              <a:spcBef>
+                <a:spcPts val="0"/>
+              </a:spcBef>
+              <a:spcAft>
+                <a:spcPts val="0"/>
+              </a:spcAft>
+              <a:buClr>
+                <a:schemeClr val="dk1"/>
+              </a:buClr>
+              <a:buSzPts val="1800"/>
+              <a:buAutoNum type="arabicPeriod"/>
+            </a:pPr>
+            <a:r>
+              <a:rPr lang="en-US" sz="1800">
+                <a:solidFill>
+                  <a:schemeClr val="dk1"/>
+                </a:solidFill>
+              </a:rPr>
+              <a:t>If possible, hide Web UI Services and load them with a Load Balancer / Reverse Proxy</a:t>
+            </a:r>
+            <a:endParaRPr sz="1800">
+              <a:solidFill>
+                <a:schemeClr val="dk1"/>
+              </a:solidFill>
+            </a:endParaRPr>
+          </a:p>
+          <a:p>
+            <a:pPr indent="0" lvl="0" marL="0" rtl="0" algn="l">
+              <a:spcBef>
+                <a:spcPts val="0"/>
+              </a:spcBef>
+              <a:spcAft>
+                <a:spcPts val="0"/>
+              </a:spcAft>
+              <a:buNone/>
+            </a:pPr>
+            <a:r>
               <a:t/>
-            </a:r>
-            <a:endParaRPr sz="1800"/>
-          </a:p>
-          <a:p>
-            <a:pPr indent="0" lvl="0" marL="0" rtl="0" algn="l">
-              <a:spcBef>
-                <a:spcPts val="0"/>
-              </a:spcBef>
-              <a:spcAft>
-                <a:spcPts val="0"/>
-              </a:spcAft>
-              <a:buClr>
-                <a:schemeClr val="dk1"/>
-              </a:buClr>
-              <a:buFont typeface="Arial"/>
-              <a:buNone/>
-            </a:pPr>
-            <a:r>
-              <a:rPr b="1" lang="en-US" sz="1800"/>
-              <a:t>My contacts</a:t>
-            </a:r>
-            <a:endParaRPr b="1" sz="1800"/>
-          </a:p>
-          <a:p>
-            <a:pPr indent="0" lvl="0" marL="0" rtl="0" algn="l">
-              <a:spcBef>
-                <a:spcPts val="0"/>
-              </a:spcBef>
-              <a:spcAft>
-                <a:spcPts val="0"/>
-              </a:spcAft>
-              <a:buClr>
-                <a:schemeClr val="dk1"/>
-              </a:buClr>
-              <a:buFont typeface="Arial"/>
-              <a:buNone/>
-            </a:pPr>
-            <a:r>
-              <a:rPr lang="en-US" sz="1800" u="sng">
-                <a:solidFill>
-                  <a:schemeClr val="hlink"/>
-                </a:solidFill>
-                <a:hlinkClick r:id="rId11"/>
-              </a:rPr>
-              <a:t>https://www.luisnabais.com</a:t>
-            </a:r>
-            <a:endParaRPr sz="1800"/>
-          </a:p>
-          <a:p>
-            <a:pPr indent="0" lvl="0" marL="0" rtl="0" algn="l">
-              <a:spcBef>
-                <a:spcPts val="0"/>
-              </a:spcBef>
-              <a:spcAft>
-                <a:spcPts val="0"/>
-              </a:spcAft>
-              <a:buClr>
-                <a:schemeClr val="dk1"/>
-              </a:buClr>
-              <a:buFont typeface="Arial"/>
-              <a:buNone/>
-            </a:pPr>
-            <a:r>
-              <a:rPr lang="en-US" sz="1800" u="sng">
-                <a:solidFill>
-                  <a:schemeClr val="hlink"/>
-                </a:solidFill>
-                <a:hlinkClick r:id="rId12"/>
-              </a:rPr>
-              <a:t>https://github.com/luisnabais</a:t>
-            </a:r>
-            <a:endParaRPr sz="1800"/>
-          </a:p>
-          <a:p>
-            <a:pPr indent="0" lvl="0" marL="0" rtl="0" algn="l">
-              <a:spcBef>
-                <a:spcPts val="0"/>
-              </a:spcBef>
-              <a:spcAft>
-                <a:spcPts val="0"/>
-              </a:spcAft>
-              <a:buClr>
-                <a:schemeClr val="dk1"/>
-              </a:buClr>
-              <a:buFont typeface="Arial"/>
-              <a:buNone/>
-            </a:pPr>
-            <a:r>
-              <a:rPr lang="en-US" sz="1800"/>
-              <a:t>E-mail: </a:t>
-            </a:r>
-            <a:r>
-              <a:rPr lang="en-US" sz="1800" u="sng">
-                <a:solidFill>
-                  <a:schemeClr val="hlink"/>
-                </a:solidFill>
-                <a:hlinkClick r:id="rId13"/>
-              </a:rPr>
-              <a:t>luis.nabais@findmore.pt</a:t>
             </a:r>
             <a:endParaRPr sz="1800"/>
           </a:p>
@@ -29555,7 +30264,7 @@
     </p:bg>
     <p:spTree>
       <p:nvGrpSpPr>
-        <p:cNvPr id="291" name="Shape 291"/>
+        <p:cNvPr id="293" name="Shape 293"/>
         <p:cNvGrpSpPr/>
         <p:nvPr/>
       </p:nvGrpSpPr>
@@ -29569,7 +30278,7 @@
       </p:grpSpPr>
       <p:sp>
         <p:nvSpPr>
-          <p:cNvPr id="292" name="Google Shape;292;p58"/>
+          <p:cNvPr id="294" name="Google Shape;294;p58"/>
           <p:cNvSpPr txBox="1"/>
           <p:nvPr/>
         </p:nvSpPr>
@@ -29587,12 +30296,324 @@
           </a:ln>
         </p:spPr>
         <p:txBody>
-          <a:bodyPr anchorCtr="0" anchor="ctr" bIns="45000" lIns="90000" spcFirstLastPara="1" rIns="90000" wrap="square" tIns="45000">
+          <a:bodyPr anchorCtr="0" anchor="t" bIns="45000" lIns="90000" spcFirstLastPara="1" rIns="90000" wrap="square" tIns="45000">
             <a:noAutofit/>
           </a:bodyPr>
           <a:lstStyle/>
           <a:p>
-            <a:pPr indent="0" lvl="0" marL="0" rtl="0" algn="ctr">
+            <a:pPr indent="0" lvl="0" marL="0" marR="0" rtl="0" algn="l">
+              <a:spcBef>
+                <a:spcPts val="0"/>
+              </a:spcBef>
+              <a:spcAft>
+                <a:spcPts val="0"/>
+              </a:spcAft>
+              <a:buNone/>
+            </a:pPr>
+            <a:r>
+              <a:rPr b="1" lang="en-US" sz="2400" strike="noStrike">
+                <a:solidFill>
+                  <a:srgbClr val="000000"/>
+                </a:solidFill>
+              </a:rPr>
+              <a:t>Where can I get more information?</a:t>
+            </a:r>
+            <a:endParaRPr sz="2400" strike="noStrike">
+              <a:solidFill>
+                <a:srgbClr val="000000"/>
+              </a:solidFill>
+            </a:endParaRPr>
+          </a:p>
+          <a:p>
+            <a:pPr indent="0" lvl="0" marL="0" marR="0" rtl="0" algn="l">
+              <a:spcBef>
+                <a:spcPts val="0"/>
+              </a:spcBef>
+              <a:spcAft>
+                <a:spcPts val="0"/>
+              </a:spcAft>
+              <a:buNone/>
+            </a:pPr>
+            <a:r>
+              <a:t/>
+            </a:r>
+            <a:endParaRPr sz="1800" strike="noStrike">
+              <a:solidFill>
+                <a:srgbClr val="000000"/>
+              </a:solidFill>
+            </a:endParaRPr>
+          </a:p>
+          <a:p>
+            <a:pPr indent="0" lvl="0" marL="0" marR="0" rtl="0" algn="l">
+              <a:spcBef>
+                <a:spcPts val="0"/>
+              </a:spcBef>
+              <a:spcAft>
+                <a:spcPts val="0"/>
+              </a:spcAft>
+              <a:buNone/>
+            </a:pPr>
+            <a:r>
+              <a:t/>
+            </a:r>
+            <a:endParaRPr sz="1800" strike="noStrike">
+              <a:solidFill>
+                <a:srgbClr val="000000"/>
+              </a:solidFill>
+            </a:endParaRPr>
+          </a:p>
+          <a:p>
+            <a:pPr indent="0" lvl="0" marL="0" marR="0" rtl="0" algn="l">
+              <a:spcBef>
+                <a:spcPts val="0"/>
+              </a:spcBef>
+              <a:spcAft>
+                <a:spcPts val="0"/>
+              </a:spcAft>
+              <a:buNone/>
+            </a:pPr>
+            <a:r>
+              <a:rPr b="1" lang="en-US" sz="1800" strike="noStrike">
+                <a:solidFill>
+                  <a:srgbClr val="000000"/>
+                </a:solidFill>
+              </a:rPr>
+              <a:t>Docker Documentation</a:t>
+            </a:r>
+            <a:r>
+              <a:rPr lang="en-US" sz="1800" strike="noStrike">
+                <a:solidFill>
+                  <a:srgbClr val="000000"/>
+                </a:solidFill>
+              </a:rPr>
+              <a:t>: </a:t>
+            </a:r>
+            <a:r>
+              <a:rPr lang="en-US" sz="1800" u="sng" strike="noStrike">
+                <a:solidFill>
+                  <a:schemeClr val="hlink"/>
+                </a:solidFill>
+                <a:hlinkClick r:id="rId4"/>
+              </a:rPr>
+              <a:t>https://docs.docker.com</a:t>
+            </a:r>
+            <a:endParaRPr sz="1800"/>
+          </a:p>
+          <a:p>
+            <a:pPr indent="0" lvl="0" marL="0" marR="0" rtl="0" algn="l">
+              <a:spcBef>
+                <a:spcPts val="0"/>
+              </a:spcBef>
+              <a:spcAft>
+                <a:spcPts val="0"/>
+              </a:spcAft>
+              <a:buNone/>
+            </a:pPr>
+            <a:r>
+              <a:t/>
+            </a:r>
+            <a:endParaRPr sz="1800"/>
+          </a:p>
+          <a:p>
+            <a:pPr indent="0" lvl="0" marL="0" marR="0" rtl="0" algn="l">
+              <a:spcBef>
+                <a:spcPts val="0"/>
+              </a:spcBef>
+              <a:spcAft>
+                <a:spcPts val="0"/>
+              </a:spcAft>
+              <a:buNone/>
+            </a:pPr>
+            <a:r>
+              <a:rPr b="1" lang="en-US" sz="1800" strike="noStrike">
+                <a:solidFill>
+                  <a:srgbClr val="000000"/>
+                </a:solidFill>
+              </a:rPr>
+              <a:t>Docker Overview</a:t>
+            </a:r>
+            <a:r>
+              <a:rPr lang="en-US" sz="1800" strike="noStrike">
+                <a:solidFill>
+                  <a:srgbClr val="000000"/>
+                </a:solidFill>
+              </a:rPr>
+              <a:t>: </a:t>
+            </a:r>
+            <a:r>
+              <a:rPr lang="en-US" sz="1800" u="sng">
+                <a:solidFill>
+                  <a:schemeClr val="hlink"/>
+                </a:solidFill>
+                <a:hlinkClick r:id="rId5"/>
+              </a:rPr>
+              <a:t>https://docs.docker.com/engine/docker-overview/</a:t>
+            </a:r>
+            <a:endParaRPr sz="1800">
+              <a:solidFill>
+                <a:srgbClr val="000000"/>
+              </a:solidFill>
+            </a:endParaRPr>
+          </a:p>
+          <a:p>
+            <a:pPr indent="0" lvl="0" marL="0" marR="0" rtl="0" algn="l">
+              <a:spcBef>
+                <a:spcPts val="0"/>
+              </a:spcBef>
+              <a:spcAft>
+                <a:spcPts val="0"/>
+              </a:spcAft>
+              <a:buNone/>
+            </a:pPr>
+            <a:r>
+              <a:rPr b="1" lang="en-US" sz="1800"/>
+              <a:t>Networks</a:t>
+            </a:r>
+            <a:r>
+              <a:rPr lang="en-US" sz="1800"/>
+              <a:t>: </a:t>
+            </a:r>
+            <a:r>
+              <a:rPr lang="en-US" sz="1800" u="sng">
+                <a:solidFill>
+                  <a:schemeClr val="hlink"/>
+                </a:solidFill>
+                <a:hlinkClick r:id="rId6"/>
+              </a:rPr>
+              <a:t>https://docs.docker.com/network/</a:t>
+            </a:r>
+            <a:br>
+              <a:rPr lang="en-US" sz="1800"/>
+            </a:br>
+            <a:r>
+              <a:rPr b="1" lang="en-US" sz="1800"/>
+              <a:t>Storage (Binds/Mounts)</a:t>
+            </a:r>
+            <a:r>
+              <a:rPr lang="en-US" sz="1800"/>
+              <a:t>: </a:t>
+            </a:r>
+            <a:r>
+              <a:rPr lang="en-US" sz="1800" u="sng">
+                <a:solidFill>
+                  <a:schemeClr val="hlink"/>
+                </a:solidFill>
+                <a:hlinkClick r:id="rId7"/>
+              </a:rPr>
+              <a:t>https://docs.docker.com/storage/</a:t>
+            </a:r>
+            <a:endParaRPr sz="1800"/>
+          </a:p>
+          <a:p>
+            <a:pPr indent="0" lvl="0" marL="0" marR="0" rtl="0" algn="l">
+              <a:spcBef>
+                <a:spcPts val="0"/>
+              </a:spcBef>
+              <a:spcAft>
+                <a:spcPts val="0"/>
+              </a:spcAft>
+              <a:buNone/>
+            </a:pPr>
+            <a:r>
+              <a:rPr b="1" lang="en-US" sz="1800" strike="noStrike">
+                <a:solidFill>
+                  <a:srgbClr val="000000"/>
+                </a:solidFill>
+              </a:rPr>
+              <a:t>Dockerfile</a:t>
+            </a:r>
+            <a:r>
+              <a:rPr b="1" lang="en-US" sz="1800"/>
+              <a:t>:</a:t>
+            </a:r>
+            <a:r>
+              <a:rPr lang="en-US" sz="1800"/>
+              <a:t> </a:t>
+            </a:r>
+            <a:r>
+              <a:rPr lang="en-US" sz="1800" u="sng">
+                <a:solidFill>
+                  <a:schemeClr val="hlink"/>
+                </a:solidFill>
+                <a:hlinkClick r:id="rId8"/>
+              </a:rPr>
+              <a:t>https://docs.docker.com/engine/reference/builder/</a:t>
+            </a:r>
+            <a:endParaRPr sz="1800"/>
+          </a:p>
+          <a:p>
+            <a:pPr indent="0" lvl="0" marL="0" rtl="0" algn="l">
+              <a:spcBef>
+                <a:spcPts val="0"/>
+              </a:spcBef>
+              <a:spcAft>
+                <a:spcPts val="0"/>
+              </a:spcAft>
+              <a:buNone/>
+            </a:pPr>
+            <a:r>
+              <a:rPr b="1" lang="en-US" sz="1800">
+                <a:solidFill>
+                  <a:schemeClr val="dk1"/>
+                </a:solidFill>
+              </a:rPr>
+              <a:t>Docker Compose:</a:t>
+            </a:r>
+            <a:r>
+              <a:rPr lang="en-US" sz="1800">
+                <a:solidFill>
+                  <a:schemeClr val="dk1"/>
+                </a:solidFill>
+              </a:rPr>
+              <a:t> </a:t>
+            </a:r>
+            <a:r>
+              <a:rPr lang="en-US" sz="1800" u="sng">
+                <a:solidFill>
+                  <a:schemeClr val="hlink"/>
+                </a:solidFill>
+                <a:hlinkClick r:id="rId9"/>
+              </a:rPr>
+              <a:t>https://docs.docker.com/compose/</a:t>
+            </a:r>
+            <a:endParaRPr sz="1800">
+              <a:solidFill>
+                <a:schemeClr val="dk1"/>
+              </a:solidFill>
+            </a:endParaRPr>
+          </a:p>
+          <a:p>
+            <a:pPr indent="0" lvl="0" marL="0" marR="0" rtl="0" algn="l">
+              <a:spcBef>
+                <a:spcPts val="0"/>
+              </a:spcBef>
+              <a:spcAft>
+                <a:spcPts val="0"/>
+              </a:spcAft>
+              <a:buNone/>
+            </a:pPr>
+            <a:r>
+              <a:t/>
+            </a:r>
+            <a:endParaRPr sz="1800"/>
+          </a:p>
+          <a:p>
+            <a:pPr indent="0" lvl="0" marL="0" marR="0" rtl="0" algn="l">
+              <a:spcBef>
+                <a:spcPts val="0"/>
+              </a:spcBef>
+              <a:spcAft>
+                <a:spcPts val="0"/>
+              </a:spcAft>
+              <a:buNone/>
+            </a:pPr>
+            <a:r>
+              <a:t/>
+            </a:r>
+            <a:endParaRPr sz="1800"/>
+          </a:p>
+          <a:p>
+            <a:pPr indent="0" lvl="0" marL="0" rtl="0" algn="l">
               <a:spcBef>
                 <a:spcPts val="0"/>
               </a:spcBef>
@@ -29606,10 +30627,18 @@
               <a:buNone/>
             </a:pPr>
             <a:r>
-              <a:rPr b="1" lang="en-US" sz="3000"/>
-              <a:t>Q&amp;A</a:t>
-            </a:r>
-            <a:endParaRPr b="1" sz="3000"/>
+              <a:rPr b="1" lang="en-US" sz="1800">
+                <a:solidFill>
+                  <a:schemeClr val="dk1"/>
+                </a:solidFill>
+              </a:rPr>
+              <a:t>GitHub</a:t>
+            </a:r>
+            <a:endParaRPr b="1" sz="1800">
+              <a:solidFill>
+                <a:schemeClr val="dk1"/>
+              </a:solidFill>
+            </a:endParaRPr>
           </a:p>
           <a:p>
             <a:pPr indent="0" lvl="0" marL="0" rtl="0" algn="l">
@@ -29626,9 +30655,15 @@
               <a:buNone/>
             </a:pPr>
             <a:r>
-              <a:t/>
-            </a:r>
-            <a:endParaRPr b="1" sz="1800"/>
+              <a:rPr lang="en-US" sz="1800" u="sng">
+                <a:solidFill>
+                  <a:schemeClr val="hlink"/>
+                </a:solidFill>
+                <a:hlinkClick r:id="rId10"/>
+              </a:rPr>
+              <a:t>https://github.com/luisnabais-courses/course_docker</a:t>
+            </a:r>
+            <a:endParaRPr sz="1800"/>
           </a:p>
           <a:p>
             <a:pPr indent="0" lvl="0" marL="0" rtl="0" algn="l">
@@ -29647,7 +30682,125 @@
             <a:r>
               <a:t/>
             </a:r>
-            <a:endParaRPr b="1"/>
+            <a:endParaRPr sz="1800"/>
+          </a:p>
+          <a:p>
+            <a:pPr indent="0" lvl="0" marL="0" rtl="0" algn="l">
+              <a:spcBef>
+                <a:spcPts val="0"/>
+              </a:spcBef>
+              <a:spcAft>
+                <a:spcPts val="0"/>
+              </a:spcAft>
+              <a:buClr>
+                <a:schemeClr val="dk1"/>
+              </a:buClr>
+              <a:buFont typeface="Arial"/>
+              <a:buNone/>
+            </a:pPr>
+            <a:r>
+              <a:t/>
+            </a:r>
+            <a:endParaRPr sz="1800"/>
+          </a:p>
+          <a:p>
+            <a:pPr indent="0" lvl="0" marL="0" rtl="0" algn="l">
+              <a:spcBef>
+                <a:spcPts val="0"/>
+              </a:spcBef>
+              <a:spcAft>
+                <a:spcPts val="0"/>
+              </a:spcAft>
+              <a:buClr>
+                <a:schemeClr val="dk1"/>
+              </a:buClr>
+              <a:buFont typeface="Arial"/>
+              <a:buNone/>
+            </a:pPr>
+            <a:r>
+              <a:rPr b="1" lang="en-US" sz="1800"/>
+              <a:t>My contacts</a:t>
+            </a:r>
+            <a:endParaRPr b="1" sz="1800"/>
+          </a:p>
+          <a:p>
+            <a:pPr indent="0" lvl="0" marL="0" rtl="0" algn="l">
+              <a:spcBef>
+                <a:spcPts val="0"/>
+              </a:spcBef>
+              <a:spcAft>
+                <a:spcPts val="0"/>
+              </a:spcAft>
+              <a:buClr>
+                <a:schemeClr val="dk1"/>
+              </a:buClr>
+              <a:buFont typeface="Arial"/>
+              <a:buNone/>
+            </a:pPr>
+            <a:r>
+              <a:rPr lang="en-US" sz="1800" u="sng">
+                <a:solidFill>
+                  <a:schemeClr val="hlink"/>
+                </a:solidFill>
+                <a:hlinkClick r:id="rId11"/>
+              </a:rPr>
+              <a:t>https://www.luisnabais.com</a:t>
+            </a:r>
+            <a:endParaRPr sz="1800"/>
+          </a:p>
+          <a:p>
+            <a:pPr indent="0" lvl="0" marL="0" rtl="0" algn="l">
+              <a:spcBef>
+                <a:spcPts val="0"/>
+              </a:spcBef>
+              <a:spcAft>
+                <a:spcPts val="0"/>
+              </a:spcAft>
+              <a:buClr>
+                <a:schemeClr val="dk1"/>
+              </a:buClr>
+              <a:buFont typeface="Arial"/>
+              <a:buNone/>
+            </a:pPr>
+            <a:r>
+              <a:rPr lang="en-US" sz="1800" u="sng">
+                <a:solidFill>
+                  <a:schemeClr val="hlink"/>
+                </a:solidFill>
+                <a:hlinkClick r:id="rId12"/>
+              </a:rPr>
+              <a:t>https://github.com/luisnabais</a:t>
+            </a:r>
+            <a:endParaRPr sz="1800"/>
+          </a:p>
+          <a:p>
+            <a:pPr indent="0" lvl="0" marL="0" rtl="0" algn="l">
+              <a:spcBef>
+                <a:spcPts val="0"/>
+              </a:spcBef>
+              <a:spcAft>
+                <a:spcPts val="0"/>
+              </a:spcAft>
+              <a:buClr>
+                <a:schemeClr val="dk1"/>
+              </a:buClr>
+              <a:buFont typeface="Arial"/>
+              <a:buNone/>
+            </a:pPr>
+            <a:r>
+              <a:rPr lang="en-US" sz="1800"/>
+              <a:t>E-mail: </a:t>
+            </a:r>
+            <a:r>
+              <a:rPr lang="en-US" sz="1800" u="sng">
+                <a:solidFill>
+                  <a:schemeClr val="hlink"/>
+                </a:solidFill>
+                <a:hlinkClick r:id="rId13"/>
+              </a:rPr>
+              <a:t>luis.nabais@findmore.pt</a:t>
+            </a:r>
+            <a:endParaRPr sz="1800"/>
           </a:p>
         </p:txBody>
       </p:sp>
@@ -29676,7 +30829,7 @@
     </p:bg>
     <p:spTree>
       <p:nvGrpSpPr>
-        <p:cNvPr id="296" name="Shape 296"/>
+        <p:cNvPr id="298" name="Shape 298"/>
         <p:cNvGrpSpPr/>
         <p:nvPr/>
       </p:nvGrpSpPr>
@@ -29690,7 +30843,128 @@
       </p:grpSpPr>
       <p:sp>
         <p:nvSpPr>
-          <p:cNvPr id="297" name="Google Shape;297;p59"/>
+          <p:cNvPr id="299" name="Google Shape;299;p59"/>
+          <p:cNvSpPr txBox="1"/>
+          <p:nvPr/>
+        </p:nvSpPr>
+        <p:spPr>
+          <a:xfrm>
+            <a:off x="182875" y="183250"/>
+            <a:ext cx="11704200" cy="6282000"/>
+          </a:xfrm>
+          <a:prstGeom prst="rect">
+            <a:avLst/>
+          </a:prstGeom>
+          <a:noFill/>
+          <a:ln>
+            <a:noFill/>
+          </a:ln>
+        </p:spPr>
+        <p:txBody>
+          <a:bodyPr anchorCtr="0" anchor="ctr" bIns="45000" lIns="90000" spcFirstLastPara="1" rIns="90000" wrap="square" tIns="45000">
+            <a:noAutofit/>
+          </a:bodyPr>
+          <a:lstStyle/>
+          <a:p>
+            <a:pPr indent="0" lvl="0" marL="0" rtl="0" algn="ctr">
+              <a:spcBef>
+                <a:spcPts val="0"/>
+              </a:spcBef>
+              <a:spcAft>
+                <a:spcPts val="0"/>
+              </a:spcAft>
+              <a:buClr>
+                <a:schemeClr val="dk1"/>
+              </a:buClr>
+              <a:buFont typeface="Arial"/>
+              <a:buNone/>
+            </a:pPr>
+            <a:r>
+              <a:rPr b="1" lang="en-US" sz="3000"/>
+              <a:t>Q&amp;A</a:t>
+            </a:r>
+            <a:endParaRPr b="1" sz="3000"/>
+          </a:p>
+          <a:p>
+            <a:pPr indent="0" lvl="0" marL="0" rtl="0" algn="l">
+              <a:spcBef>
+                <a:spcPts val="0"/>
+              </a:spcBef>
+              <a:spcAft>
+                <a:spcPts val="0"/>
+              </a:spcAft>
+              <a:buClr>
+                <a:schemeClr val="dk1"/>
+              </a:buClr>
+              <a:buFont typeface="Arial"/>
+              <a:buNone/>
+            </a:pPr>
+            <a:r>
+              <a:t/>
+            </a:r>
+            <a:endParaRPr b="1" sz="1800"/>
+          </a:p>
+          <a:p>
+            <a:pPr indent="0" lvl="0" marL="0" rtl="0" algn="l">
+              <a:spcBef>
+                <a:spcPts val="0"/>
+              </a:spcBef>
+              <a:spcAft>
+                <a:spcPts val="0"/>
+              </a:spcAft>
+              <a:buClr>
+                <a:schemeClr val="dk1"/>
+              </a:buClr>
+              <a:buFont typeface="Arial"/>
+              <a:buNone/>
+            </a:pPr>
+            <a:r>
+              <a:t/>
+            </a:r>
+            <a:endParaRPr b="1"/>
+          </a:p>
+        </p:txBody>
+      </p:sp>
+    </p:spTree>
+  </p:cSld>
+  <p:clrMapOvr>
+    <a:masterClrMapping/>
+  </p:clrMapOvr>
+</p:sld>
+</file>
+
+<file path=ppt/slides/slide34.xml><?xml version="1.0" encoding="utf-8"?>
+<p:sld xmlns:a="http://schemas.openxmlformats.org/drawingml/2006/main" xmlns:r="http://schemas.openxmlformats.org/officeDocument/2006/relationships" xmlns:mc="http://schemas.openxmlformats.org/markup-compatibility/2006" xmlns:mv="urn:schemas-microsoft-com:mac:vml" xmlns:p="http://schemas.openxmlformats.org/presentationml/2006/main" xmlns:c="http://schemas.openxmlformats.org/drawingml/2006/chart" xmlns:dgm="http://schemas.openxmlformats.org/drawingml/2006/diagram" xmlns:o="urn:schemas-microsoft-com:office:office" xmlns:v="urn:schemas-microsoft-com:vml" xmlns:pvml="urn:schemas-microsoft-com:office:powerpoint" xmlns:com="http://schemas.openxmlformats.org/drawingml/2006/compatibility" xmlns:p14="http://schemas.microsoft.com/office/powerpoint/2010/main" xmlns:p15="http://schemas.microsoft.com/office/powerpoint/2012/main">
+  <p:cSld>
+    <p:bg>
+      <p:bgPr>
+        <a:blipFill rotWithShape="1">
+          <a:blip r:embed="rId3">
+            <a:alphaModFix/>
+          </a:blip>
+          <a:stretch>
+            <a:fillRect b="0" l="0" r="0" t="0"/>
+          </a:stretch>
+        </a:blipFill>
+      </p:bgPr>
+    </p:bg>
+    <p:spTree>
+      <p:nvGrpSpPr>
+        <p:cNvPr id="303" name="Shape 303"/>
+        <p:cNvGrpSpPr/>
+        <p:nvPr/>
+      </p:nvGrpSpPr>
+      <p:grpSpPr>
+        <a:xfrm>
+          <a:off x="0" y="0"/>
+          <a:ext cx="0" cy="0"/>
+          <a:chOff x="0" y="0"/>
+          <a:chExt cx="0" cy="0"/>
+        </a:xfrm>
+      </p:grpSpPr>
+      <p:sp>
+        <p:nvSpPr>
+          <p:cNvPr id="304" name="Google Shape;304;p60"/>
           <p:cNvSpPr txBox="1"/>
           <p:nvPr/>
         </p:nvSpPr>
@@ -30706,7 +31980,7 @@
             <a:tbl>
               <a:tblPr>
                 <a:noFill/>
-                <a:tableStyleId>{FC09BD16-A77B-4368-8941-D593B769551A}</a:tableStyleId>
+                <a:tableStyleId>{90AC12B9-D837-48F1-8AB9-3E2EA746E1AF}</a:tableStyleId>
               </a:tblPr>
               <a:tblGrid>
                 <a:gridCol w="872600"/>
@@ -34091,9 +35365,9 @@
 </file>
 
 <file path=ppt/theme/theme1.xml><?xml version="1.0" encoding="utf-8"?>
-<a:theme xmlns:a="http://schemas.openxmlformats.org/drawingml/2006/main" xmlns:r="http://schemas.openxmlformats.org/officeDocument/2006/relationships">
+<a:theme xmlns:a="http://schemas.openxmlformats.org/drawingml/2006/main" xmlns:r="http://schemas.openxmlformats.org/officeDocument/2006/relationships" name="Office Theme">
   <a:themeElements>
-    <a:clrScheme name="Default">
+    <a:clrScheme name="Office">
       <a:dk1>
         <a:srgbClr val="000000"/>
       </a:dk1>
@@ -34101,34 +35375,34 @@
         <a:srgbClr val="FFFFFF"/>
       </a:lt1>
       <a:dk2>
-        <a:srgbClr val="158158"/>
+        <a:srgbClr val="1F497D"/>
       </a:dk2>
       <a:lt2>
-        <a:srgbClr val="F3F3F3"/>
+        <a:srgbClr val="EEECE1"/>
       </a:lt2>
       <a:accent1>
-        <a:srgbClr val="058DC7"/>
+        <a:srgbClr val="4F81BD"/>
       </a:accent1>
       <a:accent2>
-        <a:srgbClr val="50B432"/>
+        <a:srgbClr val="C0504D"/>
       </a:accent2>
       <a:accent3>
-        <a:srgbClr val="ED561B"/>
+        <a:srgbClr val="9BBB59"/>
       </a:accent3>
       <a:accent4>
-        <a:srgbClr val="EDEF00"/>
+        <a:srgbClr val="8064A2"/>
       </a:accent4>
       <a:accent5>
-        <a:srgbClr val="24CBE5"/>
+        <a:srgbClr val="4BACC6"/>
       </a:accent5>
       <a:accent6>
-        <a:srgbClr val="64E572"/>
+        <a:srgbClr val="F79646"/>
       </a:accent6>
       <a:hlink>
-        <a:srgbClr val="2200CC"/>
+        <a:srgbClr val="0000FF"/>
       </a:hlink>
       <a:folHlink>
-        <a:srgbClr val="551A8B"/>
+        <a:srgbClr val="800080"/>
       </a:folHlink>
     </a:clrScheme>
     <a:fontScheme name="Office">
@@ -34370,9 +35644,9 @@
 </file>
 
 <file path=ppt/theme/theme2.xml><?xml version="1.0" encoding="utf-8"?>
-<a:theme xmlns:a="http://schemas.openxmlformats.org/drawingml/2006/main" xmlns:r="http://schemas.openxmlformats.org/officeDocument/2006/relationships" name="Office Theme">
+<a:theme xmlns:a="http://schemas.openxmlformats.org/drawingml/2006/main" xmlns:r="http://schemas.openxmlformats.org/officeDocument/2006/relationships">
   <a:themeElements>
-    <a:clrScheme name="Office">
+    <a:clrScheme name="Default">
       <a:dk1>
         <a:srgbClr val="000000"/>
       </a:dk1>
@@ -34380,34 +35654,34 @@
         <a:srgbClr val="FFFFFF"/>
       </a:lt1>
       <a:dk2>
-        <a:srgbClr val="1F497D"/>
+        <a:srgbClr val="158158"/>
       </a:dk2>
       <a:lt2>
-        <a:srgbClr val="EEECE1"/>
+        <a:srgbClr val="F3F3F3"/>
       </a:lt2>
       <a:accent1>
-        <a:srgbClr val="4F81BD"/>
+        <a:srgbClr val="058DC7"/>
       </a:accent1>
       <a:accent2>
-        <a:srgbClr val="C0504D"/>
+        <a:srgbClr val="50B432"/>
       </a:accent2>
       <a:accent3>
-        <a:srgbClr val="9BBB59"/>
+        <a:srgbClr val="ED561B"/>
       </a:accent3>
       <a:accent4>
-        <a:srgbClr val="8064A2"/>
+        <a:srgbClr val="EDEF00"/>
       </a:accent4>
       <a:accent5>
-        <a:srgbClr val="4BACC6"/>
+        <a:srgbClr val="24CBE5"/>
       </a:accent5>
       <a:accent6>
-        <a:srgbClr val="F79646"/>
+        <a:srgbClr val="64E572"/>
       </a:accent6>
       <a:hlink>
-        <a:srgbClr val="0000FF"/>
+        <a:srgbClr val="2200CC"/>
       </a:hlink>
       <a:folHlink>
-        <a:srgbClr val="800080"/>
+        <a:srgbClr val="551A8B"/>
       </a:folHlink>
     </a:clrScheme>
     <a:fontScheme name="Office">

</xml_diff>